<commit_message>
Finish login page layout
Hoàn thành phác thảo trang login
</commit_message>
<xml_diff>
--- a/login.pptx
+++ b/login.pptx
@@ -6,7 +6,9 @@
   </p:sldMasterIdLst>
   <p:sldIdLst>
     <p:sldId id="256" r:id="rId2"/>
-    <p:sldId id="257" r:id="rId3"/>
+    <p:sldId id="258" r:id="rId3"/>
+    <p:sldId id="259" r:id="rId4"/>
+    <p:sldId id="257" r:id="rId5"/>
   </p:sldIdLst>
   <p:sldSz cx="12192000" cy="6858000"/>
   <p:notesSz cx="6858000" cy="9144000"/>
@@ -105,6 +107,11 @@
       </a:defRPr>
     </a:lvl9pPr>
   </p:defaultTextStyle>
+  <p:extLst>
+    <p:ext uri="{EFAFB233-063F-42B5-8137-9DF3F51BA10A}">
+      <p15:sldGuideLst xmlns:p15="http://schemas.microsoft.com/office/powerpoint/2012/main"/>
+    </p:ext>
+  </p:extLst>
 </p:presentation>
 </file>
 
@@ -3336,8 +3343,8 @@
         </p:nvSpPr>
         <p:spPr>
           <a:xfrm>
-            <a:off x="2572679" y="1310055"/>
-            <a:ext cx="7046641" cy="4018084"/>
+            <a:off x="3157632" y="1753506"/>
+            <a:ext cx="5876729" cy="3350985"/>
           </a:xfrm>
           <a:prstGeom prst="rect">
             <a:avLst/>
@@ -3388,8 +3395,8 @@
         </p:nvSpPr>
         <p:spPr>
           <a:xfrm>
-            <a:off x="5643195" y="1600200"/>
-            <a:ext cx="905607" cy="369332"/>
+            <a:off x="5399203" y="1895080"/>
+            <a:ext cx="1393585" cy="369332"/>
           </a:xfrm>
           <a:prstGeom prst="rect">
             <a:avLst/>
@@ -3408,7 +3415,7 @@
                   <a:schemeClr val="tx2"/>
                 </a:solidFill>
               </a:rPr>
-              <a:t>SIGN IN</a:t>
+              <a:t>ĐĂNG NHẬP</a:t>
             </a:r>
           </a:p>
         </p:txBody>
@@ -3427,8 +3434,8 @@
         </p:nvSpPr>
         <p:spPr>
           <a:xfrm>
-            <a:off x="3897921" y="2171754"/>
-            <a:ext cx="4396154" cy="615462"/>
+            <a:off x="4271596" y="2405986"/>
+            <a:ext cx="3648808" cy="510833"/>
           </a:xfrm>
           <a:prstGeom prst="roundRect">
             <a:avLst/>
@@ -3476,8 +3483,8 @@
         </p:nvSpPr>
         <p:spPr>
           <a:xfrm>
-            <a:off x="3897921" y="2989545"/>
-            <a:ext cx="4396154" cy="615462"/>
+            <a:off x="4271596" y="3173583"/>
+            <a:ext cx="3648808" cy="510833"/>
           </a:xfrm>
           <a:prstGeom prst="roundRect">
             <a:avLst/>
@@ -3525,8 +3532,8 @@
         </p:nvSpPr>
         <p:spPr>
           <a:xfrm>
-            <a:off x="3897921" y="3807336"/>
-            <a:ext cx="4396154" cy="615462"/>
+            <a:off x="4271596" y="3941180"/>
+            <a:ext cx="3648808" cy="510833"/>
           </a:xfrm>
           <a:prstGeom prst="roundRect">
             <a:avLst/>
@@ -3535,6 +3542,251 @@
             <a:schemeClr val="accent6">
               <a:lumMod val="40000"/>
               <a:lumOff val="60000"/>
+            </a:schemeClr>
+          </a:solidFill>
+          <a:scene3d>
+            <a:camera prst="orthographicFront"/>
+            <a:lightRig rig="threePt" dir="t"/>
+          </a:scene3d>
+          <a:sp3d>
+            <a:bevelT w="38100" h="38100" prst="angle"/>
+          </a:sp3d>
+        </p:spPr>
+        <p:style>
+          <a:lnRef idx="2">
+            <a:schemeClr val="accent1">
+              <a:shade val="50000"/>
+            </a:schemeClr>
+          </a:lnRef>
+          <a:fillRef idx="1">
+            <a:schemeClr val="accent1"/>
+          </a:fillRef>
+          <a:effectRef idx="0">
+            <a:schemeClr val="accent1"/>
+          </a:effectRef>
+          <a:fontRef idx="minor">
+            <a:schemeClr val="lt1"/>
+          </a:fontRef>
+        </p:style>
+        <p:txBody>
+          <a:bodyPr rtlCol="0" anchor="ctr"/>
+          <a:lstStyle/>
+          <a:p>
+            <a:pPr algn="ctr"/>
+            <a:r>
+              <a:rPr lang="vi-VN" dirty="0">
+                <a:solidFill>
+                  <a:schemeClr val="tx2"/>
+                </a:solidFill>
+              </a:rPr>
+              <a:t>Login</a:t>
+            </a:r>
+            <a:endParaRPr lang="en-US" dirty="0">
+              <a:solidFill>
+                <a:schemeClr val="tx2"/>
+              </a:solidFill>
+            </a:endParaRPr>
+          </a:p>
+        </p:txBody>
+      </p:sp>
+      <p:sp>
+        <p:nvSpPr>
+          <p:cNvPr id="10" name="TextBox 9">
+            <a:extLst>
+              <a:ext uri="{FF2B5EF4-FFF2-40B4-BE49-F238E27FC236}">
+                <a16:creationId xmlns:a16="http://schemas.microsoft.com/office/drawing/2014/main" id="{3115243B-F508-4C91-9EFD-E603E6F20542}"/>
+              </a:ext>
+            </a:extLst>
+          </p:cNvPr>
+          <p:cNvSpPr txBox="1"/>
+          <p:nvPr/>
+        </p:nvSpPr>
+        <p:spPr>
+          <a:xfrm>
+            <a:off x="5367700" y="4624363"/>
+            <a:ext cx="1456595" cy="307777"/>
+          </a:xfrm>
+          <a:prstGeom prst="rect">
+            <a:avLst/>
+          </a:prstGeom>
+          <a:noFill/>
+        </p:spPr>
+        <p:txBody>
+          <a:bodyPr wrap="square" rtlCol="0">
+            <a:spAutoFit/>
+          </a:bodyPr>
+          <a:lstStyle/>
+          <a:p>
+            <a:r>
+              <a:rPr lang="vi-VN" sz="1400" u="sng" dirty="0">
+                <a:solidFill>
+                  <a:schemeClr val="tx2"/>
+                </a:solidFill>
+              </a:rPr>
+              <a:t>Quên mật khẩu</a:t>
+            </a:r>
+            <a:endParaRPr lang="en-US" sz="1400" u="sng" dirty="0">
+              <a:solidFill>
+                <a:schemeClr val="tx2"/>
+              </a:solidFill>
+            </a:endParaRPr>
+          </a:p>
+        </p:txBody>
+      </p:sp>
+      <p:sp>
+        <p:nvSpPr>
+          <p:cNvPr id="11" name="TextBox 10">
+            <a:extLst>
+              <a:ext uri="{FF2B5EF4-FFF2-40B4-BE49-F238E27FC236}">
+                <a16:creationId xmlns:a16="http://schemas.microsoft.com/office/drawing/2014/main" id="{49A1C479-B19B-4562-A60E-9B3EB5530ED0}"/>
+              </a:ext>
+            </a:extLst>
+          </p:cNvPr>
+          <p:cNvSpPr txBox="1"/>
+          <p:nvPr/>
+        </p:nvSpPr>
+        <p:spPr>
+          <a:xfrm>
+            <a:off x="4385891" y="2507513"/>
+            <a:ext cx="1802423" cy="307777"/>
+          </a:xfrm>
+          <a:prstGeom prst="rect">
+            <a:avLst/>
+          </a:prstGeom>
+          <a:noFill/>
+        </p:spPr>
+        <p:txBody>
+          <a:bodyPr wrap="square" rtlCol="0">
+            <a:spAutoFit/>
+          </a:bodyPr>
+          <a:lstStyle/>
+          <a:p>
+            <a:r>
+              <a:rPr lang="vi-VN" sz="1400" dirty="0">
+                <a:solidFill>
+                  <a:schemeClr val="accent1">
+                    <a:lumMod val="40000"/>
+                    <a:lumOff val="60000"/>
+                  </a:schemeClr>
+                </a:solidFill>
+              </a:rPr>
+              <a:t>Tên đăng nhập</a:t>
+            </a:r>
+            <a:endParaRPr lang="en-US" sz="1400" dirty="0">
+              <a:solidFill>
+                <a:schemeClr val="accent1">
+                  <a:lumMod val="40000"/>
+                  <a:lumOff val="60000"/>
+                </a:schemeClr>
+              </a:solidFill>
+            </a:endParaRPr>
+          </a:p>
+        </p:txBody>
+      </p:sp>
+      <p:sp>
+        <p:nvSpPr>
+          <p:cNvPr id="12" name="TextBox 11">
+            <a:extLst>
+              <a:ext uri="{FF2B5EF4-FFF2-40B4-BE49-F238E27FC236}">
+                <a16:creationId xmlns:a16="http://schemas.microsoft.com/office/drawing/2014/main" id="{80A12396-906F-4F82-861F-8F2FA3FF7D61}"/>
+              </a:ext>
+            </a:extLst>
+          </p:cNvPr>
+          <p:cNvSpPr txBox="1"/>
+          <p:nvPr/>
+        </p:nvSpPr>
+        <p:spPr>
+          <a:xfrm>
+            <a:off x="4385891" y="3275109"/>
+            <a:ext cx="1863970" cy="307777"/>
+          </a:xfrm>
+          <a:prstGeom prst="rect">
+            <a:avLst/>
+          </a:prstGeom>
+          <a:noFill/>
+        </p:spPr>
+        <p:txBody>
+          <a:bodyPr wrap="square" rtlCol="0">
+            <a:spAutoFit/>
+          </a:bodyPr>
+          <a:lstStyle/>
+          <a:p>
+            <a:r>
+              <a:rPr lang="vi-VN" sz="1400" dirty="0">
+                <a:solidFill>
+                  <a:schemeClr val="accent1">
+                    <a:lumMod val="40000"/>
+                    <a:lumOff val="60000"/>
+                  </a:schemeClr>
+                </a:solidFill>
+              </a:rPr>
+              <a:t>Mật khẩu</a:t>
+            </a:r>
+            <a:endParaRPr lang="en-US" sz="1400" dirty="0">
+              <a:solidFill>
+                <a:schemeClr val="accent1">
+                  <a:lumMod val="40000"/>
+                  <a:lumOff val="60000"/>
+                </a:schemeClr>
+              </a:solidFill>
+            </a:endParaRPr>
+          </a:p>
+        </p:txBody>
+      </p:sp>
+    </p:spTree>
+    <p:extLst>
+      <p:ext uri="{BB962C8B-B14F-4D97-AF65-F5344CB8AC3E}">
+        <p14:creationId xmlns:p14="http://schemas.microsoft.com/office/powerpoint/2010/main" val="4185663629"/>
+      </p:ext>
+    </p:extLst>
+  </p:cSld>
+  <p:clrMapOvr>
+    <a:masterClrMapping/>
+  </p:clrMapOvr>
+</p:sld>
+</file>
+
+<file path=ppt/slides/slide2.xml><?xml version="1.0" encoding="utf-8"?>
+<p:sld xmlns:a="http://schemas.openxmlformats.org/drawingml/2006/main" xmlns:r="http://schemas.openxmlformats.org/officeDocument/2006/relationships" xmlns:p="http://schemas.openxmlformats.org/presentationml/2006/main">
+  <p:cSld>
+    <p:spTree>
+      <p:nvGrpSpPr>
+        <p:cNvPr id="1" name=""/>
+        <p:cNvGrpSpPr/>
+        <p:nvPr/>
+      </p:nvGrpSpPr>
+      <p:grpSpPr>
+        <a:xfrm>
+          <a:off x="0" y="0"/>
+          <a:ext cx="0" cy="0"/>
+          <a:chOff x="0" y="0"/>
+          <a:chExt cx="0" cy="0"/>
+        </a:xfrm>
+      </p:grpSpPr>
+      <p:sp>
+        <p:nvSpPr>
+          <p:cNvPr id="4" name="Rectangle 3">
+            <a:extLst>
+              <a:ext uri="{FF2B5EF4-FFF2-40B4-BE49-F238E27FC236}">
+                <a16:creationId xmlns:a16="http://schemas.microsoft.com/office/drawing/2014/main" id="{39297C41-66FA-4859-B4BF-9F5A3487F485}"/>
+              </a:ext>
+            </a:extLst>
+          </p:cNvPr>
+          <p:cNvSpPr/>
+          <p:nvPr/>
+        </p:nvSpPr>
+        <p:spPr>
+          <a:xfrm>
+            <a:off x="3157632" y="1753506"/>
+            <a:ext cx="5876729" cy="3350985"/>
+          </a:xfrm>
+          <a:prstGeom prst="rect">
+            <a:avLst/>
+          </a:prstGeom>
+          <a:solidFill>
+            <a:schemeClr val="accent5">
+              <a:lumMod val="20000"/>
+              <a:lumOff val="80000"/>
             </a:schemeClr>
           </a:solidFill>
         </p:spPr>
@@ -3559,6 +3811,207 @@
           <a:lstStyle/>
           <a:p>
             <a:pPr algn="ctr"/>
+            <a:endParaRPr lang="en-US" dirty="0"/>
+          </a:p>
+        </p:txBody>
+      </p:sp>
+      <p:sp>
+        <p:nvSpPr>
+          <p:cNvPr id="6" name="TextBox 5">
+            <a:extLst>
+              <a:ext uri="{FF2B5EF4-FFF2-40B4-BE49-F238E27FC236}">
+                <a16:creationId xmlns:a16="http://schemas.microsoft.com/office/drawing/2014/main" id="{5D866BAD-73D5-4E6C-98E3-8F6F41E99FA7}"/>
+              </a:ext>
+            </a:extLst>
+          </p:cNvPr>
+          <p:cNvSpPr txBox="1"/>
+          <p:nvPr/>
+        </p:nvSpPr>
+        <p:spPr>
+          <a:xfrm>
+            <a:off x="5399203" y="1895080"/>
+            <a:ext cx="1393585" cy="369332"/>
+          </a:xfrm>
+          <a:prstGeom prst="rect">
+            <a:avLst/>
+          </a:prstGeom>
+          <a:noFill/>
+        </p:spPr>
+        <p:txBody>
+          <a:bodyPr wrap="square" rtlCol="0">
+            <a:spAutoFit/>
+          </a:bodyPr>
+          <a:lstStyle/>
+          <a:p>
+            <a:r>
+              <a:rPr lang="en-US" dirty="0">
+                <a:solidFill>
+                  <a:schemeClr val="tx2"/>
+                </a:solidFill>
+              </a:rPr>
+              <a:t>ĐĂNG NHẬP</a:t>
+            </a:r>
+          </a:p>
+        </p:txBody>
+      </p:sp>
+      <p:sp>
+        <p:nvSpPr>
+          <p:cNvPr id="7" name="Rectangle: Rounded Corners 6">
+            <a:extLst>
+              <a:ext uri="{FF2B5EF4-FFF2-40B4-BE49-F238E27FC236}">
+                <a16:creationId xmlns:a16="http://schemas.microsoft.com/office/drawing/2014/main" id="{BFC4D056-A35F-47C7-8F7A-BB2F3DFE7E1B}"/>
+              </a:ext>
+            </a:extLst>
+          </p:cNvPr>
+          <p:cNvSpPr/>
+          <p:nvPr/>
+        </p:nvSpPr>
+        <p:spPr>
+          <a:xfrm>
+            <a:off x="4271596" y="2405986"/>
+            <a:ext cx="3648808" cy="510833"/>
+          </a:xfrm>
+          <a:prstGeom prst="roundRect">
+            <a:avLst/>
+          </a:prstGeom>
+          <a:solidFill>
+            <a:srgbClr val="FBD7D7"/>
+          </a:solidFill>
+          <a:ln>
+            <a:solidFill>
+              <a:srgbClr val="B20C0C"/>
+            </a:solidFill>
+          </a:ln>
+        </p:spPr>
+        <p:style>
+          <a:lnRef idx="2">
+            <a:schemeClr val="accent1">
+              <a:shade val="50000"/>
+            </a:schemeClr>
+          </a:lnRef>
+          <a:fillRef idx="1">
+            <a:schemeClr val="accent1"/>
+          </a:fillRef>
+          <a:effectRef idx="0">
+            <a:schemeClr val="accent1"/>
+          </a:effectRef>
+          <a:fontRef idx="minor">
+            <a:schemeClr val="lt1"/>
+          </a:fontRef>
+        </p:style>
+        <p:txBody>
+          <a:bodyPr rtlCol="0" anchor="ctr"/>
+          <a:lstStyle/>
+          <a:p>
+            <a:pPr algn="ctr"/>
+            <a:endParaRPr lang="en-US"/>
+          </a:p>
+        </p:txBody>
+      </p:sp>
+      <p:sp>
+        <p:nvSpPr>
+          <p:cNvPr id="8" name="Rectangle: Rounded Corners 7">
+            <a:extLst>
+              <a:ext uri="{FF2B5EF4-FFF2-40B4-BE49-F238E27FC236}">
+                <a16:creationId xmlns:a16="http://schemas.microsoft.com/office/drawing/2014/main" id="{7979C10B-6BFF-4727-A802-B82C92E348E0}"/>
+              </a:ext>
+            </a:extLst>
+          </p:cNvPr>
+          <p:cNvSpPr/>
+          <p:nvPr/>
+        </p:nvSpPr>
+        <p:spPr>
+          <a:xfrm>
+            <a:off x="4271596" y="3173583"/>
+            <a:ext cx="3648808" cy="510833"/>
+          </a:xfrm>
+          <a:prstGeom prst="roundRect">
+            <a:avLst/>
+          </a:prstGeom>
+          <a:solidFill>
+            <a:schemeClr val="bg1"/>
+          </a:solidFill>
+        </p:spPr>
+        <p:style>
+          <a:lnRef idx="2">
+            <a:schemeClr val="accent1">
+              <a:shade val="50000"/>
+            </a:schemeClr>
+          </a:lnRef>
+          <a:fillRef idx="1">
+            <a:schemeClr val="accent1"/>
+          </a:fillRef>
+          <a:effectRef idx="0">
+            <a:schemeClr val="accent1"/>
+          </a:effectRef>
+          <a:fontRef idx="minor">
+            <a:schemeClr val="lt1"/>
+          </a:fontRef>
+        </p:style>
+        <p:txBody>
+          <a:bodyPr rtlCol="0" anchor="ctr"/>
+          <a:lstStyle/>
+          <a:p>
+            <a:pPr algn="ctr"/>
+            <a:endParaRPr lang="en-US"/>
+          </a:p>
+        </p:txBody>
+      </p:sp>
+      <p:sp>
+        <p:nvSpPr>
+          <p:cNvPr id="9" name="Rectangle: Rounded Corners 8">
+            <a:extLst>
+              <a:ext uri="{FF2B5EF4-FFF2-40B4-BE49-F238E27FC236}">
+                <a16:creationId xmlns:a16="http://schemas.microsoft.com/office/drawing/2014/main" id="{91F3BC59-1E56-4433-81AF-2CEAAE8621E1}"/>
+              </a:ext>
+            </a:extLst>
+          </p:cNvPr>
+          <p:cNvSpPr/>
+          <p:nvPr/>
+        </p:nvSpPr>
+        <p:spPr>
+          <a:xfrm>
+            <a:off x="4271596" y="3941180"/>
+            <a:ext cx="3648808" cy="510833"/>
+          </a:xfrm>
+          <a:prstGeom prst="roundRect">
+            <a:avLst/>
+          </a:prstGeom>
+          <a:solidFill>
+            <a:schemeClr val="accent6">
+              <a:lumMod val="40000"/>
+              <a:lumOff val="60000"/>
+            </a:schemeClr>
+          </a:solidFill>
+          <a:scene3d>
+            <a:camera prst="orthographicFront"/>
+            <a:lightRig rig="threePt" dir="t"/>
+          </a:scene3d>
+          <a:sp3d>
+            <a:bevelT w="38100" h="38100" prst="angle"/>
+          </a:sp3d>
+        </p:spPr>
+        <p:style>
+          <a:lnRef idx="2">
+            <a:schemeClr val="accent1">
+              <a:shade val="50000"/>
+            </a:schemeClr>
+          </a:lnRef>
+          <a:fillRef idx="1">
+            <a:schemeClr val="accent1"/>
+          </a:fillRef>
+          <a:effectRef idx="0">
+            <a:schemeClr val="accent1"/>
+          </a:effectRef>
+          <a:fontRef idx="minor">
+            <a:schemeClr val="lt1"/>
+          </a:fontRef>
+        </p:style>
+        <p:txBody>
+          <a:bodyPr rtlCol="0" anchor="ctr"/>
+          <a:lstStyle/>
+          <a:p>
+            <a:pPr algn="ctr"/>
             <a:r>
               <a:rPr lang="vi-VN" dirty="0">
                 <a:solidFill>
@@ -3589,7 +4042,7 @@
         </p:nvSpPr>
         <p:spPr>
           <a:xfrm>
-            <a:off x="5367700" y="4721580"/>
+            <a:off x="5367700" y="4624363"/>
             <a:ext cx="1456595" cy="307777"/>
           </a:xfrm>
           <a:prstGeom prst="rect">
@@ -3633,8 +4086,8 @@
         </p:nvSpPr>
         <p:spPr>
           <a:xfrm>
-            <a:off x="4086956" y="2294633"/>
-            <a:ext cx="1802423" cy="369332"/>
+            <a:off x="4385891" y="2521105"/>
+            <a:ext cx="2683124" cy="307777"/>
           </a:xfrm>
           <a:prstGeom prst="rect">
             <a:avLst/>
@@ -3648,23 +4101,79 @@
           <a:lstStyle/>
           <a:p>
             <a:r>
-              <a:rPr lang="vi-VN" dirty="0">
+              <a:rPr lang="vi-VN" sz="1400" dirty="0">
                 <a:solidFill>
-                  <a:schemeClr val="accent1">
-                    <a:lumMod val="40000"/>
-                    <a:lumOff val="60000"/>
-                  </a:schemeClr>
+                  <a:srgbClr val="E67474"/>
                 </a:solidFill>
               </a:rPr>
-              <a:t>Tên đăng nhập</a:t>
-            </a:r>
-            <a:endParaRPr lang="en-US" dirty="0">
+              <a:t>Tên đăng nhậ</a:t>
+            </a:r>
+            <a:r>
+              <a:rPr lang="en-US" sz="1400" dirty="0">
+                <a:solidFill>
+                  <a:srgbClr val="E67474"/>
+                </a:solidFill>
+                <a:latin typeface="Arial" panose="020B0604020202020204" pitchFamily="34" charset="0"/>
+                <a:cs typeface="Arial" panose="020B0604020202020204" pitchFamily="34" charset="0"/>
+              </a:rPr>
+              <a:t>p </a:t>
+            </a:r>
+            <a:r>
+              <a:rPr lang="en-US" sz="1400" dirty="0" err="1">
+                <a:solidFill>
+                  <a:srgbClr val="E67474"/>
+                </a:solidFill>
+                <a:latin typeface="Arial" panose="020B0604020202020204" pitchFamily="34" charset="0"/>
+                <a:cs typeface="Arial" panose="020B0604020202020204" pitchFamily="34" charset="0"/>
+              </a:rPr>
+              <a:t>không</a:t>
+            </a:r>
+            <a:r>
+              <a:rPr lang="en-US" sz="1400" dirty="0">
+                <a:solidFill>
+                  <a:srgbClr val="E67474"/>
+                </a:solidFill>
+                <a:latin typeface="Arial" panose="020B0604020202020204" pitchFamily="34" charset="0"/>
+                <a:cs typeface="Arial" panose="020B0604020202020204" pitchFamily="34" charset="0"/>
+              </a:rPr>
+              <a:t> </a:t>
+            </a:r>
+            <a:r>
+              <a:rPr lang="en-US" sz="1400" dirty="0" err="1">
+                <a:solidFill>
+                  <a:srgbClr val="E67474"/>
+                </a:solidFill>
+                <a:latin typeface="Arial" panose="020B0604020202020204" pitchFamily="34" charset="0"/>
+                <a:cs typeface="Arial" panose="020B0604020202020204" pitchFamily="34" charset="0"/>
+              </a:rPr>
+              <a:t>tồn</a:t>
+            </a:r>
+            <a:r>
+              <a:rPr lang="en-US" sz="1400" dirty="0">
+                <a:solidFill>
+                  <a:srgbClr val="E67474"/>
+                </a:solidFill>
+                <a:latin typeface="Arial" panose="020B0604020202020204" pitchFamily="34" charset="0"/>
+                <a:cs typeface="Arial" panose="020B0604020202020204" pitchFamily="34" charset="0"/>
+              </a:rPr>
+              <a:t> </a:t>
+            </a:r>
+            <a:r>
+              <a:rPr lang="en-US" sz="1400" dirty="0" err="1">
+                <a:solidFill>
+                  <a:srgbClr val="E67474"/>
+                </a:solidFill>
+                <a:latin typeface="Arial" panose="020B0604020202020204" pitchFamily="34" charset="0"/>
+                <a:cs typeface="Arial" panose="020B0604020202020204" pitchFamily="34" charset="0"/>
+              </a:rPr>
+              <a:t>tại</a:t>
+            </a:r>
+            <a:endParaRPr lang="en-US" sz="1400" dirty="0">
               <a:solidFill>
-                <a:schemeClr val="accent1">
-                  <a:lumMod val="40000"/>
-                  <a:lumOff val="60000"/>
-                </a:schemeClr>
+                <a:srgbClr val="E67474"/>
               </a:solidFill>
+              <a:latin typeface="Arial" panose="020B0604020202020204" pitchFamily="34" charset="0"/>
+              <a:cs typeface="Arial" panose="020B0604020202020204" pitchFamily="34" charset="0"/>
             </a:endParaRPr>
           </a:p>
         </p:txBody>
@@ -3683,8 +4192,8 @@
         </p:nvSpPr>
         <p:spPr>
           <a:xfrm>
-            <a:off x="4086956" y="3134431"/>
-            <a:ext cx="1863970" cy="369332"/>
+            <a:off x="4385891" y="3275109"/>
+            <a:ext cx="1863970" cy="307777"/>
           </a:xfrm>
           <a:prstGeom prst="rect">
             <a:avLst/>
@@ -3698,7 +4207,7 @@
           <a:lstStyle/>
           <a:p>
             <a:r>
-              <a:rPr lang="vi-VN" dirty="0">
+              <a:rPr lang="vi-VN" sz="1400" dirty="0">
                 <a:solidFill>
                   <a:schemeClr val="accent1">
                     <a:lumMod val="40000"/>
@@ -3708,7 +4217,7 @@
               </a:rPr>
               <a:t>Mật khẩu</a:t>
             </a:r>
-            <a:endParaRPr lang="en-US" dirty="0">
+            <a:endParaRPr lang="en-US" sz="1400" dirty="0">
               <a:solidFill>
                 <a:schemeClr val="accent1">
                   <a:lumMod val="40000"/>
@@ -3722,7 +4231,7 @@
     </p:spTree>
     <p:extLst>
       <p:ext uri="{BB962C8B-B14F-4D97-AF65-F5344CB8AC3E}">
-        <p14:creationId xmlns:p14="http://schemas.microsoft.com/office/powerpoint/2010/main" val="4185663629"/>
+        <p14:creationId xmlns:p14="http://schemas.microsoft.com/office/powerpoint/2010/main" val="3382200452"/>
       </p:ext>
     </p:extLst>
   </p:cSld>
@@ -3732,7 +4241,560 @@
 </p:sld>
 </file>
 
-<file path=ppt/slides/slide2.xml><?xml version="1.0" encoding="utf-8"?>
+<file path=ppt/slides/slide3.xml><?xml version="1.0" encoding="utf-8"?>
+<p:sld xmlns:a="http://schemas.openxmlformats.org/drawingml/2006/main" xmlns:r="http://schemas.openxmlformats.org/officeDocument/2006/relationships" xmlns:p="http://schemas.openxmlformats.org/presentationml/2006/main">
+  <p:cSld>
+    <p:spTree>
+      <p:nvGrpSpPr>
+        <p:cNvPr id="1" name=""/>
+        <p:cNvGrpSpPr/>
+        <p:nvPr/>
+      </p:nvGrpSpPr>
+      <p:grpSpPr>
+        <a:xfrm>
+          <a:off x="0" y="0"/>
+          <a:ext cx="0" cy="0"/>
+          <a:chOff x="0" y="0"/>
+          <a:chExt cx="0" cy="0"/>
+        </a:xfrm>
+      </p:grpSpPr>
+      <p:sp>
+        <p:nvSpPr>
+          <p:cNvPr id="4" name="Rectangle 3">
+            <a:extLst>
+              <a:ext uri="{FF2B5EF4-FFF2-40B4-BE49-F238E27FC236}">
+                <a16:creationId xmlns:a16="http://schemas.microsoft.com/office/drawing/2014/main" id="{39297C41-66FA-4859-B4BF-9F5A3487F485}"/>
+              </a:ext>
+            </a:extLst>
+          </p:cNvPr>
+          <p:cNvSpPr/>
+          <p:nvPr/>
+        </p:nvSpPr>
+        <p:spPr>
+          <a:xfrm>
+            <a:off x="3157632" y="1753506"/>
+            <a:ext cx="5876729" cy="3350985"/>
+          </a:xfrm>
+          <a:prstGeom prst="rect">
+            <a:avLst/>
+          </a:prstGeom>
+          <a:solidFill>
+            <a:schemeClr val="accent5">
+              <a:lumMod val="20000"/>
+              <a:lumOff val="80000"/>
+            </a:schemeClr>
+          </a:solidFill>
+        </p:spPr>
+        <p:style>
+          <a:lnRef idx="2">
+            <a:schemeClr val="accent1">
+              <a:shade val="50000"/>
+            </a:schemeClr>
+          </a:lnRef>
+          <a:fillRef idx="1">
+            <a:schemeClr val="accent1"/>
+          </a:fillRef>
+          <a:effectRef idx="0">
+            <a:schemeClr val="accent1"/>
+          </a:effectRef>
+          <a:fontRef idx="minor">
+            <a:schemeClr val="lt1"/>
+          </a:fontRef>
+        </p:style>
+        <p:txBody>
+          <a:bodyPr rtlCol="0" anchor="ctr"/>
+          <a:lstStyle/>
+          <a:p>
+            <a:pPr algn="ctr"/>
+            <a:endParaRPr lang="en-US" dirty="0"/>
+          </a:p>
+        </p:txBody>
+      </p:sp>
+      <p:sp>
+        <p:nvSpPr>
+          <p:cNvPr id="6" name="TextBox 5">
+            <a:extLst>
+              <a:ext uri="{FF2B5EF4-FFF2-40B4-BE49-F238E27FC236}">
+                <a16:creationId xmlns:a16="http://schemas.microsoft.com/office/drawing/2014/main" id="{5D866BAD-73D5-4E6C-98E3-8F6F41E99FA7}"/>
+              </a:ext>
+            </a:extLst>
+          </p:cNvPr>
+          <p:cNvSpPr txBox="1"/>
+          <p:nvPr/>
+        </p:nvSpPr>
+        <p:spPr>
+          <a:xfrm>
+            <a:off x="5399203" y="1895080"/>
+            <a:ext cx="1393585" cy="369332"/>
+          </a:xfrm>
+          <a:prstGeom prst="rect">
+            <a:avLst/>
+          </a:prstGeom>
+          <a:noFill/>
+        </p:spPr>
+        <p:txBody>
+          <a:bodyPr wrap="square" rtlCol="0">
+            <a:spAutoFit/>
+          </a:bodyPr>
+          <a:lstStyle/>
+          <a:p>
+            <a:r>
+              <a:rPr lang="en-US" dirty="0">
+                <a:solidFill>
+                  <a:schemeClr val="tx2"/>
+                </a:solidFill>
+              </a:rPr>
+              <a:t>ĐĂNG NHẬP</a:t>
+            </a:r>
+          </a:p>
+        </p:txBody>
+      </p:sp>
+      <p:sp>
+        <p:nvSpPr>
+          <p:cNvPr id="9" name="Rectangle: Rounded Corners 8">
+            <a:extLst>
+              <a:ext uri="{FF2B5EF4-FFF2-40B4-BE49-F238E27FC236}">
+                <a16:creationId xmlns:a16="http://schemas.microsoft.com/office/drawing/2014/main" id="{91F3BC59-1E56-4433-81AF-2CEAAE8621E1}"/>
+              </a:ext>
+            </a:extLst>
+          </p:cNvPr>
+          <p:cNvSpPr/>
+          <p:nvPr/>
+        </p:nvSpPr>
+        <p:spPr>
+          <a:xfrm>
+            <a:off x="4271596" y="3941180"/>
+            <a:ext cx="3648808" cy="510833"/>
+          </a:xfrm>
+          <a:prstGeom prst="roundRect">
+            <a:avLst/>
+          </a:prstGeom>
+          <a:solidFill>
+            <a:schemeClr val="accent6">
+              <a:lumMod val="40000"/>
+              <a:lumOff val="60000"/>
+            </a:schemeClr>
+          </a:solidFill>
+          <a:scene3d>
+            <a:camera prst="orthographicFront"/>
+            <a:lightRig rig="threePt" dir="t"/>
+          </a:scene3d>
+          <a:sp3d>
+            <a:bevelT w="38100" h="38100" prst="angle"/>
+          </a:sp3d>
+        </p:spPr>
+        <p:style>
+          <a:lnRef idx="2">
+            <a:schemeClr val="accent1">
+              <a:shade val="50000"/>
+            </a:schemeClr>
+          </a:lnRef>
+          <a:fillRef idx="1">
+            <a:schemeClr val="accent1"/>
+          </a:fillRef>
+          <a:effectRef idx="0">
+            <a:schemeClr val="accent1"/>
+          </a:effectRef>
+          <a:fontRef idx="minor">
+            <a:schemeClr val="lt1"/>
+          </a:fontRef>
+        </p:style>
+        <p:txBody>
+          <a:bodyPr rtlCol="0" anchor="ctr"/>
+          <a:lstStyle/>
+          <a:p>
+            <a:pPr algn="ctr"/>
+            <a:r>
+              <a:rPr lang="vi-VN" dirty="0">
+                <a:solidFill>
+                  <a:schemeClr val="tx2"/>
+                </a:solidFill>
+              </a:rPr>
+              <a:t>Login</a:t>
+            </a:r>
+            <a:endParaRPr lang="en-US" dirty="0">
+              <a:solidFill>
+                <a:schemeClr val="tx2"/>
+              </a:solidFill>
+            </a:endParaRPr>
+          </a:p>
+        </p:txBody>
+      </p:sp>
+      <p:sp>
+        <p:nvSpPr>
+          <p:cNvPr id="10" name="TextBox 9">
+            <a:extLst>
+              <a:ext uri="{FF2B5EF4-FFF2-40B4-BE49-F238E27FC236}">
+                <a16:creationId xmlns:a16="http://schemas.microsoft.com/office/drawing/2014/main" id="{3115243B-F508-4C91-9EFD-E603E6F20542}"/>
+              </a:ext>
+            </a:extLst>
+          </p:cNvPr>
+          <p:cNvSpPr txBox="1"/>
+          <p:nvPr/>
+        </p:nvSpPr>
+        <p:spPr>
+          <a:xfrm>
+            <a:off x="5367700" y="4624363"/>
+            <a:ext cx="1456595" cy="307777"/>
+          </a:xfrm>
+          <a:prstGeom prst="rect">
+            <a:avLst/>
+          </a:prstGeom>
+          <a:noFill/>
+        </p:spPr>
+        <p:txBody>
+          <a:bodyPr wrap="square" rtlCol="0">
+            <a:spAutoFit/>
+          </a:bodyPr>
+          <a:lstStyle/>
+          <a:p>
+            <a:r>
+              <a:rPr lang="vi-VN" sz="1400" u="sng" dirty="0">
+                <a:solidFill>
+                  <a:schemeClr val="tx2"/>
+                </a:solidFill>
+              </a:rPr>
+              <a:t>Quên mật khẩu</a:t>
+            </a:r>
+            <a:endParaRPr lang="en-US" sz="1400" u="sng" dirty="0">
+              <a:solidFill>
+                <a:schemeClr val="tx2"/>
+              </a:solidFill>
+            </a:endParaRPr>
+          </a:p>
+        </p:txBody>
+      </p:sp>
+      <p:sp>
+        <p:nvSpPr>
+          <p:cNvPr id="13" name="Rectangle: Rounded Corners 12">
+            <a:extLst>
+              <a:ext uri="{FF2B5EF4-FFF2-40B4-BE49-F238E27FC236}">
+                <a16:creationId xmlns:a16="http://schemas.microsoft.com/office/drawing/2014/main" id="{D5255CCB-47C1-4FA7-86AC-02C3D3D8B3B3}"/>
+              </a:ext>
+            </a:extLst>
+          </p:cNvPr>
+          <p:cNvSpPr/>
+          <p:nvPr/>
+        </p:nvSpPr>
+        <p:spPr>
+          <a:xfrm>
+            <a:off x="4271591" y="3173580"/>
+            <a:ext cx="3648808" cy="510833"/>
+          </a:xfrm>
+          <a:prstGeom prst="roundRect">
+            <a:avLst/>
+          </a:prstGeom>
+          <a:solidFill>
+            <a:srgbClr val="FBD7D7"/>
+          </a:solidFill>
+          <a:ln>
+            <a:solidFill>
+              <a:srgbClr val="B20C0C"/>
+            </a:solidFill>
+          </a:ln>
+        </p:spPr>
+        <p:style>
+          <a:lnRef idx="2">
+            <a:schemeClr val="accent1">
+              <a:shade val="50000"/>
+            </a:schemeClr>
+          </a:lnRef>
+          <a:fillRef idx="1">
+            <a:schemeClr val="accent1"/>
+          </a:fillRef>
+          <a:effectRef idx="0">
+            <a:schemeClr val="accent1"/>
+          </a:effectRef>
+          <a:fontRef idx="minor">
+            <a:schemeClr val="lt1"/>
+          </a:fontRef>
+        </p:style>
+        <p:txBody>
+          <a:bodyPr rtlCol="0" anchor="ctr"/>
+          <a:lstStyle/>
+          <a:p>
+            <a:pPr algn="ctr"/>
+            <a:endParaRPr lang="en-US"/>
+          </a:p>
+        </p:txBody>
+      </p:sp>
+      <p:sp>
+        <p:nvSpPr>
+          <p:cNvPr id="14" name="Rectangle: Rounded Corners 13">
+            <a:extLst>
+              <a:ext uri="{FF2B5EF4-FFF2-40B4-BE49-F238E27FC236}">
+                <a16:creationId xmlns:a16="http://schemas.microsoft.com/office/drawing/2014/main" id="{A83DCB03-EB53-46B7-B8E6-A29DF49076DD}"/>
+              </a:ext>
+            </a:extLst>
+          </p:cNvPr>
+          <p:cNvSpPr/>
+          <p:nvPr/>
+        </p:nvSpPr>
+        <p:spPr>
+          <a:xfrm>
+            <a:off x="4271591" y="2405980"/>
+            <a:ext cx="3648808" cy="510833"/>
+          </a:xfrm>
+          <a:prstGeom prst="roundRect">
+            <a:avLst/>
+          </a:prstGeom>
+          <a:solidFill>
+            <a:schemeClr val="bg1"/>
+          </a:solidFill>
+        </p:spPr>
+        <p:style>
+          <a:lnRef idx="2">
+            <a:schemeClr val="accent1">
+              <a:shade val="50000"/>
+            </a:schemeClr>
+          </a:lnRef>
+          <a:fillRef idx="1">
+            <a:schemeClr val="accent1"/>
+          </a:fillRef>
+          <a:effectRef idx="0">
+            <a:schemeClr val="accent1"/>
+          </a:effectRef>
+          <a:fontRef idx="minor">
+            <a:schemeClr val="lt1"/>
+          </a:fontRef>
+        </p:style>
+        <p:txBody>
+          <a:bodyPr rtlCol="0" anchor="ctr"/>
+          <a:lstStyle/>
+          <a:p>
+            <a:pPr algn="ctr"/>
+            <a:endParaRPr lang="en-US"/>
+          </a:p>
+        </p:txBody>
+      </p:sp>
+      <p:sp>
+        <p:nvSpPr>
+          <p:cNvPr id="11" name="TextBox 10">
+            <a:extLst>
+              <a:ext uri="{FF2B5EF4-FFF2-40B4-BE49-F238E27FC236}">
+                <a16:creationId xmlns:a16="http://schemas.microsoft.com/office/drawing/2014/main" id="{49A1C479-B19B-4562-A60E-9B3EB5530ED0}"/>
+              </a:ext>
+            </a:extLst>
+          </p:cNvPr>
+          <p:cNvSpPr txBox="1"/>
+          <p:nvPr/>
+        </p:nvSpPr>
+        <p:spPr>
+          <a:xfrm>
+            <a:off x="4385891" y="3275107"/>
+            <a:ext cx="2683124" cy="307777"/>
+          </a:xfrm>
+          <a:prstGeom prst="rect">
+            <a:avLst/>
+          </a:prstGeom>
+          <a:noFill/>
+        </p:spPr>
+        <p:txBody>
+          <a:bodyPr wrap="square" rtlCol="0">
+            <a:spAutoFit/>
+          </a:bodyPr>
+          <a:lstStyle/>
+          <a:p>
+            <a:r>
+              <a:rPr lang="en-US" sz="1400" dirty="0" err="1">
+                <a:solidFill>
+                  <a:srgbClr val="E67474"/>
+                </a:solidFill>
+                <a:latin typeface="Arial" panose="020B0604020202020204" pitchFamily="34" charset="0"/>
+                <a:cs typeface="Arial" panose="020B0604020202020204" pitchFamily="34" charset="0"/>
+              </a:rPr>
+              <a:t>Mật</a:t>
+            </a:r>
+            <a:r>
+              <a:rPr lang="en-US" sz="1400" dirty="0">
+                <a:solidFill>
+                  <a:srgbClr val="E67474"/>
+                </a:solidFill>
+                <a:latin typeface="Arial" panose="020B0604020202020204" pitchFamily="34" charset="0"/>
+                <a:cs typeface="Arial" panose="020B0604020202020204" pitchFamily="34" charset="0"/>
+              </a:rPr>
+              <a:t> </a:t>
+            </a:r>
+            <a:r>
+              <a:rPr lang="en-US" sz="1400" dirty="0" err="1">
+                <a:solidFill>
+                  <a:srgbClr val="E67474"/>
+                </a:solidFill>
+                <a:latin typeface="Arial" panose="020B0604020202020204" pitchFamily="34" charset="0"/>
+                <a:cs typeface="Arial" panose="020B0604020202020204" pitchFamily="34" charset="0"/>
+              </a:rPr>
+              <a:t>khẩu</a:t>
+            </a:r>
+            <a:r>
+              <a:rPr lang="en-US" sz="1400" dirty="0">
+                <a:solidFill>
+                  <a:srgbClr val="E67474"/>
+                </a:solidFill>
+                <a:latin typeface="Arial" panose="020B0604020202020204" pitchFamily="34" charset="0"/>
+                <a:cs typeface="Arial" panose="020B0604020202020204" pitchFamily="34" charset="0"/>
+              </a:rPr>
+              <a:t> </a:t>
+            </a:r>
+            <a:r>
+              <a:rPr lang="en-US" sz="1400" dirty="0" err="1">
+                <a:solidFill>
+                  <a:srgbClr val="E67474"/>
+                </a:solidFill>
+                <a:latin typeface="Arial" panose="020B0604020202020204" pitchFamily="34" charset="0"/>
+                <a:cs typeface="Arial" panose="020B0604020202020204" pitchFamily="34" charset="0"/>
+              </a:rPr>
+              <a:t>không</a:t>
+            </a:r>
+            <a:r>
+              <a:rPr lang="en-US" sz="1400" dirty="0">
+                <a:solidFill>
+                  <a:srgbClr val="E67474"/>
+                </a:solidFill>
+                <a:latin typeface="Arial" panose="020B0604020202020204" pitchFamily="34" charset="0"/>
+                <a:cs typeface="Arial" panose="020B0604020202020204" pitchFamily="34" charset="0"/>
+              </a:rPr>
+              <a:t> </a:t>
+            </a:r>
+            <a:r>
+              <a:rPr lang="en-US" sz="1400" dirty="0" err="1">
+                <a:solidFill>
+                  <a:srgbClr val="E67474"/>
+                </a:solidFill>
+                <a:latin typeface="Arial" panose="020B0604020202020204" pitchFamily="34" charset="0"/>
+                <a:cs typeface="Arial" panose="020B0604020202020204" pitchFamily="34" charset="0"/>
+              </a:rPr>
+              <a:t>đúng</a:t>
+            </a:r>
+            <a:endParaRPr lang="en-US" sz="1400" dirty="0">
+              <a:solidFill>
+                <a:srgbClr val="E67474"/>
+              </a:solidFill>
+              <a:latin typeface="Arial" panose="020B0604020202020204" pitchFamily="34" charset="0"/>
+              <a:cs typeface="Arial" panose="020B0604020202020204" pitchFamily="34" charset="0"/>
+            </a:endParaRPr>
+          </a:p>
+        </p:txBody>
+      </p:sp>
+      <p:sp>
+        <p:nvSpPr>
+          <p:cNvPr id="12" name="TextBox 11">
+            <a:extLst>
+              <a:ext uri="{FF2B5EF4-FFF2-40B4-BE49-F238E27FC236}">
+                <a16:creationId xmlns:a16="http://schemas.microsoft.com/office/drawing/2014/main" id="{80A12396-906F-4F82-861F-8F2FA3FF7D61}"/>
+              </a:ext>
+            </a:extLst>
+          </p:cNvPr>
+          <p:cNvSpPr txBox="1"/>
+          <p:nvPr/>
+        </p:nvSpPr>
+        <p:spPr>
+          <a:xfrm>
+            <a:off x="4385891" y="2507508"/>
+            <a:ext cx="1863970" cy="307777"/>
+          </a:xfrm>
+          <a:prstGeom prst="rect">
+            <a:avLst/>
+          </a:prstGeom>
+          <a:noFill/>
+        </p:spPr>
+        <p:txBody>
+          <a:bodyPr wrap="square" rtlCol="0">
+            <a:spAutoFit/>
+          </a:bodyPr>
+          <a:lstStyle/>
+          <a:p>
+            <a:r>
+              <a:rPr lang="en-US" sz="1400" dirty="0" err="1">
+                <a:solidFill>
+                  <a:schemeClr val="accent1">
+                    <a:lumMod val="40000"/>
+                    <a:lumOff val="60000"/>
+                  </a:schemeClr>
+                </a:solidFill>
+                <a:latin typeface="Arial" panose="020B0604020202020204" pitchFamily="34" charset="0"/>
+                <a:cs typeface="Arial" panose="020B0604020202020204" pitchFamily="34" charset="0"/>
+              </a:rPr>
+              <a:t>Tên</a:t>
+            </a:r>
+            <a:r>
+              <a:rPr lang="en-US" sz="1400" dirty="0">
+                <a:solidFill>
+                  <a:schemeClr val="accent1">
+                    <a:lumMod val="40000"/>
+                    <a:lumOff val="60000"/>
+                  </a:schemeClr>
+                </a:solidFill>
+                <a:latin typeface="Arial" panose="020B0604020202020204" pitchFamily="34" charset="0"/>
+                <a:cs typeface="Arial" panose="020B0604020202020204" pitchFamily="34" charset="0"/>
+              </a:rPr>
+              <a:t> </a:t>
+            </a:r>
+            <a:r>
+              <a:rPr lang="en-US" sz="1400" dirty="0" err="1">
+                <a:solidFill>
+                  <a:schemeClr val="accent1">
+                    <a:lumMod val="40000"/>
+                    <a:lumOff val="60000"/>
+                  </a:schemeClr>
+                </a:solidFill>
+                <a:latin typeface="Arial" panose="020B0604020202020204" pitchFamily="34" charset="0"/>
+                <a:cs typeface="Arial" panose="020B0604020202020204" pitchFamily="34" charset="0"/>
+              </a:rPr>
+              <a:t>đăng</a:t>
+            </a:r>
+            <a:r>
+              <a:rPr lang="en-US" sz="1400" dirty="0">
+                <a:solidFill>
+                  <a:schemeClr val="accent1">
+                    <a:lumMod val="40000"/>
+                    <a:lumOff val="60000"/>
+                  </a:schemeClr>
+                </a:solidFill>
+                <a:latin typeface="Arial" panose="020B0604020202020204" pitchFamily="34" charset="0"/>
+                <a:cs typeface="Arial" panose="020B0604020202020204" pitchFamily="34" charset="0"/>
+              </a:rPr>
+              <a:t> </a:t>
+            </a:r>
+            <a:r>
+              <a:rPr lang="en-US" sz="1400" dirty="0" err="1">
+                <a:solidFill>
+                  <a:schemeClr val="accent1">
+                    <a:lumMod val="40000"/>
+                    <a:lumOff val="60000"/>
+                  </a:schemeClr>
+                </a:solidFill>
+                <a:latin typeface="Arial" panose="020B0604020202020204" pitchFamily="34" charset="0"/>
+                <a:cs typeface="Arial" panose="020B0604020202020204" pitchFamily="34" charset="0"/>
+              </a:rPr>
+              <a:t>nhập</a:t>
+            </a:r>
+            <a:endParaRPr lang="en-US" sz="1400" dirty="0">
+              <a:solidFill>
+                <a:schemeClr val="accent1">
+                  <a:lumMod val="40000"/>
+                  <a:lumOff val="60000"/>
+                </a:schemeClr>
+              </a:solidFill>
+              <a:latin typeface="Arial" panose="020B0604020202020204" pitchFamily="34" charset="0"/>
+              <a:cs typeface="Arial" panose="020B0604020202020204" pitchFamily="34" charset="0"/>
+            </a:endParaRPr>
+          </a:p>
+        </p:txBody>
+      </p:sp>
+    </p:spTree>
+    <p:extLst>
+      <p:ext uri="{BB962C8B-B14F-4D97-AF65-F5344CB8AC3E}">
+        <p14:creationId xmlns:p14="http://schemas.microsoft.com/office/powerpoint/2010/main" val="1989956914"/>
+      </p:ext>
+    </p:extLst>
+  </p:cSld>
+  <p:clrMapOvr>
+    <a:masterClrMapping/>
+  </p:clrMapOvr>
+</p:sld>
+</file>
+
+<file path=ppt/slides/slide4.xml><?xml version="1.0" encoding="utf-8"?>
 <p:sld xmlns:a="http://schemas.openxmlformats.org/drawingml/2006/main" xmlns:r="http://schemas.openxmlformats.org/officeDocument/2006/relationships" xmlns:p="http://schemas.openxmlformats.org/presentationml/2006/main">
   <p:cSld>
     <p:spTree>

</xml_diff>

<commit_message>
Phiên bản đầu của Thùy
abcxyz
</commit_message>
<xml_diff>
--- a/login.pptx
+++ b/login.pptx
@@ -6,9 +6,7 @@
   </p:sldMasterIdLst>
   <p:sldIdLst>
     <p:sldId id="256" r:id="rId2"/>
-    <p:sldId id="258" r:id="rId3"/>
-    <p:sldId id="259" r:id="rId4"/>
-    <p:sldId id="257" r:id="rId5"/>
+    <p:sldId id="257" r:id="rId3"/>
   </p:sldIdLst>
   <p:sldSz cx="12192000" cy="6858000"/>
   <p:notesSz cx="6858000" cy="9144000"/>
@@ -262,7 +260,7 @@
           <a:p>
             <a:fld id="{9E46A277-767F-43FC-B4C2-E33FE12B25BD}" type="datetimeFigureOut">
               <a:rPr lang="en-US" smtClean="0"/>
-              <a:t>2018-04-06</a:t>
+              <a:t>06-Apr-18</a:t>
             </a:fld>
             <a:endParaRPr lang="en-US"/>
           </a:p>
@@ -460,7 +458,7 @@
           <a:p>
             <a:fld id="{9E46A277-767F-43FC-B4C2-E33FE12B25BD}" type="datetimeFigureOut">
               <a:rPr lang="en-US" smtClean="0"/>
-              <a:t>2018-04-06</a:t>
+              <a:t>06-Apr-18</a:t>
             </a:fld>
             <a:endParaRPr lang="en-US"/>
           </a:p>
@@ -668,7 +666,7 @@
           <a:p>
             <a:fld id="{9E46A277-767F-43FC-B4C2-E33FE12B25BD}" type="datetimeFigureOut">
               <a:rPr lang="en-US" smtClean="0"/>
-              <a:t>2018-04-06</a:t>
+              <a:t>06-Apr-18</a:t>
             </a:fld>
             <a:endParaRPr lang="en-US"/>
           </a:p>
@@ -866,7 +864,7 @@
           <a:p>
             <a:fld id="{9E46A277-767F-43FC-B4C2-E33FE12B25BD}" type="datetimeFigureOut">
               <a:rPr lang="en-US" smtClean="0"/>
-              <a:t>2018-04-06</a:t>
+              <a:t>06-Apr-18</a:t>
             </a:fld>
             <a:endParaRPr lang="en-US"/>
           </a:p>
@@ -1141,7 +1139,7 @@
           <a:p>
             <a:fld id="{9E46A277-767F-43FC-B4C2-E33FE12B25BD}" type="datetimeFigureOut">
               <a:rPr lang="en-US" smtClean="0"/>
-              <a:t>2018-04-06</a:t>
+              <a:t>06-Apr-18</a:t>
             </a:fld>
             <a:endParaRPr lang="en-US"/>
           </a:p>
@@ -1406,7 +1404,7 @@
           <a:p>
             <a:fld id="{9E46A277-767F-43FC-B4C2-E33FE12B25BD}" type="datetimeFigureOut">
               <a:rPr lang="en-US" smtClean="0"/>
-              <a:t>2018-04-06</a:t>
+              <a:t>06-Apr-18</a:t>
             </a:fld>
             <a:endParaRPr lang="en-US"/>
           </a:p>
@@ -1818,7 +1816,7 @@
           <a:p>
             <a:fld id="{9E46A277-767F-43FC-B4C2-E33FE12B25BD}" type="datetimeFigureOut">
               <a:rPr lang="en-US" smtClean="0"/>
-              <a:t>2018-04-06</a:t>
+              <a:t>06-Apr-18</a:t>
             </a:fld>
             <a:endParaRPr lang="en-US"/>
           </a:p>
@@ -1959,7 +1957,7 @@
           <a:p>
             <a:fld id="{9E46A277-767F-43FC-B4C2-E33FE12B25BD}" type="datetimeFigureOut">
               <a:rPr lang="en-US" smtClean="0"/>
-              <a:t>2018-04-06</a:t>
+              <a:t>06-Apr-18</a:t>
             </a:fld>
             <a:endParaRPr lang="en-US"/>
           </a:p>
@@ -2072,7 +2070,7 @@
           <a:p>
             <a:fld id="{9E46A277-767F-43FC-B4C2-E33FE12B25BD}" type="datetimeFigureOut">
               <a:rPr lang="en-US" smtClean="0"/>
-              <a:t>2018-04-06</a:t>
+              <a:t>06-Apr-18</a:t>
             </a:fld>
             <a:endParaRPr lang="en-US"/>
           </a:p>
@@ -2383,7 +2381,7 @@
           <a:p>
             <a:fld id="{9E46A277-767F-43FC-B4C2-E33FE12B25BD}" type="datetimeFigureOut">
               <a:rPr lang="en-US" smtClean="0"/>
-              <a:t>2018-04-06</a:t>
+              <a:t>06-Apr-18</a:t>
             </a:fld>
             <a:endParaRPr lang="en-US"/>
           </a:p>
@@ -2671,7 +2669,7 @@
           <a:p>
             <a:fld id="{9E46A277-767F-43FC-B4C2-E33FE12B25BD}" type="datetimeFigureOut">
               <a:rPr lang="en-US" smtClean="0"/>
-              <a:t>2018-04-06</a:t>
+              <a:t>06-Apr-18</a:t>
             </a:fld>
             <a:endParaRPr lang="en-US"/>
           </a:p>
@@ -2912,7 +2910,7 @@
           <a:p>
             <a:fld id="{9E46A277-767F-43FC-B4C2-E33FE12B25BD}" type="datetimeFigureOut">
               <a:rPr lang="en-US" smtClean="0"/>
-              <a:t>2018-04-06</a:t>
+              <a:t>06-Apr-18</a:t>
             </a:fld>
             <a:endParaRPr lang="en-US"/>
           </a:p>
@@ -3315,6 +3313,21 @@
 <file path=ppt/slides/slide1.xml><?xml version="1.0" encoding="utf-8"?>
 <p:sld xmlns:a="http://schemas.openxmlformats.org/drawingml/2006/main" xmlns:r="http://schemas.openxmlformats.org/officeDocument/2006/relationships" xmlns:p="http://schemas.openxmlformats.org/presentationml/2006/main">
   <p:cSld>
+    <p:bg>
+      <p:bgPr>
+        <a:blipFill dpi="0" rotWithShape="1">
+          <a:blip r:embed="rId2">
+            <a:alphaModFix amt="77000"/>
+            <a:lum/>
+          </a:blip>
+          <a:srcRect/>
+          <a:stretch>
+            <a:fillRect t="10000" b="8000"/>
+          </a:stretch>
+        </a:blipFill>
+        <a:effectLst/>
+      </p:bgPr>
+    </p:bg>
     <p:spTree>
       <p:nvGrpSpPr>
         <p:cNvPr id="1" name=""/>
@@ -3331,72 +3344,20 @@
       </p:grpSpPr>
       <p:sp>
         <p:nvSpPr>
-          <p:cNvPr id="4" name="Rectangle 3">
-            <a:extLst>
-              <a:ext uri="{FF2B5EF4-FFF2-40B4-BE49-F238E27FC236}">
-                <a16:creationId xmlns:a16="http://schemas.microsoft.com/office/drawing/2014/main" id="{39297C41-66FA-4859-B4BF-9F5A3487F485}"/>
-              </a:ext>
-            </a:extLst>
-          </p:cNvPr>
-          <p:cNvSpPr/>
+          <p:cNvPr id="6" name="TextBox 5">
+            <a:extLst>
+              <a:ext uri="{FF2B5EF4-FFF2-40B4-BE49-F238E27FC236}">
+                <a16:creationId xmlns:a16="http://schemas.microsoft.com/office/drawing/2014/main" id="{5D866BAD-73D5-4E6C-98E3-8F6F41E99FA7}"/>
+              </a:ext>
+            </a:extLst>
+          </p:cNvPr>
+          <p:cNvSpPr txBox="1"/>
           <p:nvPr/>
         </p:nvSpPr>
         <p:spPr>
           <a:xfrm>
-            <a:off x="3157632" y="1753506"/>
-            <a:ext cx="5876729" cy="3350985"/>
-          </a:xfrm>
-          <a:prstGeom prst="rect">
-            <a:avLst/>
-          </a:prstGeom>
-          <a:solidFill>
-            <a:schemeClr val="accent5">
-              <a:lumMod val="20000"/>
-              <a:lumOff val="80000"/>
-            </a:schemeClr>
-          </a:solidFill>
-        </p:spPr>
-        <p:style>
-          <a:lnRef idx="2">
-            <a:schemeClr val="accent1">
-              <a:shade val="50000"/>
-            </a:schemeClr>
-          </a:lnRef>
-          <a:fillRef idx="1">
-            <a:schemeClr val="accent1"/>
-          </a:fillRef>
-          <a:effectRef idx="0">
-            <a:schemeClr val="accent1"/>
-          </a:effectRef>
-          <a:fontRef idx="minor">
-            <a:schemeClr val="lt1"/>
-          </a:fontRef>
-        </p:style>
-        <p:txBody>
-          <a:bodyPr rtlCol="0" anchor="ctr"/>
-          <a:lstStyle/>
-          <a:p>
-            <a:pPr algn="ctr"/>
-            <a:endParaRPr lang="en-US" dirty="0"/>
-          </a:p>
-        </p:txBody>
-      </p:sp>
-      <p:sp>
-        <p:nvSpPr>
-          <p:cNvPr id="6" name="TextBox 5">
-            <a:extLst>
-              <a:ext uri="{FF2B5EF4-FFF2-40B4-BE49-F238E27FC236}">
-                <a16:creationId xmlns:a16="http://schemas.microsoft.com/office/drawing/2014/main" id="{5D866BAD-73D5-4E6C-98E3-8F6F41E99FA7}"/>
-              </a:ext>
-            </a:extLst>
-          </p:cNvPr>
-          <p:cNvSpPr txBox="1"/>
-          <p:nvPr/>
-        </p:nvSpPr>
-        <p:spPr>
-          <a:xfrm>
-            <a:off x="5399203" y="1895080"/>
-            <a:ext cx="1393585" cy="369332"/>
+            <a:off x="4937943" y="1617756"/>
+            <a:ext cx="3267075" cy="369332"/>
           </a:xfrm>
           <a:prstGeom prst="rect">
             <a:avLst/>
@@ -3410,12 +3371,13 @@
           <a:lstStyle/>
           <a:p>
             <a:r>
-              <a:rPr lang="en-US" dirty="0">
+              <a:rPr lang="en-US">
                 <a:solidFill>
-                  <a:schemeClr val="tx2"/>
+                  <a:srgbClr val="FFFF00"/>
                 </a:solidFill>
+                <a:latin typeface="Blackoak Std" panose="04050907060602020202" pitchFamily="82" charset="0"/>
               </a:rPr>
-              <a:t>ĐĂNG NHẬP</a:t>
+              <a:t>SIGN IN</a:t>
             </a:r>
           </a:p>
         </p:txBody>
@@ -3434,8 +3396,8 @@
         </p:nvSpPr>
         <p:spPr>
           <a:xfrm>
-            <a:off x="4271596" y="2405986"/>
-            <a:ext cx="3648808" cy="510833"/>
+            <a:off x="3897921" y="2171754"/>
+            <a:ext cx="4396154" cy="615462"/>
           </a:xfrm>
           <a:prstGeom prst="roundRect">
             <a:avLst/>
@@ -3483,8 +3445,8 @@
         </p:nvSpPr>
         <p:spPr>
           <a:xfrm>
-            <a:off x="4271596" y="3173583"/>
-            <a:ext cx="3648808" cy="510833"/>
+            <a:off x="3897921" y="2989545"/>
+            <a:ext cx="4396154" cy="615462"/>
           </a:xfrm>
           <a:prstGeom prst="roundRect">
             <a:avLst/>
@@ -3532,8 +3494,8 @@
         </p:nvSpPr>
         <p:spPr>
           <a:xfrm>
-            <a:off x="4271596" y="3941180"/>
-            <a:ext cx="3648808" cy="510833"/>
+            <a:off x="3897921" y="3807336"/>
+            <a:ext cx="4396154" cy="615462"/>
           </a:xfrm>
           <a:prstGeom prst="roundRect">
             <a:avLst/>
@@ -3542,251 +3504,6 @@
             <a:schemeClr val="accent6">
               <a:lumMod val="40000"/>
               <a:lumOff val="60000"/>
-            </a:schemeClr>
-          </a:solidFill>
-          <a:scene3d>
-            <a:camera prst="orthographicFront"/>
-            <a:lightRig rig="threePt" dir="t"/>
-          </a:scene3d>
-          <a:sp3d>
-            <a:bevelT w="38100" h="38100" prst="angle"/>
-          </a:sp3d>
-        </p:spPr>
-        <p:style>
-          <a:lnRef idx="2">
-            <a:schemeClr val="accent1">
-              <a:shade val="50000"/>
-            </a:schemeClr>
-          </a:lnRef>
-          <a:fillRef idx="1">
-            <a:schemeClr val="accent1"/>
-          </a:fillRef>
-          <a:effectRef idx="0">
-            <a:schemeClr val="accent1"/>
-          </a:effectRef>
-          <a:fontRef idx="minor">
-            <a:schemeClr val="lt1"/>
-          </a:fontRef>
-        </p:style>
-        <p:txBody>
-          <a:bodyPr rtlCol="0" anchor="ctr"/>
-          <a:lstStyle/>
-          <a:p>
-            <a:pPr algn="ctr"/>
-            <a:r>
-              <a:rPr lang="vi-VN" dirty="0">
-                <a:solidFill>
-                  <a:schemeClr val="tx2"/>
-                </a:solidFill>
-              </a:rPr>
-              <a:t>Login</a:t>
-            </a:r>
-            <a:endParaRPr lang="en-US" dirty="0">
-              <a:solidFill>
-                <a:schemeClr val="tx2"/>
-              </a:solidFill>
-            </a:endParaRPr>
-          </a:p>
-        </p:txBody>
-      </p:sp>
-      <p:sp>
-        <p:nvSpPr>
-          <p:cNvPr id="10" name="TextBox 9">
-            <a:extLst>
-              <a:ext uri="{FF2B5EF4-FFF2-40B4-BE49-F238E27FC236}">
-                <a16:creationId xmlns:a16="http://schemas.microsoft.com/office/drawing/2014/main" id="{3115243B-F508-4C91-9EFD-E603E6F20542}"/>
-              </a:ext>
-            </a:extLst>
-          </p:cNvPr>
-          <p:cNvSpPr txBox="1"/>
-          <p:nvPr/>
-        </p:nvSpPr>
-        <p:spPr>
-          <a:xfrm>
-            <a:off x="5367700" y="4624363"/>
-            <a:ext cx="1456595" cy="307777"/>
-          </a:xfrm>
-          <a:prstGeom prst="rect">
-            <a:avLst/>
-          </a:prstGeom>
-          <a:noFill/>
-        </p:spPr>
-        <p:txBody>
-          <a:bodyPr wrap="square" rtlCol="0">
-            <a:spAutoFit/>
-          </a:bodyPr>
-          <a:lstStyle/>
-          <a:p>
-            <a:r>
-              <a:rPr lang="vi-VN" sz="1400" u="sng" dirty="0">
-                <a:solidFill>
-                  <a:schemeClr val="tx2"/>
-                </a:solidFill>
-              </a:rPr>
-              <a:t>Quên mật khẩu</a:t>
-            </a:r>
-            <a:endParaRPr lang="en-US" sz="1400" u="sng" dirty="0">
-              <a:solidFill>
-                <a:schemeClr val="tx2"/>
-              </a:solidFill>
-            </a:endParaRPr>
-          </a:p>
-        </p:txBody>
-      </p:sp>
-      <p:sp>
-        <p:nvSpPr>
-          <p:cNvPr id="11" name="TextBox 10">
-            <a:extLst>
-              <a:ext uri="{FF2B5EF4-FFF2-40B4-BE49-F238E27FC236}">
-                <a16:creationId xmlns:a16="http://schemas.microsoft.com/office/drawing/2014/main" id="{49A1C479-B19B-4562-A60E-9B3EB5530ED0}"/>
-              </a:ext>
-            </a:extLst>
-          </p:cNvPr>
-          <p:cNvSpPr txBox="1"/>
-          <p:nvPr/>
-        </p:nvSpPr>
-        <p:spPr>
-          <a:xfrm>
-            <a:off x="4385891" y="2507513"/>
-            <a:ext cx="1802423" cy="307777"/>
-          </a:xfrm>
-          <a:prstGeom prst="rect">
-            <a:avLst/>
-          </a:prstGeom>
-          <a:noFill/>
-        </p:spPr>
-        <p:txBody>
-          <a:bodyPr wrap="square" rtlCol="0">
-            <a:spAutoFit/>
-          </a:bodyPr>
-          <a:lstStyle/>
-          <a:p>
-            <a:r>
-              <a:rPr lang="vi-VN" sz="1400" dirty="0">
-                <a:solidFill>
-                  <a:schemeClr val="accent1">
-                    <a:lumMod val="40000"/>
-                    <a:lumOff val="60000"/>
-                  </a:schemeClr>
-                </a:solidFill>
-              </a:rPr>
-              <a:t>Tên đăng nhập</a:t>
-            </a:r>
-            <a:endParaRPr lang="en-US" sz="1400" dirty="0">
-              <a:solidFill>
-                <a:schemeClr val="accent1">
-                  <a:lumMod val="40000"/>
-                  <a:lumOff val="60000"/>
-                </a:schemeClr>
-              </a:solidFill>
-            </a:endParaRPr>
-          </a:p>
-        </p:txBody>
-      </p:sp>
-      <p:sp>
-        <p:nvSpPr>
-          <p:cNvPr id="12" name="TextBox 11">
-            <a:extLst>
-              <a:ext uri="{FF2B5EF4-FFF2-40B4-BE49-F238E27FC236}">
-                <a16:creationId xmlns:a16="http://schemas.microsoft.com/office/drawing/2014/main" id="{80A12396-906F-4F82-861F-8F2FA3FF7D61}"/>
-              </a:ext>
-            </a:extLst>
-          </p:cNvPr>
-          <p:cNvSpPr txBox="1"/>
-          <p:nvPr/>
-        </p:nvSpPr>
-        <p:spPr>
-          <a:xfrm>
-            <a:off x="4385891" y="3275109"/>
-            <a:ext cx="1863970" cy="307777"/>
-          </a:xfrm>
-          <a:prstGeom prst="rect">
-            <a:avLst/>
-          </a:prstGeom>
-          <a:noFill/>
-        </p:spPr>
-        <p:txBody>
-          <a:bodyPr wrap="square" rtlCol="0">
-            <a:spAutoFit/>
-          </a:bodyPr>
-          <a:lstStyle/>
-          <a:p>
-            <a:r>
-              <a:rPr lang="vi-VN" sz="1400" dirty="0">
-                <a:solidFill>
-                  <a:schemeClr val="accent1">
-                    <a:lumMod val="40000"/>
-                    <a:lumOff val="60000"/>
-                  </a:schemeClr>
-                </a:solidFill>
-              </a:rPr>
-              <a:t>Mật khẩu</a:t>
-            </a:r>
-            <a:endParaRPr lang="en-US" sz="1400" dirty="0">
-              <a:solidFill>
-                <a:schemeClr val="accent1">
-                  <a:lumMod val="40000"/>
-                  <a:lumOff val="60000"/>
-                </a:schemeClr>
-              </a:solidFill>
-            </a:endParaRPr>
-          </a:p>
-        </p:txBody>
-      </p:sp>
-    </p:spTree>
-    <p:extLst>
-      <p:ext uri="{BB962C8B-B14F-4D97-AF65-F5344CB8AC3E}">
-        <p14:creationId xmlns:p14="http://schemas.microsoft.com/office/powerpoint/2010/main" val="4185663629"/>
-      </p:ext>
-    </p:extLst>
-  </p:cSld>
-  <p:clrMapOvr>
-    <a:masterClrMapping/>
-  </p:clrMapOvr>
-</p:sld>
-</file>
-
-<file path=ppt/slides/slide2.xml><?xml version="1.0" encoding="utf-8"?>
-<p:sld xmlns:a="http://schemas.openxmlformats.org/drawingml/2006/main" xmlns:r="http://schemas.openxmlformats.org/officeDocument/2006/relationships" xmlns:p="http://schemas.openxmlformats.org/presentationml/2006/main">
-  <p:cSld>
-    <p:spTree>
-      <p:nvGrpSpPr>
-        <p:cNvPr id="1" name=""/>
-        <p:cNvGrpSpPr/>
-        <p:nvPr/>
-      </p:nvGrpSpPr>
-      <p:grpSpPr>
-        <a:xfrm>
-          <a:off x="0" y="0"/>
-          <a:ext cx="0" cy="0"/>
-          <a:chOff x="0" y="0"/>
-          <a:chExt cx="0" cy="0"/>
-        </a:xfrm>
-      </p:grpSpPr>
-      <p:sp>
-        <p:nvSpPr>
-          <p:cNvPr id="4" name="Rectangle 3">
-            <a:extLst>
-              <a:ext uri="{FF2B5EF4-FFF2-40B4-BE49-F238E27FC236}">
-                <a16:creationId xmlns:a16="http://schemas.microsoft.com/office/drawing/2014/main" id="{39297C41-66FA-4859-B4BF-9F5A3487F485}"/>
-              </a:ext>
-            </a:extLst>
-          </p:cNvPr>
-          <p:cNvSpPr/>
-          <p:nvPr/>
-        </p:nvSpPr>
-        <p:spPr>
-          <a:xfrm>
-            <a:off x="3157632" y="1753506"/>
-            <a:ext cx="5876729" cy="3350985"/>
-          </a:xfrm>
-          <a:prstGeom prst="rect">
-            <a:avLst/>
-          </a:prstGeom>
-          <a:solidFill>
-            <a:schemeClr val="accent5">
-              <a:lumMod val="20000"/>
-              <a:lumOff val="80000"/>
             </a:schemeClr>
           </a:solidFill>
         </p:spPr>
@@ -3811,16 +3528,28 @@
           <a:lstStyle/>
           <a:p>
             <a:pPr algn="ctr"/>
-            <a:endParaRPr lang="en-US" dirty="0"/>
-          </a:p>
-        </p:txBody>
-      </p:sp>
-      <p:sp>
-        <p:nvSpPr>
-          <p:cNvPr id="6" name="TextBox 5">
-            <a:extLst>
-              <a:ext uri="{FF2B5EF4-FFF2-40B4-BE49-F238E27FC236}">
-                <a16:creationId xmlns:a16="http://schemas.microsoft.com/office/drawing/2014/main" id="{5D866BAD-73D5-4E6C-98E3-8F6F41E99FA7}"/>
+            <a:r>
+              <a:rPr lang="vi-VN">
+                <a:solidFill>
+                  <a:schemeClr val="tx2"/>
+                </a:solidFill>
+              </a:rPr>
+              <a:t>Login</a:t>
+            </a:r>
+            <a:endParaRPr lang="en-US">
+              <a:solidFill>
+                <a:schemeClr val="tx2"/>
+              </a:solidFill>
+            </a:endParaRPr>
+          </a:p>
+        </p:txBody>
+      </p:sp>
+      <p:sp>
+        <p:nvSpPr>
+          <p:cNvPr id="10" name="TextBox 9">
+            <a:extLst>
+              <a:ext uri="{FF2B5EF4-FFF2-40B4-BE49-F238E27FC236}">
+                <a16:creationId xmlns:a16="http://schemas.microsoft.com/office/drawing/2014/main" id="{3115243B-F508-4C91-9EFD-E603E6F20542}"/>
               </a:ext>
             </a:extLst>
           </p:cNvPr>
@@ -3829,8 +3558,8 @@
         </p:nvSpPr>
         <p:spPr>
           <a:xfrm>
-            <a:off x="5399203" y="1895080"/>
-            <a:ext cx="1393585" cy="369332"/>
+            <a:off x="5367700" y="4721580"/>
+            <a:ext cx="1795100" cy="307777"/>
           </a:xfrm>
           <a:prstGeom prst="rect">
             <a:avLst/>
@@ -3844,22 +3573,395 @@
           <a:lstStyle/>
           <a:p>
             <a:r>
-              <a:rPr lang="en-US" dirty="0">
+              <a:rPr lang="vi-VN" sz="1400" u="sng">
                 <a:solidFill>
                   <a:schemeClr val="tx2"/>
                 </a:solidFill>
               </a:rPr>
-              <a:t>ĐĂNG NHẬP</a:t>
-            </a:r>
-          </a:p>
-        </p:txBody>
-      </p:sp>
-      <p:sp>
-        <p:nvSpPr>
-          <p:cNvPr id="7" name="Rectangle: Rounded Corners 6">
-            <a:extLst>
-              <a:ext uri="{FF2B5EF4-FFF2-40B4-BE49-F238E27FC236}">
-                <a16:creationId xmlns:a16="http://schemas.microsoft.com/office/drawing/2014/main" id="{BFC4D056-A35F-47C7-8F7A-BB2F3DFE7E1B}"/>
+              <a:t>Quên </a:t>
+            </a:r>
+            <a:r>
+              <a:rPr lang="vi-VN" sz="1400" u="sng" err="1">
+                <a:solidFill>
+                  <a:schemeClr val="tx2"/>
+                </a:solidFill>
+              </a:rPr>
+              <a:t>mật</a:t>
+            </a:r>
+            <a:r>
+              <a:rPr lang="vi-VN" sz="1400" u="sng">
+                <a:solidFill>
+                  <a:schemeClr val="tx2"/>
+                </a:solidFill>
+              </a:rPr>
+              <a:t> </a:t>
+            </a:r>
+            <a:r>
+              <a:rPr lang="vi-VN" sz="1400" u="sng" err="1">
+                <a:solidFill>
+                  <a:schemeClr val="tx2"/>
+                </a:solidFill>
+              </a:rPr>
+              <a:t>khẩu</a:t>
+            </a:r>
+            <a:r>
+              <a:rPr lang="en-US" sz="1400" u="sng">
+                <a:solidFill>
+                  <a:schemeClr val="tx2"/>
+                </a:solidFill>
+              </a:rPr>
+              <a:t> ?</a:t>
+            </a:r>
+          </a:p>
+        </p:txBody>
+      </p:sp>
+      <p:sp>
+        <p:nvSpPr>
+          <p:cNvPr id="11" name="TextBox 10">
+            <a:extLst>
+              <a:ext uri="{FF2B5EF4-FFF2-40B4-BE49-F238E27FC236}">
+                <a16:creationId xmlns:a16="http://schemas.microsoft.com/office/drawing/2014/main" id="{49A1C479-B19B-4562-A60E-9B3EB5530ED0}"/>
+              </a:ext>
+            </a:extLst>
+          </p:cNvPr>
+          <p:cNvSpPr txBox="1"/>
+          <p:nvPr/>
+        </p:nvSpPr>
+        <p:spPr>
+          <a:xfrm>
+            <a:off x="4086956" y="2294633"/>
+            <a:ext cx="1802423" cy="369332"/>
+          </a:xfrm>
+          <a:prstGeom prst="rect">
+            <a:avLst/>
+          </a:prstGeom>
+          <a:noFill/>
+        </p:spPr>
+        <p:txBody>
+          <a:bodyPr wrap="square" rtlCol="0">
+            <a:spAutoFit/>
+          </a:bodyPr>
+          <a:lstStyle/>
+          <a:p>
+            <a:r>
+              <a:rPr lang="vi-VN">
+                <a:solidFill>
+                  <a:schemeClr val="accent1">
+                    <a:lumMod val="40000"/>
+                    <a:lumOff val="60000"/>
+                  </a:schemeClr>
+                </a:solidFill>
+              </a:rPr>
+              <a:t>Tên đăng nhập</a:t>
+            </a:r>
+            <a:endParaRPr lang="en-US">
+              <a:solidFill>
+                <a:schemeClr val="accent1">
+                  <a:lumMod val="40000"/>
+                  <a:lumOff val="60000"/>
+                </a:schemeClr>
+              </a:solidFill>
+            </a:endParaRPr>
+          </a:p>
+        </p:txBody>
+      </p:sp>
+      <p:sp>
+        <p:nvSpPr>
+          <p:cNvPr id="12" name="TextBox 11">
+            <a:extLst>
+              <a:ext uri="{FF2B5EF4-FFF2-40B4-BE49-F238E27FC236}">
+                <a16:creationId xmlns:a16="http://schemas.microsoft.com/office/drawing/2014/main" id="{80A12396-906F-4F82-861F-8F2FA3FF7D61}"/>
+              </a:ext>
+            </a:extLst>
+          </p:cNvPr>
+          <p:cNvSpPr txBox="1"/>
+          <p:nvPr/>
+        </p:nvSpPr>
+        <p:spPr>
+          <a:xfrm>
+            <a:off x="4086956" y="3134431"/>
+            <a:ext cx="1863970" cy="369332"/>
+          </a:xfrm>
+          <a:prstGeom prst="rect">
+            <a:avLst/>
+          </a:prstGeom>
+          <a:noFill/>
+        </p:spPr>
+        <p:txBody>
+          <a:bodyPr wrap="square" rtlCol="0">
+            <a:spAutoFit/>
+          </a:bodyPr>
+          <a:lstStyle/>
+          <a:p>
+            <a:r>
+              <a:rPr lang="vi-VN">
+                <a:solidFill>
+                  <a:schemeClr val="accent1">
+                    <a:lumMod val="40000"/>
+                    <a:lumOff val="60000"/>
+                  </a:schemeClr>
+                </a:solidFill>
+              </a:rPr>
+              <a:t>Mật khẩu</a:t>
+            </a:r>
+            <a:endParaRPr lang="en-US">
+              <a:solidFill>
+                <a:schemeClr val="accent1">
+                  <a:lumMod val="40000"/>
+                  <a:lumOff val="60000"/>
+                </a:schemeClr>
+              </a:solidFill>
+            </a:endParaRPr>
+          </a:p>
+        </p:txBody>
+      </p:sp>
+      <p:sp>
+        <p:nvSpPr>
+          <p:cNvPr id="2" name="Hộp Văn bản 1">
+            <a:extLst>
+              <a:ext uri="{FF2B5EF4-FFF2-40B4-BE49-F238E27FC236}">
+                <a16:creationId xmlns:a16="http://schemas.microsoft.com/office/drawing/2014/main" id="{B5D4435D-73F4-442C-B6CC-CB6AA8BBA8DA}"/>
+              </a:ext>
+            </a:extLst>
+          </p:cNvPr>
+          <p:cNvSpPr txBox="1"/>
+          <p:nvPr/>
+        </p:nvSpPr>
+        <p:spPr>
+          <a:xfrm>
+            <a:off x="5158850" y="5029357"/>
+            <a:ext cx="1874296" cy="369332"/>
+          </a:xfrm>
+          <a:prstGeom prst="rect">
+            <a:avLst/>
+          </a:prstGeom>
+          <a:noFill/>
+        </p:spPr>
+        <p:txBody>
+          <a:bodyPr wrap="none" rtlCol="0">
+            <a:spAutoFit/>
+          </a:bodyPr>
+          <a:lstStyle/>
+          <a:p>
+            <a:r>
+              <a:rPr lang="en-US" err="1">
+                <a:solidFill>
+                  <a:srgbClr val="FF0000"/>
+                </a:solidFill>
+              </a:rPr>
+              <a:t>Chưa</a:t>
+            </a:r>
+            <a:r>
+              <a:rPr lang="en-US">
+                <a:solidFill>
+                  <a:srgbClr val="FF0000"/>
+                </a:solidFill>
+              </a:rPr>
+              <a:t> </a:t>
+            </a:r>
+            <a:r>
+              <a:rPr lang="en-US" err="1">
+                <a:solidFill>
+                  <a:srgbClr val="FF0000"/>
+                </a:solidFill>
+              </a:rPr>
+              <a:t>có</a:t>
+            </a:r>
+            <a:r>
+              <a:rPr lang="en-US">
+                <a:solidFill>
+                  <a:srgbClr val="FF0000"/>
+                </a:solidFill>
+              </a:rPr>
+              <a:t> </a:t>
+            </a:r>
+            <a:r>
+              <a:rPr lang="en-US" err="1">
+                <a:solidFill>
+                  <a:srgbClr val="FF0000"/>
+                </a:solidFill>
+              </a:rPr>
+              <a:t>tài</a:t>
+            </a:r>
+            <a:r>
+              <a:rPr lang="en-US">
+                <a:solidFill>
+                  <a:srgbClr val="FF0000"/>
+                </a:solidFill>
+              </a:rPr>
+              <a:t> </a:t>
+            </a:r>
+            <a:r>
+              <a:rPr lang="en-US" err="1">
+                <a:solidFill>
+                  <a:srgbClr val="FF0000"/>
+                </a:solidFill>
+              </a:rPr>
+              <a:t>khoản</a:t>
+            </a:r>
+            <a:endParaRPr lang="en-US">
+              <a:solidFill>
+                <a:srgbClr val="FF0000"/>
+              </a:solidFill>
+            </a:endParaRPr>
+          </a:p>
+        </p:txBody>
+      </p:sp>
+      <p:sp>
+        <p:nvSpPr>
+          <p:cNvPr id="3" name="Hộp Văn bản 2">
+            <a:extLst>
+              <a:ext uri="{FF2B5EF4-FFF2-40B4-BE49-F238E27FC236}">
+                <a16:creationId xmlns:a16="http://schemas.microsoft.com/office/drawing/2014/main" id="{842F2086-1DB5-4560-A479-79C29FBC8FF4}"/>
+              </a:ext>
+            </a:extLst>
+          </p:cNvPr>
+          <p:cNvSpPr txBox="1"/>
+          <p:nvPr/>
+        </p:nvSpPr>
+        <p:spPr>
+          <a:xfrm>
+            <a:off x="4976043" y="5482028"/>
+            <a:ext cx="2453457" cy="400110"/>
+          </a:xfrm>
+          <a:prstGeom prst="rect">
+            <a:avLst/>
+          </a:prstGeom>
+          <a:ln/>
+        </p:spPr>
+        <p:style>
+          <a:lnRef idx="0">
+            <a:schemeClr val="accent6"/>
+          </a:lnRef>
+          <a:fillRef idx="3">
+            <a:schemeClr val="accent6"/>
+          </a:fillRef>
+          <a:effectRef idx="3">
+            <a:schemeClr val="accent6"/>
+          </a:effectRef>
+          <a:fontRef idx="minor">
+            <a:schemeClr val="lt1"/>
+          </a:fontRef>
+        </p:style>
+        <p:txBody>
+          <a:bodyPr wrap="square" rtlCol="0">
+            <a:spAutoFit/>
+          </a:bodyPr>
+          <a:lstStyle/>
+          <a:p>
+            <a:pPr algn="ctr"/>
+            <a:r>
+              <a:rPr lang="en-US" sz="2000" b="1" err="1"/>
+              <a:t>Đăng</a:t>
+            </a:r>
+            <a:r>
+              <a:rPr lang="en-US" sz="2000" b="1"/>
+              <a:t> </a:t>
+            </a:r>
+            <a:r>
+              <a:rPr lang="en-US" sz="2000" b="1" err="1"/>
+              <a:t>ký</a:t>
+            </a:r>
+            <a:r>
+              <a:rPr lang="en-US" sz="2000" b="1"/>
+              <a:t> </a:t>
+            </a:r>
+            <a:r>
+              <a:rPr lang="en-US" sz="2000" b="1" err="1"/>
+              <a:t>ngay</a:t>
+            </a:r>
+            <a:r>
+              <a:rPr lang="en-US" sz="2000" b="1"/>
+              <a:t> </a:t>
+            </a:r>
+          </a:p>
+        </p:txBody>
+      </p:sp>
+      <p:sp>
+        <p:nvSpPr>
+          <p:cNvPr id="13" name="Chỗ dành sẵn cho Văn bản 12">
+            <a:extLst>
+              <a:ext uri="{FF2B5EF4-FFF2-40B4-BE49-F238E27FC236}">
+                <a16:creationId xmlns:a16="http://schemas.microsoft.com/office/drawing/2014/main" id="{2BF1E5F4-000F-43C6-8375-D788AA204E47}"/>
+              </a:ext>
+            </a:extLst>
+          </p:cNvPr>
+          <p:cNvSpPr>
+            <a:spLocks noGrp="1"/>
+          </p:cNvSpPr>
+          <p:nvPr>
+            <p:ph type="body" idx="1"/>
+          </p:nvPr>
+        </p:nvSpPr>
+        <p:spPr>
+          <a:xfrm>
+            <a:off x="-1" y="0"/>
+            <a:ext cx="12192001" cy="1187883"/>
+          </a:xfrm>
+          <a:solidFill>
+            <a:schemeClr val="bg1"/>
+          </a:solidFill>
+        </p:spPr>
+        <p:txBody>
+          <a:bodyPr>
+            <a:normAutofit/>
+          </a:bodyPr>
+          <a:lstStyle/>
+          <a:p>
+            <a:r>
+              <a:rPr lang="en-US" sz="2000">
+                <a:solidFill>
+                  <a:srgbClr val="FF0000"/>
+                </a:solidFill>
+                <a:latin typeface="Bodoni MT Black" panose="02070A03080606020203" pitchFamily="18" charset="0"/>
+              </a:rPr>
+              <a:t>TIMVENHANH.COM</a:t>
+            </a:r>
+          </a:p>
+        </p:txBody>
+      </p:sp>
+      <p:pic>
+        <p:nvPicPr>
+          <p:cNvPr id="17" name="Hình ảnh 16" descr="Ảnh có chứa bầu trời&#10;&#10;Mô tả được tạo với mức tin cậy cao">
+            <a:extLst>
+              <a:ext uri="{FF2B5EF4-FFF2-40B4-BE49-F238E27FC236}">
+                <a16:creationId xmlns:a16="http://schemas.microsoft.com/office/drawing/2014/main" id="{99532F68-5909-4780-9C0C-6B8C4224F857}"/>
+              </a:ext>
+            </a:extLst>
+          </p:cNvPr>
+          <p:cNvPicPr>
+            <a:picLocks noChangeAspect="1"/>
+          </p:cNvPicPr>
+          <p:nvPr/>
+        </p:nvPicPr>
+        <p:blipFill>
+          <a:blip r:embed="rId3">
+            <a:extLst>
+              <a:ext uri="{28A0092B-C50C-407E-A947-70E740481C1C}">
+                <a14:useLocalDpi xmlns:a14="http://schemas.microsoft.com/office/drawing/2010/main" val="0"/>
+              </a:ext>
+            </a:extLst>
+          </a:blip>
+          <a:stretch>
+            <a:fillRect/>
+          </a:stretch>
+        </p:blipFill>
+        <p:spPr>
+          <a:xfrm>
+            <a:off x="190499" y="70862"/>
+            <a:ext cx="2657475" cy="1320559"/>
+          </a:xfrm>
+          <a:prstGeom prst="rect">
+            <a:avLst/>
+          </a:prstGeom>
+        </p:spPr>
+      </p:pic>
+      <p:sp>
+        <p:nvSpPr>
+          <p:cNvPr id="20" name="Hình chữ nhật 19">
+            <a:extLst>
+              <a:ext uri="{FF2B5EF4-FFF2-40B4-BE49-F238E27FC236}">
+                <a16:creationId xmlns:a16="http://schemas.microsoft.com/office/drawing/2014/main" id="{ED4AF283-6AA6-4502-AEA9-8F0706236051}"/>
               </a:ext>
             </a:extLst>
           </p:cNvPr>
@@ -3868,19 +3970,17 @@
         </p:nvSpPr>
         <p:spPr>
           <a:xfrm>
-            <a:off x="4271596" y="2405986"/>
-            <a:ext cx="3648808" cy="510833"/>
+            <a:off x="1" y="6291663"/>
+            <a:ext cx="12192000" cy="649706"/>
           </a:xfrm>
-          <a:prstGeom prst="roundRect">
+          <a:prstGeom prst="rect">
             <a:avLst/>
           </a:prstGeom>
           <a:solidFill>
-            <a:srgbClr val="FBD7D7"/>
+            <a:schemeClr val="bg1"/>
           </a:solidFill>
           <a:ln>
-            <a:solidFill>
-              <a:srgbClr val="B20C0C"/>
-            </a:solidFill>
+            <a:noFill/>
           </a:ln>
         </p:spPr>
         <p:style>
@@ -3903,17 +4003,92 @@
           <a:bodyPr rtlCol="0" anchor="ctr"/>
           <a:lstStyle/>
           <a:p>
-            <a:pPr algn="ctr"/>
-            <a:endParaRPr lang="en-US"/>
-          </a:p>
-        </p:txBody>
-      </p:sp>
-      <p:sp>
-        <p:nvSpPr>
-          <p:cNvPr id="8" name="Rectangle: Rounded Corners 7">
-            <a:extLst>
-              <a:ext uri="{FF2B5EF4-FFF2-40B4-BE49-F238E27FC236}">
-                <a16:creationId xmlns:a16="http://schemas.microsoft.com/office/drawing/2014/main" id="{7979C10B-6BFF-4727-A802-B82C92E348E0}"/>
+            <a:r>
+              <a:rPr lang="en-US" b="1">
+                <a:solidFill>
+                  <a:srgbClr val="FF0000"/>
+                </a:solidFill>
+              </a:rPr>
+              <a:t>Hotline: 0969966699 </a:t>
+            </a:r>
+          </a:p>
+        </p:txBody>
+      </p:sp>
+      <p:sp>
+        <p:nvSpPr>
+          <p:cNvPr id="21" name="Hộp Văn bản 20">
+            <a:extLst>
+              <a:ext uri="{FF2B5EF4-FFF2-40B4-BE49-F238E27FC236}">
+                <a16:creationId xmlns:a16="http://schemas.microsoft.com/office/drawing/2014/main" id="{0ABD9F07-995C-486B-8B55-029ACB604CD4}"/>
+              </a:ext>
+            </a:extLst>
+          </p:cNvPr>
+          <p:cNvSpPr txBox="1"/>
+          <p:nvPr/>
+        </p:nvSpPr>
+        <p:spPr>
+          <a:xfrm>
+            <a:off x="7695181" y="0"/>
+            <a:ext cx="3344777" cy="369332"/>
+          </a:xfrm>
+          <a:prstGeom prst="rect">
+            <a:avLst/>
+          </a:prstGeom>
+          <a:ln w="28575">
+            <a:solidFill>
+              <a:schemeClr val="bg2">
+                <a:lumMod val="90000"/>
+              </a:schemeClr>
+            </a:solidFill>
+          </a:ln>
+          <a:effectLst>
+            <a:glow rad="63500">
+              <a:schemeClr val="accent1">
+                <a:satMod val="175000"/>
+                <a:alpha val="40000"/>
+              </a:schemeClr>
+            </a:glow>
+          </a:effectLst>
+        </p:spPr>
+        <p:style>
+          <a:lnRef idx="2">
+            <a:schemeClr val="accent6"/>
+          </a:lnRef>
+          <a:fillRef idx="1">
+            <a:schemeClr val="lt1"/>
+          </a:fillRef>
+          <a:effectRef idx="0">
+            <a:schemeClr val="accent6"/>
+          </a:effectRef>
+          <a:fontRef idx="minor">
+            <a:schemeClr val="dk1"/>
+          </a:fontRef>
+        </p:style>
+        <p:txBody>
+          <a:bodyPr wrap="square" rtlCol="0">
+            <a:spAutoFit/>
+          </a:bodyPr>
+          <a:lstStyle/>
+          <a:p>
+            <a:r>
+              <a:rPr lang="en-US">
+                <a:solidFill>
+                  <a:schemeClr val="bg2">
+                    <a:lumMod val="90000"/>
+                  </a:schemeClr>
+                </a:solidFill>
+              </a:rPr>
+              <a:t>Tìm kiếm</a:t>
+            </a:r>
+          </a:p>
+        </p:txBody>
+      </p:sp>
+      <p:sp>
+        <p:nvSpPr>
+          <p:cNvPr id="24" name="Hình chữ nhật: Góc Tròn 23">
+            <a:extLst>
+              <a:ext uri="{FF2B5EF4-FFF2-40B4-BE49-F238E27FC236}">
+                <a16:creationId xmlns:a16="http://schemas.microsoft.com/office/drawing/2014/main" id="{B2C56B89-453A-4873-A307-DC92A2D88064}"/>
               </a:ext>
             </a:extLst>
           </p:cNvPr>
@@ -3922,27 +4097,25 @@
         </p:nvSpPr>
         <p:spPr>
           <a:xfrm>
-            <a:off x="4271596" y="3173583"/>
-            <a:ext cx="3648808" cy="510833"/>
+            <a:off x="11196368" y="0"/>
+            <a:ext cx="995632" cy="369332"/>
           </a:xfrm>
           <a:prstGeom prst="roundRect">
             <a:avLst/>
           </a:prstGeom>
-          <a:solidFill>
-            <a:schemeClr val="bg1"/>
-          </a:solidFill>
+          <a:ln/>
         </p:spPr>
         <p:style>
           <a:lnRef idx="2">
-            <a:schemeClr val="accent1">
+            <a:schemeClr val="accent6">
               <a:shade val="50000"/>
             </a:schemeClr>
           </a:lnRef>
           <a:fillRef idx="1">
-            <a:schemeClr val="accent1"/>
+            <a:schemeClr val="accent6"/>
           </a:fillRef>
           <a:effectRef idx="0">
-            <a:schemeClr val="accent1"/>
+            <a:schemeClr val="accent6"/>
           </a:effectRef>
           <a:fontRef idx="minor">
             <a:schemeClr val="lt1"/>
@@ -3957,83 +4130,49 @@
           </a:p>
         </p:txBody>
       </p:sp>
-      <p:sp>
-        <p:nvSpPr>
-          <p:cNvPr id="9" name="Rectangle: Rounded Corners 8">
-            <a:extLst>
-              <a:ext uri="{FF2B5EF4-FFF2-40B4-BE49-F238E27FC236}">
-                <a16:creationId xmlns:a16="http://schemas.microsoft.com/office/drawing/2014/main" id="{91F3BC59-1E56-4433-81AF-2CEAAE8621E1}"/>
-              </a:ext>
-            </a:extLst>
-          </p:cNvPr>
-          <p:cNvSpPr/>
+      <p:pic>
+        <p:nvPicPr>
+          <p:cNvPr id="26" name="Hình ảnh 25">
+            <a:extLst>
+              <a:ext uri="{FF2B5EF4-FFF2-40B4-BE49-F238E27FC236}">
+                <a16:creationId xmlns:a16="http://schemas.microsoft.com/office/drawing/2014/main" id="{D253ECB8-BE02-457D-98AD-37C7DDEC6FC5}"/>
+              </a:ext>
+            </a:extLst>
+          </p:cNvPr>
+          <p:cNvPicPr>
+            <a:picLocks noChangeAspect="1"/>
+          </p:cNvPicPr>
           <p:nvPr/>
-        </p:nvSpPr>
+        </p:nvPicPr>
+        <p:blipFill>
+          <a:blip r:embed="rId4">
+            <a:lum bright="70000" contrast="-70000"/>
+            <a:extLst>
+              <a:ext uri="{28A0092B-C50C-407E-A947-70E740481C1C}">
+                <a14:useLocalDpi xmlns:a14="http://schemas.microsoft.com/office/drawing/2010/main" val="0"/>
+              </a:ext>
+            </a:extLst>
+          </a:blip>
+          <a:stretch>
+            <a:fillRect/>
+          </a:stretch>
+        </p:blipFill>
         <p:spPr>
           <a:xfrm>
-            <a:off x="4271596" y="3941180"/>
-            <a:ext cx="3648808" cy="510833"/>
+            <a:off x="11554602" y="70862"/>
+            <a:ext cx="279164" cy="279164"/>
           </a:xfrm>
-          <a:prstGeom prst="roundRect">
+          <a:prstGeom prst="rect">
             <a:avLst/>
           </a:prstGeom>
-          <a:solidFill>
-            <a:schemeClr val="accent6">
-              <a:lumMod val="40000"/>
-              <a:lumOff val="60000"/>
-            </a:schemeClr>
-          </a:solidFill>
-          <a:scene3d>
-            <a:camera prst="orthographicFront"/>
-            <a:lightRig rig="threePt" dir="t"/>
-          </a:scene3d>
-          <a:sp3d>
-            <a:bevelT w="38100" h="38100" prst="angle"/>
-          </a:sp3d>
         </p:spPr>
-        <p:style>
-          <a:lnRef idx="2">
-            <a:schemeClr val="accent1">
-              <a:shade val="50000"/>
-            </a:schemeClr>
-          </a:lnRef>
-          <a:fillRef idx="1">
-            <a:schemeClr val="accent1"/>
-          </a:fillRef>
-          <a:effectRef idx="0">
-            <a:schemeClr val="accent1"/>
-          </a:effectRef>
-          <a:fontRef idx="minor">
-            <a:schemeClr val="lt1"/>
-          </a:fontRef>
-        </p:style>
-        <p:txBody>
-          <a:bodyPr rtlCol="0" anchor="ctr"/>
-          <a:lstStyle/>
-          <a:p>
-            <a:pPr algn="ctr"/>
-            <a:r>
-              <a:rPr lang="vi-VN" dirty="0">
-                <a:solidFill>
-                  <a:schemeClr val="tx2"/>
-                </a:solidFill>
-              </a:rPr>
-              <a:t>Login</a:t>
-            </a:r>
-            <a:endParaRPr lang="en-US" dirty="0">
-              <a:solidFill>
-                <a:schemeClr val="tx2"/>
-              </a:solidFill>
-            </a:endParaRPr>
-          </a:p>
-        </p:txBody>
-      </p:sp>
-      <p:sp>
-        <p:nvSpPr>
-          <p:cNvPr id="10" name="TextBox 9">
-            <a:extLst>
-              <a:ext uri="{FF2B5EF4-FFF2-40B4-BE49-F238E27FC236}">
-                <a16:creationId xmlns:a16="http://schemas.microsoft.com/office/drawing/2014/main" id="{3115243B-F508-4C91-9EFD-E603E6F20542}"/>
+      </p:pic>
+      <p:sp>
+        <p:nvSpPr>
+          <p:cNvPr id="27" name="Hộp Văn bản 26">
+            <a:extLst>
+              <a:ext uri="{FF2B5EF4-FFF2-40B4-BE49-F238E27FC236}">
+                <a16:creationId xmlns:a16="http://schemas.microsoft.com/office/drawing/2014/main" id="{80007D53-962D-47C7-AC38-ADC4F2DCFA3F}"/>
               </a:ext>
             </a:extLst>
           </p:cNvPr>
@@ -4042,8 +4181,8 @@
         </p:nvSpPr>
         <p:spPr>
           <a:xfrm>
-            <a:off x="5367700" y="4624363"/>
-            <a:ext cx="1456595" cy="307777"/>
+            <a:off x="7972255" y="783276"/>
+            <a:ext cx="1107996" cy="369332"/>
           </a:xfrm>
           <a:prstGeom prst="rect">
             <a:avLst/>
@@ -4051,33 +4190,60 @@
           <a:noFill/>
         </p:spPr>
         <p:txBody>
-          <a:bodyPr wrap="square" rtlCol="0">
+          <a:bodyPr wrap="none" rtlCol="0">
             <a:spAutoFit/>
           </a:bodyPr>
           <a:lstStyle/>
           <a:p>
             <a:r>
-              <a:rPr lang="vi-VN" sz="1400" u="sng" dirty="0">
-                <a:solidFill>
-                  <a:schemeClr val="tx2"/>
-                </a:solidFill>
-              </a:rPr>
-              <a:t>Quên mật khẩu</a:t>
-            </a:r>
-            <a:endParaRPr lang="en-US" sz="1400" u="sng" dirty="0">
-              <a:solidFill>
-                <a:schemeClr val="tx2"/>
-              </a:solidFill>
-            </a:endParaRPr>
-          </a:p>
-        </p:txBody>
-      </p:sp>
-      <p:sp>
-        <p:nvSpPr>
-          <p:cNvPr id="11" name="TextBox 10">
-            <a:extLst>
-              <a:ext uri="{FF2B5EF4-FFF2-40B4-BE49-F238E27FC236}">
-                <a16:creationId xmlns:a16="http://schemas.microsoft.com/office/drawing/2014/main" id="{49A1C479-B19B-4562-A60E-9B3EB5530ED0}"/>
+              <a:rPr lang="en-US"/>
+              <a:t>Ngôn ngữ</a:t>
+            </a:r>
+          </a:p>
+        </p:txBody>
+      </p:sp>
+      <p:pic>
+        <p:nvPicPr>
+          <p:cNvPr id="29" name="Hình ảnh 28" descr="Ảnh có chứa mẫu họa&#10;&#10;Mô tả được tạo với mức tin cậy cao">
+            <a:extLst>
+              <a:ext uri="{FF2B5EF4-FFF2-40B4-BE49-F238E27FC236}">
+                <a16:creationId xmlns:a16="http://schemas.microsoft.com/office/drawing/2014/main" id="{958BDF88-2301-4A66-8E3F-30B06A9434EC}"/>
+              </a:ext>
+            </a:extLst>
+          </p:cNvPr>
+          <p:cNvPicPr>
+            <a:picLocks noChangeAspect="1"/>
+          </p:cNvPicPr>
+          <p:nvPr/>
+        </p:nvPicPr>
+        <p:blipFill>
+          <a:blip r:embed="rId5">
+            <a:extLst>
+              <a:ext uri="{28A0092B-C50C-407E-A947-70E740481C1C}">
+                <a14:useLocalDpi xmlns:a14="http://schemas.microsoft.com/office/drawing/2010/main" val="0"/>
+              </a:ext>
+            </a:extLst>
+          </a:blip>
+          <a:stretch>
+            <a:fillRect/>
+          </a:stretch>
+        </p:blipFill>
+        <p:spPr>
+          <a:xfrm>
+            <a:off x="9248346" y="819422"/>
+            <a:ext cx="446778" cy="313487"/>
+          </a:xfrm>
+          <a:prstGeom prst="rect">
+            <a:avLst/>
+          </a:prstGeom>
+        </p:spPr>
+      </p:pic>
+      <p:sp>
+        <p:nvSpPr>
+          <p:cNvPr id="31" name="Hộp Văn bản 30">
+            <a:extLst>
+              <a:ext uri="{FF2B5EF4-FFF2-40B4-BE49-F238E27FC236}">
+                <a16:creationId xmlns:a16="http://schemas.microsoft.com/office/drawing/2014/main" id="{8C848764-6AFA-44A9-9EE9-74B86B54518D}"/>
               </a:ext>
             </a:extLst>
           </p:cNvPr>
@@ -4086,8 +4252,8 @@
         </p:nvSpPr>
         <p:spPr>
           <a:xfrm>
-            <a:off x="4385891" y="2521105"/>
-            <a:ext cx="2683124" cy="307777"/>
+            <a:off x="10044873" y="818551"/>
+            <a:ext cx="995085" cy="369332"/>
           </a:xfrm>
           <a:prstGeom prst="rect">
             <a:avLst/>
@@ -4101,89 +4267,90 @@
           <a:lstStyle/>
           <a:p>
             <a:r>
-              <a:rPr lang="vi-VN" sz="1400" dirty="0">
-                <a:solidFill>
-                  <a:srgbClr val="E67474"/>
-                </a:solidFill>
-              </a:rPr>
-              <a:t>Tên đăng nhậ</a:t>
-            </a:r>
-            <a:r>
-              <a:rPr lang="en-US" sz="1400" dirty="0">
-                <a:solidFill>
-                  <a:srgbClr val="E67474"/>
-                </a:solidFill>
-                <a:latin typeface="Arial" panose="020B0604020202020204" pitchFamily="34" charset="0"/>
-                <a:cs typeface="Arial" panose="020B0604020202020204" pitchFamily="34" charset="0"/>
-              </a:rPr>
-              <a:t>p </a:t>
-            </a:r>
-            <a:r>
-              <a:rPr lang="en-US" sz="1400" dirty="0" err="1">
-                <a:solidFill>
-                  <a:srgbClr val="E67474"/>
-                </a:solidFill>
-                <a:latin typeface="Arial" panose="020B0604020202020204" pitchFamily="34" charset="0"/>
-                <a:cs typeface="Arial" panose="020B0604020202020204" pitchFamily="34" charset="0"/>
-              </a:rPr>
-              <a:t>không</a:t>
-            </a:r>
-            <a:r>
-              <a:rPr lang="en-US" sz="1400" dirty="0">
-                <a:solidFill>
-                  <a:srgbClr val="E67474"/>
-                </a:solidFill>
-                <a:latin typeface="Arial" panose="020B0604020202020204" pitchFamily="34" charset="0"/>
-                <a:cs typeface="Arial" panose="020B0604020202020204" pitchFamily="34" charset="0"/>
-              </a:rPr>
-              <a:t> </a:t>
-            </a:r>
-            <a:r>
-              <a:rPr lang="en-US" sz="1400" dirty="0" err="1">
-                <a:solidFill>
-                  <a:srgbClr val="E67474"/>
-                </a:solidFill>
-                <a:latin typeface="Arial" panose="020B0604020202020204" pitchFamily="34" charset="0"/>
-                <a:cs typeface="Arial" panose="020B0604020202020204" pitchFamily="34" charset="0"/>
-              </a:rPr>
-              <a:t>tồn</a:t>
-            </a:r>
-            <a:r>
-              <a:rPr lang="en-US" sz="1400" dirty="0">
-                <a:solidFill>
-                  <a:srgbClr val="E67474"/>
-                </a:solidFill>
-                <a:latin typeface="Arial" panose="020B0604020202020204" pitchFamily="34" charset="0"/>
-                <a:cs typeface="Arial" panose="020B0604020202020204" pitchFamily="34" charset="0"/>
-              </a:rPr>
-              <a:t> </a:t>
-            </a:r>
-            <a:r>
-              <a:rPr lang="en-US" sz="1400" dirty="0" err="1">
-                <a:solidFill>
-                  <a:srgbClr val="E67474"/>
-                </a:solidFill>
-                <a:latin typeface="Arial" panose="020B0604020202020204" pitchFamily="34" charset="0"/>
-                <a:cs typeface="Arial" panose="020B0604020202020204" pitchFamily="34" charset="0"/>
-              </a:rPr>
-              <a:t>tại</a:t>
-            </a:r>
-            <a:endParaRPr lang="en-US" sz="1400" dirty="0">
-              <a:solidFill>
-                <a:srgbClr val="E67474"/>
-              </a:solidFill>
-              <a:latin typeface="Arial" panose="020B0604020202020204" pitchFamily="34" charset="0"/>
-              <a:cs typeface="Arial" panose="020B0604020202020204" pitchFamily="34" charset="0"/>
-            </a:endParaRPr>
-          </a:p>
-        </p:txBody>
-      </p:sp>
-      <p:sp>
-        <p:nvSpPr>
-          <p:cNvPr id="12" name="TextBox 11">
-            <a:extLst>
-              <a:ext uri="{FF2B5EF4-FFF2-40B4-BE49-F238E27FC236}">
-                <a16:creationId xmlns:a16="http://schemas.microsoft.com/office/drawing/2014/main" id="{80A12396-906F-4F82-861F-8F2FA3FF7D61}"/>
+              <a:rPr lang="en-US"/>
+              <a:t>Liên hệ</a:t>
+            </a:r>
+          </a:p>
+        </p:txBody>
+      </p:sp>
+      <p:pic>
+        <p:nvPicPr>
+          <p:cNvPr id="33" name="Hình ảnh 32" descr="Ảnh có chứa bộ sơ cứu, mẫu họa&#10;&#10;Mô tả được tạo với mức tin cậy cao">
+            <a:extLst>
+              <a:ext uri="{FF2B5EF4-FFF2-40B4-BE49-F238E27FC236}">
+                <a16:creationId xmlns:a16="http://schemas.microsoft.com/office/drawing/2014/main" id="{318F7612-7156-423E-AA95-A9F79739DB9F}"/>
+              </a:ext>
+            </a:extLst>
+          </p:cNvPr>
+          <p:cNvPicPr>
+            <a:picLocks noChangeAspect="1"/>
+          </p:cNvPicPr>
+          <p:nvPr/>
+        </p:nvPicPr>
+        <p:blipFill>
+          <a:blip r:embed="rId6">
+            <a:extLst>
+              <a:ext uri="{28A0092B-C50C-407E-A947-70E740481C1C}">
+                <a14:useLocalDpi xmlns:a14="http://schemas.microsoft.com/office/drawing/2010/main" val="0"/>
+              </a:ext>
+            </a:extLst>
+          </a:blip>
+          <a:stretch>
+            <a:fillRect/>
+          </a:stretch>
+        </p:blipFill>
+        <p:spPr>
+          <a:xfrm>
+            <a:off x="10715105" y="6305022"/>
+            <a:ext cx="649706" cy="649706"/>
+          </a:xfrm>
+          <a:prstGeom prst="rect">
+            <a:avLst/>
+          </a:prstGeom>
+        </p:spPr>
+      </p:pic>
+      <p:pic>
+        <p:nvPicPr>
+          <p:cNvPr id="35" name="Hình ảnh 34">
+            <a:extLst>
+              <a:ext uri="{FF2B5EF4-FFF2-40B4-BE49-F238E27FC236}">
+                <a16:creationId xmlns:a16="http://schemas.microsoft.com/office/drawing/2014/main" id="{F3DCDB2A-BB5E-429F-B04D-A116227433B1}"/>
+              </a:ext>
+            </a:extLst>
+          </p:cNvPr>
+          <p:cNvPicPr>
+            <a:picLocks noChangeAspect="1"/>
+          </p:cNvPicPr>
+          <p:nvPr/>
+        </p:nvPicPr>
+        <p:blipFill>
+          <a:blip r:embed="rId7">
+            <a:extLst>
+              <a:ext uri="{28A0092B-C50C-407E-A947-70E740481C1C}">
+                <a14:useLocalDpi xmlns:a14="http://schemas.microsoft.com/office/drawing/2010/main" val="0"/>
+              </a:ext>
+            </a:extLst>
+          </a:blip>
+          <a:stretch>
+            <a:fillRect/>
+          </a:stretch>
+        </p:blipFill>
+        <p:spPr>
+          <a:xfrm>
+            <a:off x="11542292" y="6308574"/>
+            <a:ext cx="649707" cy="649707"/>
+          </a:xfrm>
+          <a:prstGeom prst="rect">
+            <a:avLst/>
+          </a:prstGeom>
+        </p:spPr>
+      </p:pic>
+      <p:sp>
+        <p:nvSpPr>
+          <p:cNvPr id="36" name="Hộp Văn bản 35">
+            <a:extLst>
+              <a:ext uri="{FF2B5EF4-FFF2-40B4-BE49-F238E27FC236}">
+                <a16:creationId xmlns:a16="http://schemas.microsoft.com/office/drawing/2014/main" id="{CEFF58BD-6832-4B0C-BC38-BA3ED8BE8F5A}"/>
               </a:ext>
             </a:extLst>
           </p:cNvPr>
@@ -4192,8 +4359,8 @@
         </p:nvSpPr>
         <p:spPr>
           <a:xfrm>
-            <a:off x="4385891" y="3275109"/>
-            <a:ext cx="1863970" cy="307777"/>
+            <a:off x="1781539" y="6251891"/>
+            <a:ext cx="4847207" cy="646331"/>
           </a:xfrm>
           <a:prstGeom prst="rect">
             <a:avLst/>
@@ -4206,32 +4373,175 @@
           </a:bodyPr>
           <a:lstStyle/>
           <a:p>
-            <a:r>
-              <a:rPr lang="vi-VN" sz="1400" dirty="0">
+            <a:pPr algn="ctr"/>
+            <a:r>
+              <a:rPr lang="en-US" u="sng"/>
+              <a:t>CHI NHÁNH HÀ NỘI</a:t>
+            </a:r>
+          </a:p>
+          <a:p>
+            <a:pPr algn="ctr"/>
+            <a:r>
+              <a:rPr lang="en-US"/>
+              <a:t>202 B3D Nam Trung Yên, Cấu Giấy, Hà Nội</a:t>
+            </a:r>
+          </a:p>
+        </p:txBody>
+      </p:sp>
+      <p:sp>
+        <p:nvSpPr>
+          <p:cNvPr id="38" name="Hộp Văn bản 37">
+            <a:extLst>
+              <a:ext uri="{FF2B5EF4-FFF2-40B4-BE49-F238E27FC236}">
+                <a16:creationId xmlns:a16="http://schemas.microsoft.com/office/drawing/2014/main" id="{CEDE14EA-2979-402C-861B-3B8F69B6D2D2}"/>
+              </a:ext>
+            </a:extLst>
+          </p:cNvPr>
+          <p:cNvSpPr txBox="1"/>
+          <p:nvPr/>
+        </p:nvSpPr>
+        <p:spPr>
+          <a:xfrm>
+            <a:off x="7564733" y="6274751"/>
+            <a:ext cx="2130391" cy="646331"/>
+          </a:xfrm>
+          <a:prstGeom prst="rect">
+            <a:avLst/>
+          </a:prstGeom>
+          <a:noFill/>
+        </p:spPr>
+        <p:txBody>
+          <a:bodyPr wrap="none" rtlCol="0">
+            <a:spAutoFit/>
+          </a:bodyPr>
+          <a:lstStyle/>
+          <a:p>
+            <a:r>
+              <a:rPr lang="en-US" u="sng"/>
+              <a:t>CHI NHÁNH TP.HCM</a:t>
+            </a:r>
+          </a:p>
+          <a:p>
+            <a:r>
+              <a:rPr lang="en-US"/>
+              <a:t>969 bac xyz mnp aaa</a:t>
+            </a:r>
+          </a:p>
+        </p:txBody>
+      </p:sp>
+      <p:sp>
+        <p:nvSpPr>
+          <p:cNvPr id="39" name="Hộp Văn bản 38">
+            <a:extLst>
+              <a:ext uri="{FF2B5EF4-FFF2-40B4-BE49-F238E27FC236}">
+                <a16:creationId xmlns:a16="http://schemas.microsoft.com/office/drawing/2014/main" id="{0687BA7F-A5B7-4723-A27D-C102649A08F7}"/>
+              </a:ext>
+            </a:extLst>
+          </p:cNvPr>
+          <p:cNvSpPr txBox="1"/>
+          <p:nvPr/>
+        </p:nvSpPr>
+        <p:spPr>
+          <a:xfrm>
+            <a:off x="2847974" y="651181"/>
+            <a:ext cx="1141659" cy="461665"/>
+          </a:xfrm>
+          <a:prstGeom prst="rect">
+            <a:avLst/>
+          </a:prstGeom>
+          <a:noFill/>
+        </p:spPr>
+        <p:txBody>
+          <a:bodyPr wrap="none" rtlCol="0">
+            <a:spAutoFit/>
+          </a:bodyPr>
+          <a:lstStyle/>
+          <a:p>
+            <a:r>
+              <a:rPr lang="en-US" sz="2400" b="1">
                 <a:solidFill>
-                  <a:schemeClr val="accent1">
-                    <a:lumMod val="40000"/>
-                    <a:lumOff val="60000"/>
-                  </a:schemeClr>
+                  <a:srgbClr val="FF0000"/>
                 </a:solidFill>
               </a:rPr>
-              <a:t>Mật khẩu</a:t>
-            </a:r>
-            <a:endParaRPr lang="en-US" sz="1400" dirty="0">
-              <a:solidFill>
-                <a:schemeClr val="accent1">
-                  <a:lumMod val="40000"/>
-                  <a:lumOff val="60000"/>
-                </a:schemeClr>
-              </a:solidFill>
-            </a:endParaRPr>
+              <a:t>Mua vé</a:t>
+            </a:r>
+          </a:p>
+        </p:txBody>
+      </p:sp>
+      <p:sp>
+        <p:nvSpPr>
+          <p:cNvPr id="40" name="Hộp Văn bản 39">
+            <a:extLst>
+              <a:ext uri="{FF2B5EF4-FFF2-40B4-BE49-F238E27FC236}">
+                <a16:creationId xmlns:a16="http://schemas.microsoft.com/office/drawing/2014/main" id="{5D2A57FC-E6CB-4633-8C76-ECCF77769D0A}"/>
+              </a:ext>
+            </a:extLst>
+          </p:cNvPr>
+          <p:cNvSpPr txBox="1"/>
+          <p:nvPr/>
+        </p:nvSpPr>
+        <p:spPr>
+          <a:xfrm>
+            <a:off x="4023030" y="688883"/>
+            <a:ext cx="1253869" cy="400110"/>
+          </a:xfrm>
+          <a:prstGeom prst="rect">
+            <a:avLst/>
+          </a:prstGeom>
+          <a:noFill/>
+        </p:spPr>
+        <p:txBody>
+          <a:bodyPr wrap="none" rtlCol="0">
+            <a:spAutoFit/>
+          </a:bodyPr>
+          <a:lstStyle/>
+          <a:p>
+            <a:r>
+              <a:rPr lang="en-US" sz="2000"/>
+              <a:t>Giới Thiệu</a:t>
+            </a:r>
+          </a:p>
+        </p:txBody>
+      </p:sp>
+      <p:sp>
+        <p:nvSpPr>
+          <p:cNvPr id="41" name="Hộp Văn bản 40">
+            <a:extLst>
+              <a:ext uri="{FF2B5EF4-FFF2-40B4-BE49-F238E27FC236}">
+                <a16:creationId xmlns:a16="http://schemas.microsoft.com/office/drawing/2014/main" id="{16B3B17E-9496-444A-9920-684113C451A6}"/>
+              </a:ext>
+            </a:extLst>
+          </p:cNvPr>
+          <p:cNvSpPr txBox="1"/>
+          <p:nvPr/>
+        </p:nvSpPr>
+        <p:spPr>
+          <a:xfrm>
+            <a:off x="5265129" y="695563"/>
+            <a:ext cx="1371594" cy="400110"/>
+          </a:xfrm>
+          <a:prstGeom prst="rect">
+            <a:avLst/>
+          </a:prstGeom>
+          <a:noFill/>
+        </p:spPr>
+        <p:txBody>
+          <a:bodyPr wrap="none" rtlCol="0">
+            <a:spAutoFit/>
+          </a:bodyPr>
+          <a:lstStyle/>
+          <a:p>
+            <a:r>
+              <a:rPr lang="en-US" sz="2000"/>
+              <a:t>Thanh toán</a:t>
+            </a:r>
           </a:p>
         </p:txBody>
       </p:sp>
     </p:spTree>
     <p:extLst>
       <p:ext uri="{BB962C8B-B14F-4D97-AF65-F5344CB8AC3E}">
-        <p14:creationId xmlns:p14="http://schemas.microsoft.com/office/powerpoint/2010/main" val="3382200452"/>
+        <p14:creationId xmlns:p14="http://schemas.microsoft.com/office/powerpoint/2010/main" val="4185663629"/>
       </p:ext>
     </p:extLst>
   </p:cSld>
@@ -4241,560 +4551,7 @@
 </p:sld>
 </file>
 
-<file path=ppt/slides/slide3.xml><?xml version="1.0" encoding="utf-8"?>
-<p:sld xmlns:a="http://schemas.openxmlformats.org/drawingml/2006/main" xmlns:r="http://schemas.openxmlformats.org/officeDocument/2006/relationships" xmlns:p="http://schemas.openxmlformats.org/presentationml/2006/main">
-  <p:cSld>
-    <p:spTree>
-      <p:nvGrpSpPr>
-        <p:cNvPr id="1" name=""/>
-        <p:cNvGrpSpPr/>
-        <p:nvPr/>
-      </p:nvGrpSpPr>
-      <p:grpSpPr>
-        <a:xfrm>
-          <a:off x="0" y="0"/>
-          <a:ext cx="0" cy="0"/>
-          <a:chOff x="0" y="0"/>
-          <a:chExt cx="0" cy="0"/>
-        </a:xfrm>
-      </p:grpSpPr>
-      <p:sp>
-        <p:nvSpPr>
-          <p:cNvPr id="4" name="Rectangle 3">
-            <a:extLst>
-              <a:ext uri="{FF2B5EF4-FFF2-40B4-BE49-F238E27FC236}">
-                <a16:creationId xmlns:a16="http://schemas.microsoft.com/office/drawing/2014/main" id="{39297C41-66FA-4859-B4BF-9F5A3487F485}"/>
-              </a:ext>
-            </a:extLst>
-          </p:cNvPr>
-          <p:cNvSpPr/>
-          <p:nvPr/>
-        </p:nvSpPr>
-        <p:spPr>
-          <a:xfrm>
-            <a:off x="3157632" y="1753506"/>
-            <a:ext cx="5876729" cy="3350985"/>
-          </a:xfrm>
-          <a:prstGeom prst="rect">
-            <a:avLst/>
-          </a:prstGeom>
-          <a:solidFill>
-            <a:schemeClr val="accent5">
-              <a:lumMod val="20000"/>
-              <a:lumOff val="80000"/>
-            </a:schemeClr>
-          </a:solidFill>
-        </p:spPr>
-        <p:style>
-          <a:lnRef idx="2">
-            <a:schemeClr val="accent1">
-              <a:shade val="50000"/>
-            </a:schemeClr>
-          </a:lnRef>
-          <a:fillRef idx="1">
-            <a:schemeClr val="accent1"/>
-          </a:fillRef>
-          <a:effectRef idx="0">
-            <a:schemeClr val="accent1"/>
-          </a:effectRef>
-          <a:fontRef idx="minor">
-            <a:schemeClr val="lt1"/>
-          </a:fontRef>
-        </p:style>
-        <p:txBody>
-          <a:bodyPr rtlCol="0" anchor="ctr"/>
-          <a:lstStyle/>
-          <a:p>
-            <a:pPr algn="ctr"/>
-            <a:endParaRPr lang="en-US" dirty="0"/>
-          </a:p>
-        </p:txBody>
-      </p:sp>
-      <p:sp>
-        <p:nvSpPr>
-          <p:cNvPr id="6" name="TextBox 5">
-            <a:extLst>
-              <a:ext uri="{FF2B5EF4-FFF2-40B4-BE49-F238E27FC236}">
-                <a16:creationId xmlns:a16="http://schemas.microsoft.com/office/drawing/2014/main" id="{5D866BAD-73D5-4E6C-98E3-8F6F41E99FA7}"/>
-              </a:ext>
-            </a:extLst>
-          </p:cNvPr>
-          <p:cNvSpPr txBox="1"/>
-          <p:nvPr/>
-        </p:nvSpPr>
-        <p:spPr>
-          <a:xfrm>
-            <a:off x="5399203" y="1895080"/>
-            <a:ext cx="1393585" cy="369332"/>
-          </a:xfrm>
-          <a:prstGeom prst="rect">
-            <a:avLst/>
-          </a:prstGeom>
-          <a:noFill/>
-        </p:spPr>
-        <p:txBody>
-          <a:bodyPr wrap="square" rtlCol="0">
-            <a:spAutoFit/>
-          </a:bodyPr>
-          <a:lstStyle/>
-          <a:p>
-            <a:r>
-              <a:rPr lang="en-US" dirty="0">
-                <a:solidFill>
-                  <a:schemeClr val="tx2"/>
-                </a:solidFill>
-              </a:rPr>
-              <a:t>ĐĂNG NHẬP</a:t>
-            </a:r>
-          </a:p>
-        </p:txBody>
-      </p:sp>
-      <p:sp>
-        <p:nvSpPr>
-          <p:cNvPr id="9" name="Rectangle: Rounded Corners 8">
-            <a:extLst>
-              <a:ext uri="{FF2B5EF4-FFF2-40B4-BE49-F238E27FC236}">
-                <a16:creationId xmlns:a16="http://schemas.microsoft.com/office/drawing/2014/main" id="{91F3BC59-1E56-4433-81AF-2CEAAE8621E1}"/>
-              </a:ext>
-            </a:extLst>
-          </p:cNvPr>
-          <p:cNvSpPr/>
-          <p:nvPr/>
-        </p:nvSpPr>
-        <p:spPr>
-          <a:xfrm>
-            <a:off x="4271596" y="3941180"/>
-            <a:ext cx="3648808" cy="510833"/>
-          </a:xfrm>
-          <a:prstGeom prst="roundRect">
-            <a:avLst/>
-          </a:prstGeom>
-          <a:solidFill>
-            <a:schemeClr val="accent6">
-              <a:lumMod val="40000"/>
-              <a:lumOff val="60000"/>
-            </a:schemeClr>
-          </a:solidFill>
-          <a:scene3d>
-            <a:camera prst="orthographicFront"/>
-            <a:lightRig rig="threePt" dir="t"/>
-          </a:scene3d>
-          <a:sp3d>
-            <a:bevelT w="38100" h="38100" prst="angle"/>
-          </a:sp3d>
-        </p:spPr>
-        <p:style>
-          <a:lnRef idx="2">
-            <a:schemeClr val="accent1">
-              <a:shade val="50000"/>
-            </a:schemeClr>
-          </a:lnRef>
-          <a:fillRef idx="1">
-            <a:schemeClr val="accent1"/>
-          </a:fillRef>
-          <a:effectRef idx="0">
-            <a:schemeClr val="accent1"/>
-          </a:effectRef>
-          <a:fontRef idx="minor">
-            <a:schemeClr val="lt1"/>
-          </a:fontRef>
-        </p:style>
-        <p:txBody>
-          <a:bodyPr rtlCol="0" anchor="ctr"/>
-          <a:lstStyle/>
-          <a:p>
-            <a:pPr algn="ctr"/>
-            <a:r>
-              <a:rPr lang="vi-VN" dirty="0">
-                <a:solidFill>
-                  <a:schemeClr val="tx2"/>
-                </a:solidFill>
-              </a:rPr>
-              <a:t>Login</a:t>
-            </a:r>
-            <a:endParaRPr lang="en-US" dirty="0">
-              <a:solidFill>
-                <a:schemeClr val="tx2"/>
-              </a:solidFill>
-            </a:endParaRPr>
-          </a:p>
-        </p:txBody>
-      </p:sp>
-      <p:sp>
-        <p:nvSpPr>
-          <p:cNvPr id="10" name="TextBox 9">
-            <a:extLst>
-              <a:ext uri="{FF2B5EF4-FFF2-40B4-BE49-F238E27FC236}">
-                <a16:creationId xmlns:a16="http://schemas.microsoft.com/office/drawing/2014/main" id="{3115243B-F508-4C91-9EFD-E603E6F20542}"/>
-              </a:ext>
-            </a:extLst>
-          </p:cNvPr>
-          <p:cNvSpPr txBox="1"/>
-          <p:nvPr/>
-        </p:nvSpPr>
-        <p:spPr>
-          <a:xfrm>
-            <a:off x="5367700" y="4624363"/>
-            <a:ext cx="1456595" cy="307777"/>
-          </a:xfrm>
-          <a:prstGeom prst="rect">
-            <a:avLst/>
-          </a:prstGeom>
-          <a:noFill/>
-        </p:spPr>
-        <p:txBody>
-          <a:bodyPr wrap="square" rtlCol="0">
-            <a:spAutoFit/>
-          </a:bodyPr>
-          <a:lstStyle/>
-          <a:p>
-            <a:r>
-              <a:rPr lang="vi-VN" sz="1400" u="sng" dirty="0">
-                <a:solidFill>
-                  <a:schemeClr val="tx2"/>
-                </a:solidFill>
-              </a:rPr>
-              <a:t>Quên mật khẩu</a:t>
-            </a:r>
-            <a:endParaRPr lang="en-US" sz="1400" u="sng" dirty="0">
-              <a:solidFill>
-                <a:schemeClr val="tx2"/>
-              </a:solidFill>
-            </a:endParaRPr>
-          </a:p>
-        </p:txBody>
-      </p:sp>
-      <p:sp>
-        <p:nvSpPr>
-          <p:cNvPr id="13" name="Rectangle: Rounded Corners 12">
-            <a:extLst>
-              <a:ext uri="{FF2B5EF4-FFF2-40B4-BE49-F238E27FC236}">
-                <a16:creationId xmlns:a16="http://schemas.microsoft.com/office/drawing/2014/main" id="{D5255CCB-47C1-4FA7-86AC-02C3D3D8B3B3}"/>
-              </a:ext>
-            </a:extLst>
-          </p:cNvPr>
-          <p:cNvSpPr/>
-          <p:nvPr/>
-        </p:nvSpPr>
-        <p:spPr>
-          <a:xfrm>
-            <a:off x="4271591" y="3173580"/>
-            <a:ext cx="3648808" cy="510833"/>
-          </a:xfrm>
-          <a:prstGeom prst="roundRect">
-            <a:avLst/>
-          </a:prstGeom>
-          <a:solidFill>
-            <a:srgbClr val="FBD7D7"/>
-          </a:solidFill>
-          <a:ln>
-            <a:solidFill>
-              <a:srgbClr val="B20C0C"/>
-            </a:solidFill>
-          </a:ln>
-        </p:spPr>
-        <p:style>
-          <a:lnRef idx="2">
-            <a:schemeClr val="accent1">
-              <a:shade val="50000"/>
-            </a:schemeClr>
-          </a:lnRef>
-          <a:fillRef idx="1">
-            <a:schemeClr val="accent1"/>
-          </a:fillRef>
-          <a:effectRef idx="0">
-            <a:schemeClr val="accent1"/>
-          </a:effectRef>
-          <a:fontRef idx="minor">
-            <a:schemeClr val="lt1"/>
-          </a:fontRef>
-        </p:style>
-        <p:txBody>
-          <a:bodyPr rtlCol="0" anchor="ctr"/>
-          <a:lstStyle/>
-          <a:p>
-            <a:pPr algn="ctr"/>
-            <a:endParaRPr lang="en-US"/>
-          </a:p>
-        </p:txBody>
-      </p:sp>
-      <p:sp>
-        <p:nvSpPr>
-          <p:cNvPr id="14" name="Rectangle: Rounded Corners 13">
-            <a:extLst>
-              <a:ext uri="{FF2B5EF4-FFF2-40B4-BE49-F238E27FC236}">
-                <a16:creationId xmlns:a16="http://schemas.microsoft.com/office/drawing/2014/main" id="{A83DCB03-EB53-46B7-B8E6-A29DF49076DD}"/>
-              </a:ext>
-            </a:extLst>
-          </p:cNvPr>
-          <p:cNvSpPr/>
-          <p:nvPr/>
-        </p:nvSpPr>
-        <p:spPr>
-          <a:xfrm>
-            <a:off x="4271591" y="2405980"/>
-            <a:ext cx="3648808" cy="510833"/>
-          </a:xfrm>
-          <a:prstGeom prst="roundRect">
-            <a:avLst/>
-          </a:prstGeom>
-          <a:solidFill>
-            <a:schemeClr val="bg1"/>
-          </a:solidFill>
-        </p:spPr>
-        <p:style>
-          <a:lnRef idx="2">
-            <a:schemeClr val="accent1">
-              <a:shade val="50000"/>
-            </a:schemeClr>
-          </a:lnRef>
-          <a:fillRef idx="1">
-            <a:schemeClr val="accent1"/>
-          </a:fillRef>
-          <a:effectRef idx="0">
-            <a:schemeClr val="accent1"/>
-          </a:effectRef>
-          <a:fontRef idx="minor">
-            <a:schemeClr val="lt1"/>
-          </a:fontRef>
-        </p:style>
-        <p:txBody>
-          <a:bodyPr rtlCol="0" anchor="ctr"/>
-          <a:lstStyle/>
-          <a:p>
-            <a:pPr algn="ctr"/>
-            <a:endParaRPr lang="en-US"/>
-          </a:p>
-        </p:txBody>
-      </p:sp>
-      <p:sp>
-        <p:nvSpPr>
-          <p:cNvPr id="11" name="TextBox 10">
-            <a:extLst>
-              <a:ext uri="{FF2B5EF4-FFF2-40B4-BE49-F238E27FC236}">
-                <a16:creationId xmlns:a16="http://schemas.microsoft.com/office/drawing/2014/main" id="{49A1C479-B19B-4562-A60E-9B3EB5530ED0}"/>
-              </a:ext>
-            </a:extLst>
-          </p:cNvPr>
-          <p:cNvSpPr txBox="1"/>
-          <p:nvPr/>
-        </p:nvSpPr>
-        <p:spPr>
-          <a:xfrm>
-            <a:off x="4385891" y="3275107"/>
-            <a:ext cx="2683124" cy="307777"/>
-          </a:xfrm>
-          <a:prstGeom prst="rect">
-            <a:avLst/>
-          </a:prstGeom>
-          <a:noFill/>
-        </p:spPr>
-        <p:txBody>
-          <a:bodyPr wrap="square" rtlCol="0">
-            <a:spAutoFit/>
-          </a:bodyPr>
-          <a:lstStyle/>
-          <a:p>
-            <a:r>
-              <a:rPr lang="en-US" sz="1400" dirty="0" err="1">
-                <a:solidFill>
-                  <a:srgbClr val="E67474"/>
-                </a:solidFill>
-                <a:latin typeface="Arial" panose="020B0604020202020204" pitchFamily="34" charset="0"/>
-                <a:cs typeface="Arial" panose="020B0604020202020204" pitchFamily="34" charset="0"/>
-              </a:rPr>
-              <a:t>Mật</a:t>
-            </a:r>
-            <a:r>
-              <a:rPr lang="en-US" sz="1400" dirty="0">
-                <a:solidFill>
-                  <a:srgbClr val="E67474"/>
-                </a:solidFill>
-                <a:latin typeface="Arial" panose="020B0604020202020204" pitchFamily="34" charset="0"/>
-                <a:cs typeface="Arial" panose="020B0604020202020204" pitchFamily="34" charset="0"/>
-              </a:rPr>
-              <a:t> </a:t>
-            </a:r>
-            <a:r>
-              <a:rPr lang="en-US" sz="1400" dirty="0" err="1">
-                <a:solidFill>
-                  <a:srgbClr val="E67474"/>
-                </a:solidFill>
-                <a:latin typeface="Arial" panose="020B0604020202020204" pitchFamily="34" charset="0"/>
-                <a:cs typeface="Arial" panose="020B0604020202020204" pitchFamily="34" charset="0"/>
-              </a:rPr>
-              <a:t>khẩu</a:t>
-            </a:r>
-            <a:r>
-              <a:rPr lang="en-US" sz="1400" dirty="0">
-                <a:solidFill>
-                  <a:srgbClr val="E67474"/>
-                </a:solidFill>
-                <a:latin typeface="Arial" panose="020B0604020202020204" pitchFamily="34" charset="0"/>
-                <a:cs typeface="Arial" panose="020B0604020202020204" pitchFamily="34" charset="0"/>
-              </a:rPr>
-              <a:t> </a:t>
-            </a:r>
-            <a:r>
-              <a:rPr lang="en-US" sz="1400" dirty="0" err="1">
-                <a:solidFill>
-                  <a:srgbClr val="E67474"/>
-                </a:solidFill>
-                <a:latin typeface="Arial" panose="020B0604020202020204" pitchFamily="34" charset="0"/>
-                <a:cs typeface="Arial" panose="020B0604020202020204" pitchFamily="34" charset="0"/>
-              </a:rPr>
-              <a:t>không</a:t>
-            </a:r>
-            <a:r>
-              <a:rPr lang="en-US" sz="1400" dirty="0">
-                <a:solidFill>
-                  <a:srgbClr val="E67474"/>
-                </a:solidFill>
-                <a:latin typeface="Arial" panose="020B0604020202020204" pitchFamily="34" charset="0"/>
-                <a:cs typeface="Arial" panose="020B0604020202020204" pitchFamily="34" charset="0"/>
-              </a:rPr>
-              <a:t> </a:t>
-            </a:r>
-            <a:r>
-              <a:rPr lang="en-US" sz="1400" dirty="0" err="1">
-                <a:solidFill>
-                  <a:srgbClr val="E67474"/>
-                </a:solidFill>
-                <a:latin typeface="Arial" panose="020B0604020202020204" pitchFamily="34" charset="0"/>
-                <a:cs typeface="Arial" panose="020B0604020202020204" pitchFamily="34" charset="0"/>
-              </a:rPr>
-              <a:t>đúng</a:t>
-            </a:r>
-            <a:endParaRPr lang="en-US" sz="1400" dirty="0">
-              <a:solidFill>
-                <a:srgbClr val="E67474"/>
-              </a:solidFill>
-              <a:latin typeface="Arial" panose="020B0604020202020204" pitchFamily="34" charset="0"/>
-              <a:cs typeface="Arial" panose="020B0604020202020204" pitchFamily="34" charset="0"/>
-            </a:endParaRPr>
-          </a:p>
-        </p:txBody>
-      </p:sp>
-      <p:sp>
-        <p:nvSpPr>
-          <p:cNvPr id="12" name="TextBox 11">
-            <a:extLst>
-              <a:ext uri="{FF2B5EF4-FFF2-40B4-BE49-F238E27FC236}">
-                <a16:creationId xmlns:a16="http://schemas.microsoft.com/office/drawing/2014/main" id="{80A12396-906F-4F82-861F-8F2FA3FF7D61}"/>
-              </a:ext>
-            </a:extLst>
-          </p:cNvPr>
-          <p:cNvSpPr txBox="1"/>
-          <p:nvPr/>
-        </p:nvSpPr>
-        <p:spPr>
-          <a:xfrm>
-            <a:off x="4385891" y="2507508"/>
-            <a:ext cx="1863970" cy="307777"/>
-          </a:xfrm>
-          <a:prstGeom prst="rect">
-            <a:avLst/>
-          </a:prstGeom>
-          <a:noFill/>
-        </p:spPr>
-        <p:txBody>
-          <a:bodyPr wrap="square" rtlCol="0">
-            <a:spAutoFit/>
-          </a:bodyPr>
-          <a:lstStyle/>
-          <a:p>
-            <a:r>
-              <a:rPr lang="en-US" sz="1400" dirty="0" err="1">
-                <a:solidFill>
-                  <a:schemeClr val="accent1">
-                    <a:lumMod val="40000"/>
-                    <a:lumOff val="60000"/>
-                  </a:schemeClr>
-                </a:solidFill>
-                <a:latin typeface="Arial" panose="020B0604020202020204" pitchFamily="34" charset="0"/>
-                <a:cs typeface="Arial" panose="020B0604020202020204" pitchFamily="34" charset="0"/>
-              </a:rPr>
-              <a:t>Tên</a:t>
-            </a:r>
-            <a:r>
-              <a:rPr lang="en-US" sz="1400" dirty="0">
-                <a:solidFill>
-                  <a:schemeClr val="accent1">
-                    <a:lumMod val="40000"/>
-                    <a:lumOff val="60000"/>
-                  </a:schemeClr>
-                </a:solidFill>
-                <a:latin typeface="Arial" panose="020B0604020202020204" pitchFamily="34" charset="0"/>
-                <a:cs typeface="Arial" panose="020B0604020202020204" pitchFamily="34" charset="0"/>
-              </a:rPr>
-              <a:t> </a:t>
-            </a:r>
-            <a:r>
-              <a:rPr lang="en-US" sz="1400" dirty="0" err="1">
-                <a:solidFill>
-                  <a:schemeClr val="accent1">
-                    <a:lumMod val="40000"/>
-                    <a:lumOff val="60000"/>
-                  </a:schemeClr>
-                </a:solidFill>
-                <a:latin typeface="Arial" panose="020B0604020202020204" pitchFamily="34" charset="0"/>
-                <a:cs typeface="Arial" panose="020B0604020202020204" pitchFamily="34" charset="0"/>
-              </a:rPr>
-              <a:t>đăng</a:t>
-            </a:r>
-            <a:r>
-              <a:rPr lang="en-US" sz="1400" dirty="0">
-                <a:solidFill>
-                  <a:schemeClr val="accent1">
-                    <a:lumMod val="40000"/>
-                    <a:lumOff val="60000"/>
-                  </a:schemeClr>
-                </a:solidFill>
-                <a:latin typeface="Arial" panose="020B0604020202020204" pitchFamily="34" charset="0"/>
-                <a:cs typeface="Arial" panose="020B0604020202020204" pitchFamily="34" charset="0"/>
-              </a:rPr>
-              <a:t> </a:t>
-            </a:r>
-            <a:r>
-              <a:rPr lang="en-US" sz="1400" dirty="0" err="1">
-                <a:solidFill>
-                  <a:schemeClr val="accent1">
-                    <a:lumMod val="40000"/>
-                    <a:lumOff val="60000"/>
-                  </a:schemeClr>
-                </a:solidFill>
-                <a:latin typeface="Arial" panose="020B0604020202020204" pitchFamily="34" charset="0"/>
-                <a:cs typeface="Arial" panose="020B0604020202020204" pitchFamily="34" charset="0"/>
-              </a:rPr>
-              <a:t>nhập</a:t>
-            </a:r>
-            <a:endParaRPr lang="en-US" sz="1400" dirty="0">
-              <a:solidFill>
-                <a:schemeClr val="accent1">
-                  <a:lumMod val="40000"/>
-                  <a:lumOff val="60000"/>
-                </a:schemeClr>
-              </a:solidFill>
-              <a:latin typeface="Arial" panose="020B0604020202020204" pitchFamily="34" charset="0"/>
-              <a:cs typeface="Arial" panose="020B0604020202020204" pitchFamily="34" charset="0"/>
-            </a:endParaRPr>
-          </a:p>
-        </p:txBody>
-      </p:sp>
-    </p:spTree>
-    <p:extLst>
-      <p:ext uri="{BB962C8B-B14F-4D97-AF65-F5344CB8AC3E}">
-        <p14:creationId xmlns:p14="http://schemas.microsoft.com/office/powerpoint/2010/main" val="1989956914"/>
-      </p:ext>
-    </p:extLst>
-  </p:cSld>
-  <p:clrMapOvr>
-    <a:masterClrMapping/>
-  </p:clrMapOvr>
-</p:sld>
-</file>
-
-<file path=ppt/slides/slide4.xml><?xml version="1.0" encoding="utf-8"?>
+<file path=ppt/slides/slide2.xml><?xml version="1.0" encoding="utf-8"?>
 <p:sld xmlns:a="http://schemas.openxmlformats.org/drawingml/2006/main" xmlns:r="http://schemas.openxmlformats.org/officeDocument/2006/relationships" xmlns:p="http://schemas.openxmlformats.org/presentationml/2006/main">
   <p:cSld>
     <p:spTree>

</xml_diff>

<commit_message>
Revert "Phiên bản đầu của Thùy"
This reverts commit d04ccfa47c072a2b6acef9d1a6b3b2e796b2f298.
</commit_message>
<xml_diff>
--- a/login.pptx
+++ b/login.pptx
@@ -6,7 +6,9 @@
   </p:sldMasterIdLst>
   <p:sldIdLst>
     <p:sldId id="256" r:id="rId2"/>
-    <p:sldId id="257" r:id="rId3"/>
+    <p:sldId id="258" r:id="rId3"/>
+    <p:sldId id="259" r:id="rId4"/>
+    <p:sldId id="257" r:id="rId5"/>
   </p:sldIdLst>
   <p:sldSz cx="12192000" cy="6858000"/>
   <p:notesSz cx="6858000" cy="9144000"/>
@@ -260,7 +262,7 @@
           <a:p>
             <a:fld id="{9E46A277-767F-43FC-B4C2-E33FE12B25BD}" type="datetimeFigureOut">
               <a:rPr lang="en-US" smtClean="0"/>
-              <a:t>06-Apr-18</a:t>
+              <a:t>2018-04-06</a:t>
             </a:fld>
             <a:endParaRPr lang="en-US"/>
           </a:p>
@@ -458,7 +460,7 @@
           <a:p>
             <a:fld id="{9E46A277-767F-43FC-B4C2-E33FE12B25BD}" type="datetimeFigureOut">
               <a:rPr lang="en-US" smtClean="0"/>
-              <a:t>06-Apr-18</a:t>
+              <a:t>2018-04-06</a:t>
             </a:fld>
             <a:endParaRPr lang="en-US"/>
           </a:p>
@@ -666,7 +668,7 @@
           <a:p>
             <a:fld id="{9E46A277-767F-43FC-B4C2-E33FE12B25BD}" type="datetimeFigureOut">
               <a:rPr lang="en-US" smtClean="0"/>
-              <a:t>06-Apr-18</a:t>
+              <a:t>2018-04-06</a:t>
             </a:fld>
             <a:endParaRPr lang="en-US"/>
           </a:p>
@@ -864,7 +866,7 @@
           <a:p>
             <a:fld id="{9E46A277-767F-43FC-B4C2-E33FE12B25BD}" type="datetimeFigureOut">
               <a:rPr lang="en-US" smtClean="0"/>
-              <a:t>06-Apr-18</a:t>
+              <a:t>2018-04-06</a:t>
             </a:fld>
             <a:endParaRPr lang="en-US"/>
           </a:p>
@@ -1139,7 +1141,7 @@
           <a:p>
             <a:fld id="{9E46A277-767F-43FC-B4C2-E33FE12B25BD}" type="datetimeFigureOut">
               <a:rPr lang="en-US" smtClean="0"/>
-              <a:t>06-Apr-18</a:t>
+              <a:t>2018-04-06</a:t>
             </a:fld>
             <a:endParaRPr lang="en-US"/>
           </a:p>
@@ -1404,7 +1406,7 @@
           <a:p>
             <a:fld id="{9E46A277-767F-43FC-B4C2-E33FE12B25BD}" type="datetimeFigureOut">
               <a:rPr lang="en-US" smtClean="0"/>
-              <a:t>06-Apr-18</a:t>
+              <a:t>2018-04-06</a:t>
             </a:fld>
             <a:endParaRPr lang="en-US"/>
           </a:p>
@@ -1816,7 +1818,7 @@
           <a:p>
             <a:fld id="{9E46A277-767F-43FC-B4C2-E33FE12B25BD}" type="datetimeFigureOut">
               <a:rPr lang="en-US" smtClean="0"/>
-              <a:t>06-Apr-18</a:t>
+              <a:t>2018-04-06</a:t>
             </a:fld>
             <a:endParaRPr lang="en-US"/>
           </a:p>
@@ -1957,7 +1959,7 @@
           <a:p>
             <a:fld id="{9E46A277-767F-43FC-B4C2-E33FE12B25BD}" type="datetimeFigureOut">
               <a:rPr lang="en-US" smtClean="0"/>
-              <a:t>06-Apr-18</a:t>
+              <a:t>2018-04-06</a:t>
             </a:fld>
             <a:endParaRPr lang="en-US"/>
           </a:p>
@@ -2070,7 +2072,7 @@
           <a:p>
             <a:fld id="{9E46A277-767F-43FC-B4C2-E33FE12B25BD}" type="datetimeFigureOut">
               <a:rPr lang="en-US" smtClean="0"/>
-              <a:t>06-Apr-18</a:t>
+              <a:t>2018-04-06</a:t>
             </a:fld>
             <a:endParaRPr lang="en-US"/>
           </a:p>
@@ -2381,7 +2383,7 @@
           <a:p>
             <a:fld id="{9E46A277-767F-43FC-B4C2-E33FE12B25BD}" type="datetimeFigureOut">
               <a:rPr lang="en-US" smtClean="0"/>
-              <a:t>06-Apr-18</a:t>
+              <a:t>2018-04-06</a:t>
             </a:fld>
             <a:endParaRPr lang="en-US"/>
           </a:p>
@@ -2669,7 +2671,7 @@
           <a:p>
             <a:fld id="{9E46A277-767F-43FC-B4C2-E33FE12B25BD}" type="datetimeFigureOut">
               <a:rPr lang="en-US" smtClean="0"/>
-              <a:t>06-Apr-18</a:t>
+              <a:t>2018-04-06</a:t>
             </a:fld>
             <a:endParaRPr lang="en-US"/>
           </a:p>
@@ -2910,7 +2912,7 @@
           <a:p>
             <a:fld id="{9E46A277-767F-43FC-B4C2-E33FE12B25BD}" type="datetimeFigureOut">
               <a:rPr lang="en-US" smtClean="0"/>
-              <a:t>06-Apr-18</a:t>
+              <a:t>2018-04-06</a:t>
             </a:fld>
             <a:endParaRPr lang="en-US"/>
           </a:p>
@@ -3313,21 +3315,6 @@
 <file path=ppt/slides/slide1.xml><?xml version="1.0" encoding="utf-8"?>
 <p:sld xmlns:a="http://schemas.openxmlformats.org/drawingml/2006/main" xmlns:r="http://schemas.openxmlformats.org/officeDocument/2006/relationships" xmlns:p="http://schemas.openxmlformats.org/presentationml/2006/main">
   <p:cSld>
-    <p:bg>
-      <p:bgPr>
-        <a:blipFill dpi="0" rotWithShape="1">
-          <a:blip r:embed="rId2">
-            <a:alphaModFix amt="77000"/>
-            <a:lum/>
-          </a:blip>
-          <a:srcRect/>
-          <a:stretch>
-            <a:fillRect t="10000" b="8000"/>
-          </a:stretch>
-        </a:blipFill>
-        <a:effectLst/>
-      </p:bgPr>
-    </p:bg>
     <p:spTree>
       <p:nvGrpSpPr>
         <p:cNvPr id="1" name=""/>
@@ -3344,6 +3331,58 @@
       </p:grpSpPr>
       <p:sp>
         <p:nvSpPr>
+          <p:cNvPr id="4" name="Rectangle 3">
+            <a:extLst>
+              <a:ext uri="{FF2B5EF4-FFF2-40B4-BE49-F238E27FC236}">
+                <a16:creationId xmlns:a16="http://schemas.microsoft.com/office/drawing/2014/main" id="{39297C41-66FA-4859-B4BF-9F5A3487F485}"/>
+              </a:ext>
+            </a:extLst>
+          </p:cNvPr>
+          <p:cNvSpPr/>
+          <p:nvPr/>
+        </p:nvSpPr>
+        <p:spPr>
+          <a:xfrm>
+            <a:off x="3157632" y="1753506"/>
+            <a:ext cx="5876729" cy="3350985"/>
+          </a:xfrm>
+          <a:prstGeom prst="rect">
+            <a:avLst/>
+          </a:prstGeom>
+          <a:solidFill>
+            <a:schemeClr val="accent5">
+              <a:lumMod val="20000"/>
+              <a:lumOff val="80000"/>
+            </a:schemeClr>
+          </a:solidFill>
+        </p:spPr>
+        <p:style>
+          <a:lnRef idx="2">
+            <a:schemeClr val="accent1">
+              <a:shade val="50000"/>
+            </a:schemeClr>
+          </a:lnRef>
+          <a:fillRef idx="1">
+            <a:schemeClr val="accent1"/>
+          </a:fillRef>
+          <a:effectRef idx="0">
+            <a:schemeClr val="accent1"/>
+          </a:effectRef>
+          <a:fontRef idx="minor">
+            <a:schemeClr val="lt1"/>
+          </a:fontRef>
+        </p:style>
+        <p:txBody>
+          <a:bodyPr rtlCol="0" anchor="ctr"/>
+          <a:lstStyle/>
+          <a:p>
+            <a:pPr algn="ctr"/>
+            <a:endParaRPr lang="en-US" dirty="0"/>
+          </a:p>
+        </p:txBody>
+      </p:sp>
+      <p:sp>
+        <p:nvSpPr>
           <p:cNvPr id="6" name="TextBox 5">
             <a:extLst>
               <a:ext uri="{FF2B5EF4-FFF2-40B4-BE49-F238E27FC236}">
@@ -3356,8 +3395,8 @@
         </p:nvSpPr>
         <p:spPr>
           <a:xfrm>
-            <a:off x="4937943" y="1617756"/>
-            <a:ext cx="3267075" cy="369332"/>
+            <a:off x="5399203" y="1895080"/>
+            <a:ext cx="1393585" cy="369332"/>
           </a:xfrm>
           <a:prstGeom prst="rect">
             <a:avLst/>
@@ -3371,13 +3410,12 @@
           <a:lstStyle/>
           <a:p>
             <a:r>
-              <a:rPr lang="en-US">
+              <a:rPr lang="en-US" dirty="0">
                 <a:solidFill>
-                  <a:srgbClr val="FFFF00"/>
+                  <a:schemeClr val="tx2"/>
                 </a:solidFill>
-                <a:latin typeface="Blackoak Std" panose="04050907060602020202" pitchFamily="82" charset="0"/>
               </a:rPr>
-              <a:t>SIGN IN</a:t>
+              <a:t>ĐĂNG NHẬP</a:t>
             </a:r>
           </a:p>
         </p:txBody>
@@ -3396,8 +3434,8 @@
         </p:nvSpPr>
         <p:spPr>
           <a:xfrm>
-            <a:off x="3897921" y="2171754"/>
-            <a:ext cx="4396154" cy="615462"/>
+            <a:off x="4271596" y="2405986"/>
+            <a:ext cx="3648808" cy="510833"/>
           </a:xfrm>
           <a:prstGeom prst="roundRect">
             <a:avLst/>
@@ -3445,8 +3483,8 @@
         </p:nvSpPr>
         <p:spPr>
           <a:xfrm>
-            <a:off x="3897921" y="2989545"/>
-            <a:ext cx="4396154" cy="615462"/>
+            <a:off x="4271596" y="3173583"/>
+            <a:ext cx="3648808" cy="510833"/>
           </a:xfrm>
           <a:prstGeom prst="roundRect">
             <a:avLst/>
@@ -3494,8 +3532,8 @@
         </p:nvSpPr>
         <p:spPr>
           <a:xfrm>
-            <a:off x="3897921" y="3807336"/>
-            <a:ext cx="4396154" cy="615462"/>
+            <a:off x="4271596" y="3941180"/>
+            <a:ext cx="3648808" cy="510833"/>
           </a:xfrm>
           <a:prstGeom prst="roundRect">
             <a:avLst/>
@@ -3504,6 +3542,251 @@
             <a:schemeClr val="accent6">
               <a:lumMod val="40000"/>
               <a:lumOff val="60000"/>
+            </a:schemeClr>
+          </a:solidFill>
+          <a:scene3d>
+            <a:camera prst="orthographicFront"/>
+            <a:lightRig rig="threePt" dir="t"/>
+          </a:scene3d>
+          <a:sp3d>
+            <a:bevelT w="38100" h="38100" prst="angle"/>
+          </a:sp3d>
+        </p:spPr>
+        <p:style>
+          <a:lnRef idx="2">
+            <a:schemeClr val="accent1">
+              <a:shade val="50000"/>
+            </a:schemeClr>
+          </a:lnRef>
+          <a:fillRef idx="1">
+            <a:schemeClr val="accent1"/>
+          </a:fillRef>
+          <a:effectRef idx="0">
+            <a:schemeClr val="accent1"/>
+          </a:effectRef>
+          <a:fontRef idx="minor">
+            <a:schemeClr val="lt1"/>
+          </a:fontRef>
+        </p:style>
+        <p:txBody>
+          <a:bodyPr rtlCol="0" anchor="ctr"/>
+          <a:lstStyle/>
+          <a:p>
+            <a:pPr algn="ctr"/>
+            <a:r>
+              <a:rPr lang="vi-VN" dirty="0">
+                <a:solidFill>
+                  <a:schemeClr val="tx2"/>
+                </a:solidFill>
+              </a:rPr>
+              <a:t>Login</a:t>
+            </a:r>
+            <a:endParaRPr lang="en-US" dirty="0">
+              <a:solidFill>
+                <a:schemeClr val="tx2"/>
+              </a:solidFill>
+            </a:endParaRPr>
+          </a:p>
+        </p:txBody>
+      </p:sp>
+      <p:sp>
+        <p:nvSpPr>
+          <p:cNvPr id="10" name="TextBox 9">
+            <a:extLst>
+              <a:ext uri="{FF2B5EF4-FFF2-40B4-BE49-F238E27FC236}">
+                <a16:creationId xmlns:a16="http://schemas.microsoft.com/office/drawing/2014/main" id="{3115243B-F508-4C91-9EFD-E603E6F20542}"/>
+              </a:ext>
+            </a:extLst>
+          </p:cNvPr>
+          <p:cNvSpPr txBox="1"/>
+          <p:nvPr/>
+        </p:nvSpPr>
+        <p:spPr>
+          <a:xfrm>
+            <a:off x="5367700" y="4624363"/>
+            <a:ext cx="1456595" cy="307777"/>
+          </a:xfrm>
+          <a:prstGeom prst="rect">
+            <a:avLst/>
+          </a:prstGeom>
+          <a:noFill/>
+        </p:spPr>
+        <p:txBody>
+          <a:bodyPr wrap="square" rtlCol="0">
+            <a:spAutoFit/>
+          </a:bodyPr>
+          <a:lstStyle/>
+          <a:p>
+            <a:r>
+              <a:rPr lang="vi-VN" sz="1400" u="sng" dirty="0">
+                <a:solidFill>
+                  <a:schemeClr val="tx2"/>
+                </a:solidFill>
+              </a:rPr>
+              <a:t>Quên mật khẩu</a:t>
+            </a:r>
+            <a:endParaRPr lang="en-US" sz="1400" u="sng" dirty="0">
+              <a:solidFill>
+                <a:schemeClr val="tx2"/>
+              </a:solidFill>
+            </a:endParaRPr>
+          </a:p>
+        </p:txBody>
+      </p:sp>
+      <p:sp>
+        <p:nvSpPr>
+          <p:cNvPr id="11" name="TextBox 10">
+            <a:extLst>
+              <a:ext uri="{FF2B5EF4-FFF2-40B4-BE49-F238E27FC236}">
+                <a16:creationId xmlns:a16="http://schemas.microsoft.com/office/drawing/2014/main" id="{49A1C479-B19B-4562-A60E-9B3EB5530ED0}"/>
+              </a:ext>
+            </a:extLst>
+          </p:cNvPr>
+          <p:cNvSpPr txBox="1"/>
+          <p:nvPr/>
+        </p:nvSpPr>
+        <p:spPr>
+          <a:xfrm>
+            <a:off x="4385891" y="2507513"/>
+            <a:ext cx="1802423" cy="307777"/>
+          </a:xfrm>
+          <a:prstGeom prst="rect">
+            <a:avLst/>
+          </a:prstGeom>
+          <a:noFill/>
+        </p:spPr>
+        <p:txBody>
+          <a:bodyPr wrap="square" rtlCol="0">
+            <a:spAutoFit/>
+          </a:bodyPr>
+          <a:lstStyle/>
+          <a:p>
+            <a:r>
+              <a:rPr lang="vi-VN" sz="1400" dirty="0">
+                <a:solidFill>
+                  <a:schemeClr val="accent1">
+                    <a:lumMod val="40000"/>
+                    <a:lumOff val="60000"/>
+                  </a:schemeClr>
+                </a:solidFill>
+              </a:rPr>
+              <a:t>Tên đăng nhập</a:t>
+            </a:r>
+            <a:endParaRPr lang="en-US" sz="1400" dirty="0">
+              <a:solidFill>
+                <a:schemeClr val="accent1">
+                  <a:lumMod val="40000"/>
+                  <a:lumOff val="60000"/>
+                </a:schemeClr>
+              </a:solidFill>
+            </a:endParaRPr>
+          </a:p>
+        </p:txBody>
+      </p:sp>
+      <p:sp>
+        <p:nvSpPr>
+          <p:cNvPr id="12" name="TextBox 11">
+            <a:extLst>
+              <a:ext uri="{FF2B5EF4-FFF2-40B4-BE49-F238E27FC236}">
+                <a16:creationId xmlns:a16="http://schemas.microsoft.com/office/drawing/2014/main" id="{80A12396-906F-4F82-861F-8F2FA3FF7D61}"/>
+              </a:ext>
+            </a:extLst>
+          </p:cNvPr>
+          <p:cNvSpPr txBox="1"/>
+          <p:nvPr/>
+        </p:nvSpPr>
+        <p:spPr>
+          <a:xfrm>
+            <a:off x="4385891" y="3275109"/>
+            <a:ext cx="1863970" cy="307777"/>
+          </a:xfrm>
+          <a:prstGeom prst="rect">
+            <a:avLst/>
+          </a:prstGeom>
+          <a:noFill/>
+        </p:spPr>
+        <p:txBody>
+          <a:bodyPr wrap="square" rtlCol="0">
+            <a:spAutoFit/>
+          </a:bodyPr>
+          <a:lstStyle/>
+          <a:p>
+            <a:r>
+              <a:rPr lang="vi-VN" sz="1400" dirty="0">
+                <a:solidFill>
+                  <a:schemeClr val="accent1">
+                    <a:lumMod val="40000"/>
+                    <a:lumOff val="60000"/>
+                  </a:schemeClr>
+                </a:solidFill>
+              </a:rPr>
+              <a:t>Mật khẩu</a:t>
+            </a:r>
+            <a:endParaRPr lang="en-US" sz="1400" dirty="0">
+              <a:solidFill>
+                <a:schemeClr val="accent1">
+                  <a:lumMod val="40000"/>
+                  <a:lumOff val="60000"/>
+                </a:schemeClr>
+              </a:solidFill>
+            </a:endParaRPr>
+          </a:p>
+        </p:txBody>
+      </p:sp>
+    </p:spTree>
+    <p:extLst>
+      <p:ext uri="{BB962C8B-B14F-4D97-AF65-F5344CB8AC3E}">
+        <p14:creationId xmlns:p14="http://schemas.microsoft.com/office/powerpoint/2010/main" val="4185663629"/>
+      </p:ext>
+    </p:extLst>
+  </p:cSld>
+  <p:clrMapOvr>
+    <a:masterClrMapping/>
+  </p:clrMapOvr>
+</p:sld>
+</file>
+
+<file path=ppt/slides/slide2.xml><?xml version="1.0" encoding="utf-8"?>
+<p:sld xmlns:a="http://schemas.openxmlformats.org/drawingml/2006/main" xmlns:r="http://schemas.openxmlformats.org/officeDocument/2006/relationships" xmlns:p="http://schemas.openxmlformats.org/presentationml/2006/main">
+  <p:cSld>
+    <p:spTree>
+      <p:nvGrpSpPr>
+        <p:cNvPr id="1" name=""/>
+        <p:cNvGrpSpPr/>
+        <p:nvPr/>
+      </p:nvGrpSpPr>
+      <p:grpSpPr>
+        <a:xfrm>
+          <a:off x="0" y="0"/>
+          <a:ext cx="0" cy="0"/>
+          <a:chOff x="0" y="0"/>
+          <a:chExt cx="0" cy="0"/>
+        </a:xfrm>
+      </p:grpSpPr>
+      <p:sp>
+        <p:nvSpPr>
+          <p:cNvPr id="4" name="Rectangle 3">
+            <a:extLst>
+              <a:ext uri="{FF2B5EF4-FFF2-40B4-BE49-F238E27FC236}">
+                <a16:creationId xmlns:a16="http://schemas.microsoft.com/office/drawing/2014/main" id="{39297C41-66FA-4859-B4BF-9F5A3487F485}"/>
+              </a:ext>
+            </a:extLst>
+          </p:cNvPr>
+          <p:cNvSpPr/>
+          <p:nvPr/>
+        </p:nvSpPr>
+        <p:spPr>
+          <a:xfrm>
+            <a:off x="3157632" y="1753506"/>
+            <a:ext cx="5876729" cy="3350985"/>
+          </a:xfrm>
+          <a:prstGeom prst="rect">
+            <a:avLst/>
+          </a:prstGeom>
+          <a:solidFill>
+            <a:schemeClr val="accent5">
+              <a:lumMod val="20000"/>
+              <a:lumOff val="80000"/>
             </a:schemeClr>
           </a:solidFill>
         </p:spPr>
@@ -3528,28 +3811,16 @@
           <a:lstStyle/>
           <a:p>
             <a:pPr algn="ctr"/>
-            <a:r>
-              <a:rPr lang="vi-VN">
-                <a:solidFill>
-                  <a:schemeClr val="tx2"/>
-                </a:solidFill>
-              </a:rPr>
-              <a:t>Login</a:t>
-            </a:r>
-            <a:endParaRPr lang="en-US">
-              <a:solidFill>
-                <a:schemeClr val="tx2"/>
-              </a:solidFill>
-            </a:endParaRPr>
-          </a:p>
-        </p:txBody>
-      </p:sp>
-      <p:sp>
-        <p:nvSpPr>
-          <p:cNvPr id="10" name="TextBox 9">
-            <a:extLst>
-              <a:ext uri="{FF2B5EF4-FFF2-40B4-BE49-F238E27FC236}">
-                <a16:creationId xmlns:a16="http://schemas.microsoft.com/office/drawing/2014/main" id="{3115243B-F508-4C91-9EFD-E603E6F20542}"/>
+            <a:endParaRPr lang="en-US" dirty="0"/>
+          </a:p>
+        </p:txBody>
+      </p:sp>
+      <p:sp>
+        <p:nvSpPr>
+          <p:cNvPr id="6" name="TextBox 5">
+            <a:extLst>
+              <a:ext uri="{FF2B5EF4-FFF2-40B4-BE49-F238E27FC236}">
+                <a16:creationId xmlns:a16="http://schemas.microsoft.com/office/drawing/2014/main" id="{5D866BAD-73D5-4E6C-98E3-8F6F41E99FA7}"/>
               </a:ext>
             </a:extLst>
           </p:cNvPr>
@@ -3558,8 +3829,8 @@
         </p:nvSpPr>
         <p:spPr>
           <a:xfrm>
-            <a:off x="5367700" y="4721580"/>
-            <a:ext cx="1795100" cy="307777"/>
+            <a:off x="5399203" y="1895080"/>
+            <a:ext cx="1393585" cy="369332"/>
           </a:xfrm>
           <a:prstGeom prst="rect">
             <a:avLst/>
@@ -3573,414 +3844,43 @@
           <a:lstStyle/>
           <a:p>
             <a:r>
-              <a:rPr lang="vi-VN" sz="1400" u="sng">
+              <a:rPr lang="en-US" dirty="0">
                 <a:solidFill>
                   <a:schemeClr val="tx2"/>
                 </a:solidFill>
               </a:rPr>
-              <a:t>Quên </a:t>
-            </a:r>
-            <a:r>
-              <a:rPr lang="vi-VN" sz="1400" u="sng" err="1">
-                <a:solidFill>
-                  <a:schemeClr val="tx2"/>
-                </a:solidFill>
-              </a:rPr>
-              <a:t>mật</a:t>
-            </a:r>
-            <a:r>
-              <a:rPr lang="vi-VN" sz="1400" u="sng">
-                <a:solidFill>
-                  <a:schemeClr val="tx2"/>
-                </a:solidFill>
-              </a:rPr>
-              <a:t> </a:t>
-            </a:r>
-            <a:r>
-              <a:rPr lang="vi-VN" sz="1400" u="sng" err="1">
-                <a:solidFill>
-                  <a:schemeClr val="tx2"/>
-                </a:solidFill>
-              </a:rPr>
-              <a:t>khẩu</a:t>
-            </a:r>
-            <a:r>
-              <a:rPr lang="en-US" sz="1400" u="sng">
-                <a:solidFill>
-                  <a:schemeClr val="tx2"/>
-                </a:solidFill>
-              </a:rPr>
-              <a:t> ?</a:t>
-            </a:r>
-          </a:p>
-        </p:txBody>
-      </p:sp>
-      <p:sp>
-        <p:nvSpPr>
-          <p:cNvPr id="11" name="TextBox 10">
-            <a:extLst>
-              <a:ext uri="{FF2B5EF4-FFF2-40B4-BE49-F238E27FC236}">
-                <a16:creationId xmlns:a16="http://schemas.microsoft.com/office/drawing/2014/main" id="{49A1C479-B19B-4562-A60E-9B3EB5530ED0}"/>
-              </a:ext>
-            </a:extLst>
-          </p:cNvPr>
-          <p:cNvSpPr txBox="1"/>
+              <a:t>ĐĂNG NHẬP</a:t>
+            </a:r>
+          </a:p>
+        </p:txBody>
+      </p:sp>
+      <p:sp>
+        <p:nvSpPr>
+          <p:cNvPr id="7" name="Rectangle: Rounded Corners 6">
+            <a:extLst>
+              <a:ext uri="{FF2B5EF4-FFF2-40B4-BE49-F238E27FC236}">
+                <a16:creationId xmlns:a16="http://schemas.microsoft.com/office/drawing/2014/main" id="{BFC4D056-A35F-47C7-8F7A-BB2F3DFE7E1B}"/>
+              </a:ext>
+            </a:extLst>
+          </p:cNvPr>
+          <p:cNvSpPr/>
           <p:nvPr/>
         </p:nvSpPr>
         <p:spPr>
           <a:xfrm>
-            <a:off x="4086956" y="2294633"/>
-            <a:ext cx="1802423" cy="369332"/>
+            <a:off x="4271596" y="2405986"/>
+            <a:ext cx="3648808" cy="510833"/>
           </a:xfrm>
-          <a:prstGeom prst="rect">
-            <a:avLst/>
-          </a:prstGeom>
-          <a:noFill/>
-        </p:spPr>
-        <p:txBody>
-          <a:bodyPr wrap="square" rtlCol="0">
-            <a:spAutoFit/>
-          </a:bodyPr>
-          <a:lstStyle/>
-          <a:p>
-            <a:r>
-              <a:rPr lang="vi-VN">
-                <a:solidFill>
-                  <a:schemeClr val="accent1">
-                    <a:lumMod val="40000"/>
-                    <a:lumOff val="60000"/>
-                  </a:schemeClr>
-                </a:solidFill>
-              </a:rPr>
-              <a:t>Tên đăng nhập</a:t>
-            </a:r>
-            <a:endParaRPr lang="en-US">
-              <a:solidFill>
-                <a:schemeClr val="accent1">
-                  <a:lumMod val="40000"/>
-                  <a:lumOff val="60000"/>
-                </a:schemeClr>
-              </a:solidFill>
-            </a:endParaRPr>
-          </a:p>
-        </p:txBody>
-      </p:sp>
-      <p:sp>
-        <p:nvSpPr>
-          <p:cNvPr id="12" name="TextBox 11">
-            <a:extLst>
-              <a:ext uri="{FF2B5EF4-FFF2-40B4-BE49-F238E27FC236}">
-                <a16:creationId xmlns:a16="http://schemas.microsoft.com/office/drawing/2014/main" id="{80A12396-906F-4F82-861F-8F2FA3FF7D61}"/>
-              </a:ext>
-            </a:extLst>
-          </p:cNvPr>
-          <p:cNvSpPr txBox="1"/>
-          <p:nvPr/>
-        </p:nvSpPr>
-        <p:spPr>
-          <a:xfrm>
-            <a:off x="4086956" y="3134431"/>
-            <a:ext cx="1863970" cy="369332"/>
-          </a:xfrm>
-          <a:prstGeom prst="rect">
-            <a:avLst/>
-          </a:prstGeom>
-          <a:noFill/>
-        </p:spPr>
-        <p:txBody>
-          <a:bodyPr wrap="square" rtlCol="0">
-            <a:spAutoFit/>
-          </a:bodyPr>
-          <a:lstStyle/>
-          <a:p>
-            <a:r>
-              <a:rPr lang="vi-VN">
-                <a:solidFill>
-                  <a:schemeClr val="accent1">
-                    <a:lumMod val="40000"/>
-                    <a:lumOff val="60000"/>
-                  </a:schemeClr>
-                </a:solidFill>
-              </a:rPr>
-              <a:t>Mật khẩu</a:t>
-            </a:r>
-            <a:endParaRPr lang="en-US">
-              <a:solidFill>
-                <a:schemeClr val="accent1">
-                  <a:lumMod val="40000"/>
-                  <a:lumOff val="60000"/>
-                </a:schemeClr>
-              </a:solidFill>
-            </a:endParaRPr>
-          </a:p>
-        </p:txBody>
-      </p:sp>
-      <p:sp>
-        <p:nvSpPr>
-          <p:cNvPr id="2" name="Hộp Văn bản 1">
-            <a:extLst>
-              <a:ext uri="{FF2B5EF4-FFF2-40B4-BE49-F238E27FC236}">
-                <a16:creationId xmlns:a16="http://schemas.microsoft.com/office/drawing/2014/main" id="{B5D4435D-73F4-442C-B6CC-CB6AA8BBA8DA}"/>
-              </a:ext>
-            </a:extLst>
-          </p:cNvPr>
-          <p:cNvSpPr txBox="1"/>
-          <p:nvPr/>
-        </p:nvSpPr>
-        <p:spPr>
-          <a:xfrm>
-            <a:off x="5158850" y="5029357"/>
-            <a:ext cx="1874296" cy="369332"/>
-          </a:xfrm>
-          <a:prstGeom prst="rect">
-            <a:avLst/>
-          </a:prstGeom>
-          <a:noFill/>
-        </p:spPr>
-        <p:txBody>
-          <a:bodyPr wrap="none" rtlCol="0">
-            <a:spAutoFit/>
-          </a:bodyPr>
-          <a:lstStyle/>
-          <a:p>
-            <a:r>
-              <a:rPr lang="en-US" err="1">
-                <a:solidFill>
-                  <a:srgbClr val="FF0000"/>
-                </a:solidFill>
-              </a:rPr>
-              <a:t>Chưa</a:t>
-            </a:r>
-            <a:r>
-              <a:rPr lang="en-US">
-                <a:solidFill>
-                  <a:srgbClr val="FF0000"/>
-                </a:solidFill>
-              </a:rPr>
-              <a:t> </a:t>
-            </a:r>
-            <a:r>
-              <a:rPr lang="en-US" err="1">
-                <a:solidFill>
-                  <a:srgbClr val="FF0000"/>
-                </a:solidFill>
-              </a:rPr>
-              <a:t>có</a:t>
-            </a:r>
-            <a:r>
-              <a:rPr lang="en-US">
-                <a:solidFill>
-                  <a:srgbClr val="FF0000"/>
-                </a:solidFill>
-              </a:rPr>
-              <a:t> </a:t>
-            </a:r>
-            <a:r>
-              <a:rPr lang="en-US" err="1">
-                <a:solidFill>
-                  <a:srgbClr val="FF0000"/>
-                </a:solidFill>
-              </a:rPr>
-              <a:t>tài</a:t>
-            </a:r>
-            <a:r>
-              <a:rPr lang="en-US">
-                <a:solidFill>
-                  <a:srgbClr val="FF0000"/>
-                </a:solidFill>
-              </a:rPr>
-              <a:t> </a:t>
-            </a:r>
-            <a:r>
-              <a:rPr lang="en-US" err="1">
-                <a:solidFill>
-                  <a:srgbClr val="FF0000"/>
-                </a:solidFill>
-              </a:rPr>
-              <a:t>khoản</a:t>
-            </a:r>
-            <a:endParaRPr lang="en-US">
-              <a:solidFill>
-                <a:srgbClr val="FF0000"/>
-              </a:solidFill>
-            </a:endParaRPr>
-          </a:p>
-        </p:txBody>
-      </p:sp>
-      <p:sp>
-        <p:nvSpPr>
-          <p:cNvPr id="3" name="Hộp Văn bản 2">
-            <a:extLst>
-              <a:ext uri="{FF2B5EF4-FFF2-40B4-BE49-F238E27FC236}">
-                <a16:creationId xmlns:a16="http://schemas.microsoft.com/office/drawing/2014/main" id="{842F2086-1DB5-4560-A479-79C29FBC8FF4}"/>
-              </a:ext>
-            </a:extLst>
-          </p:cNvPr>
-          <p:cNvSpPr txBox="1"/>
-          <p:nvPr/>
-        </p:nvSpPr>
-        <p:spPr>
-          <a:xfrm>
-            <a:off x="4976043" y="5482028"/>
-            <a:ext cx="2453457" cy="400110"/>
-          </a:xfrm>
-          <a:prstGeom prst="rect">
-            <a:avLst/>
-          </a:prstGeom>
-          <a:ln/>
-        </p:spPr>
-        <p:style>
-          <a:lnRef idx="0">
-            <a:schemeClr val="accent6"/>
-          </a:lnRef>
-          <a:fillRef idx="3">
-            <a:schemeClr val="accent6"/>
-          </a:fillRef>
-          <a:effectRef idx="3">
-            <a:schemeClr val="accent6"/>
-          </a:effectRef>
-          <a:fontRef idx="minor">
-            <a:schemeClr val="lt1"/>
-          </a:fontRef>
-        </p:style>
-        <p:txBody>
-          <a:bodyPr wrap="square" rtlCol="0">
-            <a:spAutoFit/>
-          </a:bodyPr>
-          <a:lstStyle/>
-          <a:p>
-            <a:pPr algn="ctr"/>
-            <a:r>
-              <a:rPr lang="en-US" sz="2000" b="1" err="1"/>
-              <a:t>Đăng</a:t>
-            </a:r>
-            <a:r>
-              <a:rPr lang="en-US" sz="2000" b="1"/>
-              <a:t> </a:t>
-            </a:r>
-            <a:r>
-              <a:rPr lang="en-US" sz="2000" b="1" err="1"/>
-              <a:t>ký</a:t>
-            </a:r>
-            <a:r>
-              <a:rPr lang="en-US" sz="2000" b="1"/>
-              <a:t> </a:t>
-            </a:r>
-            <a:r>
-              <a:rPr lang="en-US" sz="2000" b="1" err="1"/>
-              <a:t>ngay</a:t>
-            </a:r>
-            <a:r>
-              <a:rPr lang="en-US" sz="2000" b="1"/>
-              <a:t> </a:t>
-            </a:r>
-          </a:p>
-        </p:txBody>
-      </p:sp>
-      <p:sp>
-        <p:nvSpPr>
-          <p:cNvPr id="13" name="Chỗ dành sẵn cho Văn bản 12">
-            <a:extLst>
-              <a:ext uri="{FF2B5EF4-FFF2-40B4-BE49-F238E27FC236}">
-                <a16:creationId xmlns:a16="http://schemas.microsoft.com/office/drawing/2014/main" id="{2BF1E5F4-000F-43C6-8375-D788AA204E47}"/>
-              </a:ext>
-            </a:extLst>
-          </p:cNvPr>
-          <p:cNvSpPr>
-            <a:spLocks noGrp="1"/>
-          </p:cNvSpPr>
-          <p:nvPr>
-            <p:ph type="body" idx="1"/>
-          </p:nvPr>
-        </p:nvSpPr>
-        <p:spPr>
-          <a:xfrm>
-            <a:off x="-1" y="0"/>
-            <a:ext cx="12192001" cy="1187883"/>
-          </a:xfrm>
-          <a:solidFill>
-            <a:schemeClr val="bg1"/>
-          </a:solidFill>
-        </p:spPr>
-        <p:txBody>
-          <a:bodyPr>
-            <a:normAutofit/>
-          </a:bodyPr>
-          <a:lstStyle/>
-          <a:p>
-            <a:r>
-              <a:rPr lang="en-US" sz="2000">
-                <a:solidFill>
-                  <a:srgbClr val="FF0000"/>
-                </a:solidFill>
-                <a:latin typeface="Bodoni MT Black" panose="02070A03080606020203" pitchFamily="18" charset="0"/>
-              </a:rPr>
-              <a:t>TIMVENHANH.COM</a:t>
-            </a:r>
-          </a:p>
-        </p:txBody>
-      </p:sp>
-      <p:pic>
-        <p:nvPicPr>
-          <p:cNvPr id="17" name="Hình ảnh 16" descr="Ảnh có chứa bầu trời&#10;&#10;Mô tả được tạo với mức tin cậy cao">
-            <a:extLst>
-              <a:ext uri="{FF2B5EF4-FFF2-40B4-BE49-F238E27FC236}">
-                <a16:creationId xmlns:a16="http://schemas.microsoft.com/office/drawing/2014/main" id="{99532F68-5909-4780-9C0C-6B8C4224F857}"/>
-              </a:ext>
-            </a:extLst>
-          </p:cNvPr>
-          <p:cNvPicPr>
-            <a:picLocks noChangeAspect="1"/>
-          </p:cNvPicPr>
-          <p:nvPr/>
-        </p:nvPicPr>
-        <p:blipFill>
-          <a:blip r:embed="rId3">
-            <a:extLst>
-              <a:ext uri="{28A0092B-C50C-407E-A947-70E740481C1C}">
-                <a14:useLocalDpi xmlns:a14="http://schemas.microsoft.com/office/drawing/2010/main" val="0"/>
-              </a:ext>
-            </a:extLst>
-          </a:blip>
-          <a:stretch>
-            <a:fillRect/>
-          </a:stretch>
-        </p:blipFill>
-        <p:spPr>
-          <a:xfrm>
-            <a:off x="190499" y="70862"/>
-            <a:ext cx="2657475" cy="1320559"/>
-          </a:xfrm>
-          <a:prstGeom prst="rect">
-            <a:avLst/>
-          </a:prstGeom>
-        </p:spPr>
-      </p:pic>
-      <p:sp>
-        <p:nvSpPr>
-          <p:cNvPr id="20" name="Hình chữ nhật 19">
-            <a:extLst>
-              <a:ext uri="{FF2B5EF4-FFF2-40B4-BE49-F238E27FC236}">
-                <a16:creationId xmlns:a16="http://schemas.microsoft.com/office/drawing/2014/main" id="{ED4AF283-6AA6-4502-AEA9-8F0706236051}"/>
-              </a:ext>
-            </a:extLst>
-          </p:cNvPr>
-          <p:cNvSpPr/>
-          <p:nvPr/>
-        </p:nvSpPr>
-        <p:spPr>
-          <a:xfrm>
-            <a:off x="1" y="6291663"/>
-            <a:ext cx="12192000" cy="649706"/>
-          </a:xfrm>
-          <a:prstGeom prst="rect">
+          <a:prstGeom prst="roundRect">
             <a:avLst/>
           </a:prstGeom>
           <a:solidFill>
-            <a:schemeClr val="bg1"/>
+            <a:srgbClr val="FBD7D7"/>
           </a:solidFill>
           <a:ln>
-            <a:noFill/>
+            <a:solidFill>
+              <a:srgbClr val="B20C0C"/>
+            </a:solidFill>
           </a:ln>
         </p:spPr>
         <p:style>
@@ -4003,119 +3903,46 @@
           <a:bodyPr rtlCol="0" anchor="ctr"/>
           <a:lstStyle/>
           <a:p>
-            <a:r>
-              <a:rPr lang="en-US" b="1">
-                <a:solidFill>
-                  <a:srgbClr val="FF0000"/>
-                </a:solidFill>
-              </a:rPr>
-              <a:t>Hotline: 0969966699 </a:t>
-            </a:r>
-          </a:p>
-        </p:txBody>
-      </p:sp>
-      <p:sp>
-        <p:nvSpPr>
-          <p:cNvPr id="21" name="Hộp Văn bản 20">
-            <a:extLst>
-              <a:ext uri="{FF2B5EF4-FFF2-40B4-BE49-F238E27FC236}">
-                <a16:creationId xmlns:a16="http://schemas.microsoft.com/office/drawing/2014/main" id="{0ABD9F07-995C-486B-8B55-029ACB604CD4}"/>
-              </a:ext>
-            </a:extLst>
-          </p:cNvPr>
-          <p:cNvSpPr txBox="1"/>
+            <a:pPr algn="ctr"/>
+            <a:endParaRPr lang="en-US"/>
+          </a:p>
+        </p:txBody>
+      </p:sp>
+      <p:sp>
+        <p:nvSpPr>
+          <p:cNvPr id="8" name="Rectangle: Rounded Corners 7">
+            <a:extLst>
+              <a:ext uri="{FF2B5EF4-FFF2-40B4-BE49-F238E27FC236}">
+                <a16:creationId xmlns:a16="http://schemas.microsoft.com/office/drawing/2014/main" id="{7979C10B-6BFF-4727-A802-B82C92E348E0}"/>
+              </a:ext>
+            </a:extLst>
+          </p:cNvPr>
+          <p:cNvSpPr/>
           <p:nvPr/>
         </p:nvSpPr>
         <p:spPr>
           <a:xfrm>
-            <a:off x="7695181" y="0"/>
-            <a:ext cx="3344777" cy="369332"/>
-          </a:xfrm>
-          <a:prstGeom prst="rect">
-            <a:avLst/>
-          </a:prstGeom>
-          <a:ln w="28575">
-            <a:solidFill>
-              <a:schemeClr val="bg2">
-                <a:lumMod val="90000"/>
-              </a:schemeClr>
-            </a:solidFill>
-          </a:ln>
-          <a:effectLst>
-            <a:glow rad="63500">
-              <a:schemeClr val="accent1">
-                <a:satMod val="175000"/>
-                <a:alpha val="40000"/>
-              </a:schemeClr>
-            </a:glow>
-          </a:effectLst>
-        </p:spPr>
-        <p:style>
-          <a:lnRef idx="2">
-            <a:schemeClr val="accent6"/>
-          </a:lnRef>
-          <a:fillRef idx="1">
-            <a:schemeClr val="lt1"/>
-          </a:fillRef>
-          <a:effectRef idx="0">
-            <a:schemeClr val="accent6"/>
-          </a:effectRef>
-          <a:fontRef idx="minor">
-            <a:schemeClr val="dk1"/>
-          </a:fontRef>
-        </p:style>
-        <p:txBody>
-          <a:bodyPr wrap="square" rtlCol="0">
-            <a:spAutoFit/>
-          </a:bodyPr>
-          <a:lstStyle/>
-          <a:p>
-            <a:r>
-              <a:rPr lang="en-US">
-                <a:solidFill>
-                  <a:schemeClr val="bg2">
-                    <a:lumMod val="90000"/>
-                  </a:schemeClr>
-                </a:solidFill>
-              </a:rPr>
-              <a:t>Tìm kiếm</a:t>
-            </a:r>
-          </a:p>
-        </p:txBody>
-      </p:sp>
-      <p:sp>
-        <p:nvSpPr>
-          <p:cNvPr id="24" name="Hình chữ nhật: Góc Tròn 23">
-            <a:extLst>
-              <a:ext uri="{FF2B5EF4-FFF2-40B4-BE49-F238E27FC236}">
-                <a16:creationId xmlns:a16="http://schemas.microsoft.com/office/drawing/2014/main" id="{B2C56B89-453A-4873-A307-DC92A2D88064}"/>
-              </a:ext>
-            </a:extLst>
-          </p:cNvPr>
-          <p:cNvSpPr/>
-          <p:nvPr/>
-        </p:nvSpPr>
-        <p:spPr>
-          <a:xfrm>
-            <a:off x="11196368" y="0"/>
-            <a:ext cx="995632" cy="369332"/>
+            <a:off x="4271596" y="3173583"/>
+            <a:ext cx="3648808" cy="510833"/>
           </a:xfrm>
           <a:prstGeom prst="roundRect">
             <a:avLst/>
           </a:prstGeom>
-          <a:ln/>
+          <a:solidFill>
+            <a:schemeClr val="bg1"/>
+          </a:solidFill>
         </p:spPr>
         <p:style>
           <a:lnRef idx="2">
-            <a:schemeClr val="accent6">
+            <a:schemeClr val="accent1">
               <a:shade val="50000"/>
             </a:schemeClr>
           </a:lnRef>
           <a:fillRef idx="1">
-            <a:schemeClr val="accent6"/>
+            <a:schemeClr val="accent1"/>
           </a:fillRef>
           <a:effectRef idx="0">
-            <a:schemeClr val="accent6"/>
+            <a:schemeClr val="accent1"/>
           </a:effectRef>
           <a:fontRef idx="minor">
             <a:schemeClr val="lt1"/>
@@ -4130,49 +3957,83 @@
           </a:p>
         </p:txBody>
       </p:sp>
-      <p:pic>
-        <p:nvPicPr>
-          <p:cNvPr id="26" name="Hình ảnh 25">
-            <a:extLst>
-              <a:ext uri="{FF2B5EF4-FFF2-40B4-BE49-F238E27FC236}">
-                <a16:creationId xmlns:a16="http://schemas.microsoft.com/office/drawing/2014/main" id="{D253ECB8-BE02-457D-98AD-37C7DDEC6FC5}"/>
-              </a:ext>
-            </a:extLst>
-          </p:cNvPr>
-          <p:cNvPicPr>
-            <a:picLocks noChangeAspect="1"/>
-          </p:cNvPicPr>
+      <p:sp>
+        <p:nvSpPr>
+          <p:cNvPr id="9" name="Rectangle: Rounded Corners 8">
+            <a:extLst>
+              <a:ext uri="{FF2B5EF4-FFF2-40B4-BE49-F238E27FC236}">
+                <a16:creationId xmlns:a16="http://schemas.microsoft.com/office/drawing/2014/main" id="{91F3BC59-1E56-4433-81AF-2CEAAE8621E1}"/>
+              </a:ext>
+            </a:extLst>
+          </p:cNvPr>
+          <p:cNvSpPr/>
           <p:nvPr/>
-        </p:nvPicPr>
-        <p:blipFill>
-          <a:blip r:embed="rId4">
-            <a:lum bright="70000" contrast="-70000"/>
-            <a:extLst>
-              <a:ext uri="{28A0092B-C50C-407E-A947-70E740481C1C}">
-                <a14:useLocalDpi xmlns:a14="http://schemas.microsoft.com/office/drawing/2010/main" val="0"/>
-              </a:ext>
-            </a:extLst>
-          </a:blip>
-          <a:stretch>
-            <a:fillRect/>
-          </a:stretch>
-        </p:blipFill>
+        </p:nvSpPr>
         <p:spPr>
           <a:xfrm>
-            <a:off x="11554602" y="70862"/>
-            <a:ext cx="279164" cy="279164"/>
+            <a:off x="4271596" y="3941180"/>
+            <a:ext cx="3648808" cy="510833"/>
           </a:xfrm>
-          <a:prstGeom prst="rect">
+          <a:prstGeom prst="roundRect">
             <a:avLst/>
           </a:prstGeom>
+          <a:solidFill>
+            <a:schemeClr val="accent6">
+              <a:lumMod val="40000"/>
+              <a:lumOff val="60000"/>
+            </a:schemeClr>
+          </a:solidFill>
+          <a:scene3d>
+            <a:camera prst="orthographicFront"/>
+            <a:lightRig rig="threePt" dir="t"/>
+          </a:scene3d>
+          <a:sp3d>
+            <a:bevelT w="38100" h="38100" prst="angle"/>
+          </a:sp3d>
         </p:spPr>
-      </p:pic>
-      <p:sp>
-        <p:nvSpPr>
-          <p:cNvPr id="27" name="Hộp Văn bản 26">
-            <a:extLst>
-              <a:ext uri="{FF2B5EF4-FFF2-40B4-BE49-F238E27FC236}">
-                <a16:creationId xmlns:a16="http://schemas.microsoft.com/office/drawing/2014/main" id="{80007D53-962D-47C7-AC38-ADC4F2DCFA3F}"/>
+        <p:style>
+          <a:lnRef idx="2">
+            <a:schemeClr val="accent1">
+              <a:shade val="50000"/>
+            </a:schemeClr>
+          </a:lnRef>
+          <a:fillRef idx="1">
+            <a:schemeClr val="accent1"/>
+          </a:fillRef>
+          <a:effectRef idx="0">
+            <a:schemeClr val="accent1"/>
+          </a:effectRef>
+          <a:fontRef idx="minor">
+            <a:schemeClr val="lt1"/>
+          </a:fontRef>
+        </p:style>
+        <p:txBody>
+          <a:bodyPr rtlCol="0" anchor="ctr"/>
+          <a:lstStyle/>
+          <a:p>
+            <a:pPr algn="ctr"/>
+            <a:r>
+              <a:rPr lang="vi-VN" dirty="0">
+                <a:solidFill>
+                  <a:schemeClr val="tx2"/>
+                </a:solidFill>
+              </a:rPr>
+              <a:t>Login</a:t>
+            </a:r>
+            <a:endParaRPr lang="en-US" dirty="0">
+              <a:solidFill>
+                <a:schemeClr val="tx2"/>
+              </a:solidFill>
+            </a:endParaRPr>
+          </a:p>
+        </p:txBody>
+      </p:sp>
+      <p:sp>
+        <p:nvSpPr>
+          <p:cNvPr id="10" name="TextBox 9">
+            <a:extLst>
+              <a:ext uri="{FF2B5EF4-FFF2-40B4-BE49-F238E27FC236}">
+                <a16:creationId xmlns:a16="http://schemas.microsoft.com/office/drawing/2014/main" id="{3115243B-F508-4C91-9EFD-E603E6F20542}"/>
               </a:ext>
             </a:extLst>
           </p:cNvPr>
@@ -4181,8 +4042,8 @@
         </p:nvSpPr>
         <p:spPr>
           <a:xfrm>
-            <a:off x="7972255" y="783276"/>
-            <a:ext cx="1107996" cy="369332"/>
+            <a:off x="5367700" y="4624363"/>
+            <a:ext cx="1456595" cy="307777"/>
           </a:xfrm>
           <a:prstGeom prst="rect">
             <a:avLst/>
@@ -4190,70 +4051,43 @@
           <a:noFill/>
         </p:spPr>
         <p:txBody>
-          <a:bodyPr wrap="none" rtlCol="0">
+          <a:bodyPr wrap="square" rtlCol="0">
             <a:spAutoFit/>
           </a:bodyPr>
           <a:lstStyle/>
           <a:p>
             <a:r>
-              <a:rPr lang="en-US"/>
-              <a:t>Ngôn ngữ</a:t>
-            </a:r>
-          </a:p>
-        </p:txBody>
-      </p:sp>
-      <p:pic>
-        <p:nvPicPr>
-          <p:cNvPr id="29" name="Hình ảnh 28" descr="Ảnh có chứa mẫu họa&#10;&#10;Mô tả được tạo với mức tin cậy cao">
-            <a:extLst>
-              <a:ext uri="{FF2B5EF4-FFF2-40B4-BE49-F238E27FC236}">
-                <a16:creationId xmlns:a16="http://schemas.microsoft.com/office/drawing/2014/main" id="{958BDF88-2301-4A66-8E3F-30B06A9434EC}"/>
-              </a:ext>
-            </a:extLst>
-          </p:cNvPr>
-          <p:cNvPicPr>
-            <a:picLocks noChangeAspect="1"/>
-          </p:cNvPicPr>
+              <a:rPr lang="vi-VN" sz="1400" u="sng" dirty="0">
+                <a:solidFill>
+                  <a:schemeClr val="tx2"/>
+                </a:solidFill>
+              </a:rPr>
+              <a:t>Quên mật khẩu</a:t>
+            </a:r>
+            <a:endParaRPr lang="en-US" sz="1400" u="sng" dirty="0">
+              <a:solidFill>
+                <a:schemeClr val="tx2"/>
+              </a:solidFill>
+            </a:endParaRPr>
+          </a:p>
+        </p:txBody>
+      </p:sp>
+      <p:sp>
+        <p:nvSpPr>
+          <p:cNvPr id="11" name="TextBox 10">
+            <a:extLst>
+              <a:ext uri="{FF2B5EF4-FFF2-40B4-BE49-F238E27FC236}">
+                <a16:creationId xmlns:a16="http://schemas.microsoft.com/office/drawing/2014/main" id="{49A1C479-B19B-4562-A60E-9B3EB5530ED0}"/>
+              </a:ext>
+            </a:extLst>
+          </p:cNvPr>
+          <p:cNvSpPr txBox="1"/>
           <p:nvPr/>
-        </p:nvPicPr>
-        <p:blipFill>
-          <a:blip r:embed="rId5">
-            <a:extLst>
-              <a:ext uri="{28A0092B-C50C-407E-A947-70E740481C1C}">
-                <a14:useLocalDpi xmlns:a14="http://schemas.microsoft.com/office/drawing/2010/main" val="0"/>
-              </a:ext>
-            </a:extLst>
-          </a:blip>
-          <a:stretch>
-            <a:fillRect/>
-          </a:stretch>
-        </p:blipFill>
+        </p:nvSpPr>
         <p:spPr>
           <a:xfrm>
-            <a:off x="9248346" y="819422"/>
-            <a:ext cx="446778" cy="313487"/>
-          </a:xfrm>
-          <a:prstGeom prst="rect">
-            <a:avLst/>
-          </a:prstGeom>
-        </p:spPr>
-      </p:pic>
-      <p:sp>
-        <p:nvSpPr>
-          <p:cNvPr id="31" name="Hộp Văn bản 30">
-            <a:extLst>
-              <a:ext uri="{FF2B5EF4-FFF2-40B4-BE49-F238E27FC236}">
-                <a16:creationId xmlns:a16="http://schemas.microsoft.com/office/drawing/2014/main" id="{8C848764-6AFA-44A9-9EE9-74B86B54518D}"/>
-              </a:ext>
-            </a:extLst>
-          </p:cNvPr>
-          <p:cNvSpPr txBox="1"/>
-          <p:nvPr/>
-        </p:nvSpPr>
-        <p:spPr>
-          <a:xfrm>
-            <a:off x="10044873" y="818551"/>
-            <a:ext cx="995085" cy="369332"/>
+            <a:off x="4385891" y="2521105"/>
+            <a:ext cx="2683124" cy="307777"/>
           </a:xfrm>
           <a:prstGeom prst="rect">
             <a:avLst/>
@@ -4267,100 +4101,99 @@
           <a:lstStyle/>
           <a:p>
             <a:r>
-              <a:rPr lang="en-US"/>
-              <a:t>Liên hệ</a:t>
-            </a:r>
-          </a:p>
-        </p:txBody>
-      </p:sp>
-      <p:pic>
-        <p:nvPicPr>
-          <p:cNvPr id="33" name="Hình ảnh 32" descr="Ảnh có chứa bộ sơ cứu, mẫu họa&#10;&#10;Mô tả được tạo với mức tin cậy cao">
-            <a:extLst>
-              <a:ext uri="{FF2B5EF4-FFF2-40B4-BE49-F238E27FC236}">
-                <a16:creationId xmlns:a16="http://schemas.microsoft.com/office/drawing/2014/main" id="{318F7612-7156-423E-AA95-A9F79739DB9F}"/>
-              </a:ext>
-            </a:extLst>
-          </p:cNvPr>
-          <p:cNvPicPr>
-            <a:picLocks noChangeAspect="1"/>
-          </p:cNvPicPr>
+              <a:rPr lang="vi-VN" sz="1400" dirty="0">
+                <a:solidFill>
+                  <a:srgbClr val="E67474"/>
+                </a:solidFill>
+              </a:rPr>
+              <a:t>Tên đăng nhậ</a:t>
+            </a:r>
+            <a:r>
+              <a:rPr lang="en-US" sz="1400" dirty="0">
+                <a:solidFill>
+                  <a:srgbClr val="E67474"/>
+                </a:solidFill>
+                <a:latin typeface="Arial" panose="020B0604020202020204" pitchFamily="34" charset="0"/>
+                <a:cs typeface="Arial" panose="020B0604020202020204" pitchFamily="34" charset="0"/>
+              </a:rPr>
+              <a:t>p </a:t>
+            </a:r>
+            <a:r>
+              <a:rPr lang="en-US" sz="1400" dirty="0" err="1">
+                <a:solidFill>
+                  <a:srgbClr val="E67474"/>
+                </a:solidFill>
+                <a:latin typeface="Arial" panose="020B0604020202020204" pitchFamily="34" charset="0"/>
+                <a:cs typeface="Arial" panose="020B0604020202020204" pitchFamily="34" charset="0"/>
+              </a:rPr>
+              <a:t>không</a:t>
+            </a:r>
+            <a:r>
+              <a:rPr lang="en-US" sz="1400" dirty="0">
+                <a:solidFill>
+                  <a:srgbClr val="E67474"/>
+                </a:solidFill>
+                <a:latin typeface="Arial" panose="020B0604020202020204" pitchFamily="34" charset="0"/>
+                <a:cs typeface="Arial" panose="020B0604020202020204" pitchFamily="34" charset="0"/>
+              </a:rPr>
+              <a:t> </a:t>
+            </a:r>
+            <a:r>
+              <a:rPr lang="en-US" sz="1400" dirty="0" err="1">
+                <a:solidFill>
+                  <a:srgbClr val="E67474"/>
+                </a:solidFill>
+                <a:latin typeface="Arial" panose="020B0604020202020204" pitchFamily="34" charset="0"/>
+                <a:cs typeface="Arial" panose="020B0604020202020204" pitchFamily="34" charset="0"/>
+              </a:rPr>
+              <a:t>tồn</a:t>
+            </a:r>
+            <a:r>
+              <a:rPr lang="en-US" sz="1400" dirty="0">
+                <a:solidFill>
+                  <a:srgbClr val="E67474"/>
+                </a:solidFill>
+                <a:latin typeface="Arial" panose="020B0604020202020204" pitchFamily="34" charset="0"/>
+                <a:cs typeface="Arial" panose="020B0604020202020204" pitchFamily="34" charset="0"/>
+              </a:rPr>
+              <a:t> </a:t>
+            </a:r>
+            <a:r>
+              <a:rPr lang="en-US" sz="1400" dirty="0" err="1">
+                <a:solidFill>
+                  <a:srgbClr val="E67474"/>
+                </a:solidFill>
+                <a:latin typeface="Arial" panose="020B0604020202020204" pitchFamily="34" charset="0"/>
+                <a:cs typeface="Arial" panose="020B0604020202020204" pitchFamily="34" charset="0"/>
+              </a:rPr>
+              <a:t>tại</a:t>
+            </a:r>
+            <a:endParaRPr lang="en-US" sz="1400" dirty="0">
+              <a:solidFill>
+                <a:srgbClr val="E67474"/>
+              </a:solidFill>
+              <a:latin typeface="Arial" panose="020B0604020202020204" pitchFamily="34" charset="0"/>
+              <a:cs typeface="Arial" panose="020B0604020202020204" pitchFamily="34" charset="0"/>
+            </a:endParaRPr>
+          </a:p>
+        </p:txBody>
+      </p:sp>
+      <p:sp>
+        <p:nvSpPr>
+          <p:cNvPr id="12" name="TextBox 11">
+            <a:extLst>
+              <a:ext uri="{FF2B5EF4-FFF2-40B4-BE49-F238E27FC236}">
+                <a16:creationId xmlns:a16="http://schemas.microsoft.com/office/drawing/2014/main" id="{80A12396-906F-4F82-861F-8F2FA3FF7D61}"/>
+              </a:ext>
+            </a:extLst>
+          </p:cNvPr>
+          <p:cNvSpPr txBox="1"/>
           <p:nvPr/>
-        </p:nvPicPr>
-        <p:blipFill>
-          <a:blip r:embed="rId6">
-            <a:extLst>
-              <a:ext uri="{28A0092B-C50C-407E-A947-70E740481C1C}">
-                <a14:useLocalDpi xmlns:a14="http://schemas.microsoft.com/office/drawing/2010/main" val="0"/>
-              </a:ext>
-            </a:extLst>
-          </a:blip>
-          <a:stretch>
-            <a:fillRect/>
-          </a:stretch>
-        </p:blipFill>
+        </p:nvSpPr>
         <p:spPr>
           <a:xfrm>
-            <a:off x="10715105" y="6305022"/>
-            <a:ext cx="649706" cy="649706"/>
-          </a:xfrm>
-          <a:prstGeom prst="rect">
-            <a:avLst/>
-          </a:prstGeom>
-        </p:spPr>
-      </p:pic>
-      <p:pic>
-        <p:nvPicPr>
-          <p:cNvPr id="35" name="Hình ảnh 34">
-            <a:extLst>
-              <a:ext uri="{FF2B5EF4-FFF2-40B4-BE49-F238E27FC236}">
-                <a16:creationId xmlns:a16="http://schemas.microsoft.com/office/drawing/2014/main" id="{F3DCDB2A-BB5E-429F-B04D-A116227433B1}"/>
-              </a:ext>
-            </a:extLst>
-          </p:cNvPr>
-          <p:cNvPicPr>
-            <a:picLocks noChangeAspect="1"/>
-          </p:cNvPicPr>
-          <p:nvPr/>
-        </p:nvPicPr>
-        <p:blipFill>
-          <a:blip r:embed="rId7">
-            <a:extLst>
-              <a:ext uri="{28A0092B-C50C-407E-A947-70E740481C1C}">
-                <a14:useLocalDpi xmlns:a14="http://schemas.microsoft.com/office/drawing/2010/main" val="0"/>
-              </a:ext>
-            </a:extLst>
-          </a:blip>
-          <a:stretch>
-            <a:fillRect/>
-          </a:stretch>
-        </p:blipFill>
-        <p:spPr>
-          <a:xfrm>
-            <a:off x="11542292" y="6308574"/>
-            <a:ext cx="649707" cy="649707"/>
-          </a:xfrm>
-          <a:prstGeom prst="rect">
-            <a:avLst/>
-          </a:prstGeom>
-        </p:spPr>
-      </p:pic>
-      <p:sp>
-        <p:nvSpPr>
-          <p:cNvPr id="36" name="Hộp Văn bản 35">
-            <a:extLst>
-              <a:ext uri="{FF2B5EF4-FFF2-40B4-BE49-F238E27FC236}">
-                <a16:creationId xmlns:a16="http://schemas.microsoft.com/office/drawing/2014/main" id="{CEFF58BD-6832-4B0C-BC38-BA3ED8BE8F5A}"/>
-              </a:ext>
-            </a:extLst>
-          </p:cNvPr>
-          <p:cNvSpPr txBox="1"/>
-          <p:nvPr/>
-        </p:nvSpPr>
-        <p:spPr>
-          <a:xfrm>
-            <a:off x="1781539" y="6251891"/>
-            <a:ext cx="4847207" cy="646331"/>
+            <a:off x="4385891" y="3275109"/>
+            <a:ext cx="1863970" cy="307777"/>
           </a:xfrm>
           <a:prstGeom prst="rect">
             <a:avLst/>
@@ -4373,175 +4206,32 @@
           </a:bodyPr>
           <a:lstStyle/>
           <a:p>
-            <a:pPr algn="ctr"/>
-            <a:r>
-              <a:rPr lang="en-US" u="sng"/>
-              <a:t>CHI NHÁNH HÀ NỘI</a:t>
-            </a:r>
-          </a:p>
-          <a:p>
-            <a:pPr algn="ctr"/>
-            <a:r>
-              <a:rPr lang="en-US"/>
-              <a:t>202 B3D Nam Trung Yên, Cấu Giấy, Hà Nội</a:t>
-            </a:r>
-          </a:p>
-        </p:txBody>
-      </p:sp>
-      <p:sp>
-        <p:nvSpPr>
-          <p:cNvPr id="38" name="Hộp Văn bản 37">
-            <a:extLst>
-              <a:ext uri="{FF2B5EF4-FFF2-40B4-BE49-F238E27FC236}">
-                <a16:creationId xmlns:a16="http://schemas.microsoft.com/office/drawing/2014/main" id="{CEDE14EA-2979-402C-861B-3B8F69B6D2D2}"/>
-              </a:ext>
-            </a:extLst>
-          </p:cNvPr>
-          <p:cNvSpPr txBox="1"/>
-          <p:nvPr/>
-        </p:nvSpPr>
-        <p:spPr>
-          <a:xfrm>
-            <a:off x="7564733" y="6274751"/>
-            <a:ext cx="2130391" cy="646331"/>
-          </a:xfrm>
-          <a:prstGeom prst="rect">
-            <a:avLst/>
-          </a:prstGeom>
-          <a:noFill/>
-        </p:spPr>
-        <p:txBody>
-          <a:bodyPr wrap="none" rtlCol="0">
-            <a:spAutoFit/>
-          </a:bodyPr>
-          <a:lstStyle/>
-          <a:p>
-            <a:r>
-              <a:rPr lang="en-US" u="sng"/>
-              <a:t>CHI NHÁNH TP.HCM</a:t>
-            </a:r>
-          </a:p>
-          <a:p>
-            <a:r>
-              <a:rPr lang="en-US"/>
-              <a:t>969 bac xyz mnp aaa</a:t>
-            </a:r>
-          </a:p>
-        </p:txBody>
-      </p:sp>
-      <p:sp>
-        <p:nvSpPr>
-          <p:cNvPr id="39" name="Hộp Văn bản 38">
-            <a:extLst>
-              <a:ext uri="{FF2B5EF4-FFF2-40B4-BE49-F238E27FC236}">
-                <a16:creationId xmlns:a16="http://schemas.microsoft.com/office/drawing/2014/main" id="{0687BA7F-A5B7-4723-A27D-C102649A08F7}"/>
-              </a:ext>
-            </a:extLst>
-          </p:cNvPr>
-          <p:cNvSpPr txBox="1"/>
-          <p:nvPr/>
-        </p:nvSpPr>
-        <p:spPr>
-          <a:xfrm>
-            <a:off x="2847974" y="651181"/>
-            <a:ext cx="1141659" cy="461665"/>
-          </a:xfrm>
-          <a:prstGeom prst="rect">
-            <a:avLst/>
-          </a:prstGeom>
-          <a:noFill/>
-        </p:spPr>
-        <p:txBody>
-          <a:bodyPr wrap="none" rtlCol="0">
-            <a:spAutoFit/>
-          </a:bodyPr>
-          <a:lstStyle/>
-          <a:p>
-            <a:r>
-              <a:rPr lang="en-US" sz="2400" b="1">
+            <a:r>
+              <a:rPr lang="vi-VN" sz="1400" dirty="0">
                 <a:solidFill>
-                  <a:srgbClr val="FF0000"/>
+                  <a:schemeClr val="accent1">
+                    <a:lumMod val="40000"/>
+                    <a:lumOff val="60000"/>
+                  </a:schemeClr>
                 </a:solidFill>
               </a:rPr>
-              <a:t>Mua vé</a:t>
-            </a:r>
-          </a:p>
-        </p:txBody>
-      </p:sp>
-      <p:sp>
-        <p:nvSpPr>
-          <p:cNvPr id="40" name="Hộp Văn bản 39">
-            <a:extLst>
-              <a:ext uri="{FF2B5EF4-FFF2-40B4-BE49-F238E27FC236}">
-                <a16:creationId xmlns:a16="http://schemas.microsoft.com/office/drawing/2014/main" id="{5D2A57FC-E6CB-4633-8C76-ECCF77769D0A}"/>
-              </a:ext>
-            </a:extLst>
-          </p:cNvPr>
-          <p:cNvSpPr txBox="1"/>
-          <p:nvPr/>
-        </p:nvSpPr>
-        <p:spPr>
-          <a:xfrm>
-            <a:off x="4023030" y="688883"/>
-            <a:ext cx="1253869" cy="400110"/>
-          </a:xfrm>
-          <a:prstGeom prst="rect">
-            <a:avLst/>
-          </a:prstGeom>
-          <a:noFill/>
-        </p:spPr>
-        <p:txBody>
-          <a:bodyPr wrap="none" rtlCol="0">
-            <a:spAutoFit/>
-          </a:bodyPr>
-          <a:lstStyle/>
-          <a:p>
-            <a:r>
-              <a:rPr lang="en-US" sz="2000"/>
-              <a:t>Giới Thiệu</a:t>
-            </a:r>
-          </a:p>
-        </p:txBody>
-      </p:sp>
-      <p:sp>
-        <p:nvSpPr>
-          <p:cNvPr id="41" name="Hộp Văn bản 40">
-            <a:extLst>
-              <a:ext uri="{FF2B5EF4-FFF2-40B4-BE49-F238E27FC236}">
-                <a16:creationId xmlns:a16="http://schemas.microsoft.com/office/drawing/2014/main" id="{16B3B17E-9496-444A-9920-684113C451A6}"/>
-              </a:ext>
-            </a:extLst>
-          </p:cNvPr>
-          <p:cNvSpPr txBox="1"/>
-          <p:nvPr/>
-        </p:nvSpPr>
-        <p:spPr>
-          <a:xfrm>
-            <a:off x="5265129" y="695563"/>
-            <a:ext cx="1371594" cy="400110"/>
-          </a:xfrm>
-          <a:prstGeom prst="rect">
-            <a:avLst/>
-          </a:prstGeom>
-          <a:noFill/>
-        </p:spPr>
-        <p:txBody>
-          <a:bodyPr wrap="none" rtlCol="0">
-            <a:spAutoFit/>
-          </a:bodyPr>
-          <a:lstStyle/>
-          <a:p>
-            <a:r>
-              <a:rPr lang="en-US" sz="2000"/>
-              <a:t>Thanh toán</a:t>
-            </a:r>
+              <a:t>Mật khẩu</a:t>
+            </a:r>
+            <a:endParaRPr lang="en-US" sz="1400" dirty="0">
+              <a:solidFill>
+                <a:schemeClr val="accent1">
+                  <a:lumMod val="40000"/>
+                  <a:lumOff val="60000"/>
+                </a:schemeClr>
+              </a:solidFill>
+            </a:endParaRPr>
           </a:p>
         </p:txBody>
       </p:sp>
     </p:spTree>
     <p:extLst>
       <p:ext uri="{BB962C8B-B14F-4D97-AF65-F5344CB8AC3E}">
-        <p14:creationId xmlns:p14="http://schemas.microsoft.com/office/powerpoint/2010/main" val="4185663629"/>
+        <p14:creationId xmlns:p14="http://schemas.microsoft.com/office/powerpoint/2010/main" val="3382200452"/>
       </p:ext>
     </p:extLst>
   </p:cSld>
@@ -4551,7 +4241,560 @@
 </p:sld>
 </file>
 
-<file path=ppt/slides/slide2.xml><?xml version="1.0" encoding="utf-8"?>
+<file path=ppt/slides/slide3.xml><?xml version="1.0" encoding="utf-8"?>
+<p:sld xmlns:a="http://schemas.openxmlformats.org/drawingml/2006/main" xmlns:r="http://schemas.openxmlformats.org/officeDocument/2006/relationships" xmlns:p="http://schemas.openxmlformats.org/presentationml/2006/main">
+  <p:cSld>
+    <p:spTree>
+      <p:nvGrpSpPr>
+        <p:cNvPr id="1" name=""/>
+        <p:cNvGrpSpPr/>
+        <p:nvPr/>
+      </p:nvGrpSpPr>
+      <p:grpSpPr>
+        <a:xfrm>
+          <a:off x="0" y="0"/>
+          <a:ext cx="0" cy="0"/>
+          <a:chOff x="0" y="0"/>
+          <a:chExt cx="0" cy="0"/>
+        </a:xfrm>
+      </p:grpSpPr>
+      <p:sp>
+        <p:nvSpPr>
+          <p:cNvPr id="4" name="Rectangle 3">
+            <a:extLst>
+              <a:ext uri="{FF2B5EF4-FFF2-40B4-BE49-F238E27FC236}">
+                <a16:creationId xmlns:a16="http://schemas.microsoft.com/office/drawing/2014/main" id="{39297C41-66FA-4859-B4BF-9F5A3487F485}"/>
+              </a:ext>
+            </a:extLst>
+          </p:cNvPr>
+          <p:cNvSpPr/>
+          <p:nvPr/>
+        </p:nvSpPr>
+        <p:spPr>
+          <a:xfrm>
+            <a:off x="3157632" y="1753506"/>
+            <a:ext cx="5876729" cy="3350985"/>
+          </a:xfrm>
+          <a:prstGeom prst="rect">
+            <a:avLst/>
+          </a:prstGeom>
+          <a:solidFill>
+            <a:schemeClr val="accent5">
+              <a:lumMod val="20000"/>
+              <a:lumOff val="80000"/>
+            </a:schemeClr>
+          </a:solidFill>
+        </p:spPr>
+        <p:style>
+          <a:lnRef idx="2">
+            <a:schemeClr val="accent1">
+              <a:shade val="50000"/>
+            </a:schemeClr>
+          </a:lnRef>
+          <a:fillRef idx="1">
+            <a:schemeClr val="accent1"/>
+          </a:fillRef>
+          <a:effectRef idx="0">
+            <a:schemeClr val="accent1"/>
+          </a:effectRef>
+          <a:fontRef idx="minor">
+            <a:schemeClr val="lt1"/>
+          </a:fontRef>
+        </p:style>
+        <p:txBody>
+          <a:bodyPr rtlCol="0" anchor="ctr"/>
+          <a:lstStyle/>
+          <a:p>
+            <a:pPr algn="ctr"/>
+            <a:endParaRPr lang="en-US" dirty="0"/>
+          </a:p>
+        </p:txBody>
+      </p:sp>
+      <p:sp>
+        <p:nvSpPr>
+          <p:cNvPr id="6" name="TextBox 5">
+            <a:extLst>
+              <a:ext uri="{FF2B5EF4-FFF2-40B4-BE49-F238E27FC236}">
+                <a16:creationId xmlns:a16="http://schemas.microsoft.com/office/drawing/2014/main" id="{5D866BAD-73D5-4E6C-98E3-8F6F41E99FA7}"/>
+              </a:ext>
+            </a:extLst>
+          </p:cNvPr>
+          <p:cNvSpPr txBox="1"/>
+          <p:nvPr/>
+        </p:nvSpPr>
+        <p:spPr>
+          <a:xfrm>
+            <a:off x="5399203" y="1895080"/>
+            <a:ext cx="1393585" cy="369332"/>
+          </a:xfrm>
+          <a:prstGeom prst="rect">
+            <a:avLst/>
+          </a:prstGeom>
+          <a:noFill/>
+        </p:spPr>
+        <p:txBody>
+          <a:bodyPr wrap="square" rtlCol="0">
+            <a:spAutoFit/>
+          </a:bodyPr>
+          <a:lstStyle/>
+          <a:p>
+            <a:r>
+              <a:rPr lang="en-US" dirty="0">
+                <a:solidFill>
+                  <a:schemeClr val="tx2"/>
+                </a:solidFill>
+              </a:rPr>
+              <a:t>ĐĂNG NHẬP</a:t>
+            </a:r>
+          </a:p>
+        </p:txBody>
+      </p:sp>
+      <p:sp>
+        <p:nvSpPr>
+          <p:cNvPr id="9" name="Rectangle: Rounded Corners 8">
+            <a:extLst>
+              <a:ext uri="{FF2B5EF4-FFF2-40B4-BE49-F238E27FC236}">
+                <a16:creationId xmlns:a16="http://schemas.microsoft.com/office/drawing/2014/main" id="{91F3BC59-1E56-4433-81AF-2CEAAE8621E1}"/>
+              </a:ext>
+            </a:extLst>
+          </p:cNvPr>
+          <p:cNvSpPr/>
+          <p:nvPr/>
+        </p:nvSpPr>
+        <p:spPr>
+          <a:xfrm>
+            <a:off x="4271596" y="3941180"/>
+            <a:ext cx="3648808" cy="510833"/>
+          </a:xfrm>
+          <a:prstGeom prst="roundRect">
+            <a:avLst/>
+          </a:prstGeom>
+          <a:solidFill>
+            <a:schemeClr val="accent6">
+              <a:lumMod val="40000"/>
+              <a:lumOff val="60000"/>
+            </a:schemeClr>
+          </a:solidFill>
+          <a:scene3d>
+            <a:camera prst="orthographicFront"/>
+            <a:lightRig rig="threePt" dir="t"/>
+          </a:scene3d>
+          <a:sp3d>
+            <a:bevelT w="38100" h="38100" prst="angle"/>
+          </a:sp3d>
+        </p:spPr>
+        <p:style>
+          <a:lnRef idx="2">
+            <a:schemeClr val="accent1">
+              <a:shade val="50000"/>
+            </a:schemeClr>
+          </a:lnRef>
+          <a:fillRef idx="1">
+            <a:schemeClr val="accent1"/>
+          </a:fillRef>
+          <a:effectRef idx="0">
+            <a:schemeClr val="accent1"/>
+          </a:effectRef>
+          <a:fontRef idx="minor">
+            <a:schemeClr val="lt1"/>
+          </a:fontRef>
+        </p:style>
+        <p:txBody>
+          <a:bodyPr rtlCol="0" anchor="ctr"/>
+          <a:lstStyle/>
+          <a:p>
+            <a:pPr algn="ctr"/>
+            <a:r>
+              <a:rPr lang="vi-VN" dirty="0">
+                <a:solidFill>
+                  <a:schemeClr val="tx2"/>
+                </a:solidFill>
+              </a:rPr>
+              <a:t>Login</a:t>
+            </a:r>
+            <a:endParaRPr lang="en-US" dirty="0">
+              <a:solidFill>
+                <a:schemeClr val="tx2"/>
+              </a:solidFill>
+            </a:endParaRPr>
+          </a:p>
+        </p:txBody>
+      </p:sp>
+      <p:sp>
+        <p:nvSpPr>
+          <p:cNvPr id="10" name="TextBox 9">
+            <a:extLst>
+              <a:ext uri="{FF2B5EF4-FFF2-40B4-BE49-F238E27FC236}">
+                <a16:creationId xmlns:a16="http://schemas.microsoft.com/office/drawing/2014/main" id="{3115243B-F508-4C91-9EFD-E603E6F20542}"/>
+              </a:ext>
+            </a:extLst>
+          </p:cNvPr>
+          <p:cNvSpPr txBox="1"/>
+          <p:nvPr/>
+        </p:nvSpPr>
+        <p:spPr>
+          <a:xfrm>
+            <a:off x="5367700" y="4624363"/>
+            <a:ext cx="1456595" cy="307777"/>
+          </a:xfrm>
+          <a:prstGeom prst="rect">
+            <a:avLst/>
+          </a:prstGeom>
+          <a:noFill/>
+        </p:spPr>
+        <p:txBody>
+          <a:bodyPr wrap="square" rtlCol="0">
+            <a:spAutoFit/>
+          </a:bodyPr>
+          <a:lstStyle/>
+          <a:p>
+            <a:r>
+              <a:rPr lang="vi-VN" sz="1400" u="sng" dirty="0">
+                <a:solidFill>
+                  <a:schemeClr val="tx2"/>
+                </a:solidFill>
+              </a:rPr>
+              <a:t>Quên mật khẩu</a:t>
+            </a:r>
+            <a:endParaRPr lang="en-US" sz="1400" u="sng" dirty="0">
+              <a:solidFill>
+                <a:schemeClr val="tx2"/>
+              </a:solidFill>
+            </a:endParaRPr>
+          </a:p>
+        </p:txBody>
+      </p:sp>
+      <p:sp>
+        <p:nvSpPr>
+          <p:cNvPr id="13" name="Rectangle: Rounded Corners 12">
+            <a:extLst>
+              <a:ext uri="{FF2B5EF4-FFF2-40B4-BE49-F238E27FC236}">
+                <a16:creationId xmlns:a16="http://schemas.microsoft.com/office/drawing/2014/main" id="{D5255CCB-47C1-4FA7-86AC-02C3D3D8B3B3}"/>
+              </a:ext>
+            </a:extLst>
+          </p:cNvPr>
+          <p:cNvSpPr/>
+          <p:nvPr/>
+        </p:nvSpPr>
+        <p:spPr>
+          <a:xfrm>
+            <a:off x="4271591" y="3173580"/>
+            <a:ext cx="3648808" cy="510833"/>
+          </a:xfrm>
+          <a:prstGeom prst="roundRect">
+            <a:avLst/>
+          </a:prstGeom>
+          <a:solidFill>
+            <a:srgbClr val="FBD7D7"/>
+          </a:solidFill>
+          <a:ln>
+            <a:solidFill>
+              <a:srgbClr val="B20C0C"/>
+            </a:solidFill>
+          </a:ln>
+        </p:spPr>
+        <p:style>
+          <a:lnRef idx="2">
+            <a:schemeClr val="accent1">
+              <a:shade val="50000"/>
+            </a:schemeClr>
+          </a:lnRef>
+          <a:fillRef idx="1">
+            <a:schemeClr val="accent1"/>
+          </a:fillRef>
+          <a:effectRef idx="0">
+            <a:schemeClr val="accent1"/>
+          </a:effectRef>
+          <a:fontRef idx="minor">
+            <a:schemeClr val="lt1"/>
+          </a:fontRef>
+        </p:style>
+        <p:txBody>
+          <a:bodyPr rtlCol="0" anchor="ctr"/>
+          <a:lstStyle/>
+          <a:p>
+            <a:pPr algn="ctr"/>
+            <a:endParaRPr lang="en-US"/>
+          </a:p>
+        </p:txBody>
+      </p:sp>
+      <p:sp>
+        <p:nvSpPr>
+          <p:cNvPr id="14" name="Rectangle: Rounded Corners 13">
+            <a:extLst>
+              <a:ext uri="{FF2B5EF4-FFF2-40B4-BE49-F238E27FC236}">
+                <a16:creationId xmlns:a16="http://schemas.microsoft.com/office/drawing/2014/main" id="{A83DCB03-EB53-46B7-B8E6-A29DF49076DD}"/>
+              </a:ext>
+            </a:extLst>
+          </p:cNvPr>
+          <p:cNvSpPr/>
+          <p:nvPr/>
+        </p:nvSpPr>
+        <p:spPr>
+          <a:xfrm>
+            <a:off x="4271591" y="2405980"/>
+            <a:ext cx="3648808" cy="510833"/>
+          </a:xfrm>
+          <a:prstGeom prst="roundRect">
+            <a:avLst/>
+          </a:prstGeom>
+          <a:solidFill>
+            <a:schemeClr val="bg1"/>
+          </a:solidFill>
+        </p:spPr>
+        <p:style>
+          <a:lnRef idx="2">
+            <a:schemeClr val="accent1">
+              <a:shade val="50000"/>
+            </a:schemeClr>
+          </a:lnRef>
+          <a:fillRef idx="1">
+            <a:schemeClr val="accent1"/>
+          </a:fillRef>
+          <a:effectRef idx="0">
+            <a:schemeClr val="accent1"/>
+          </a:effectRef>
+          <a:fontRef idx="minor">
+            <a:schemeClr val="lt1"/>
+          </a:fontRef>
+        </p:style>
+        <p:txBody>
+          <a:bodyPr rtlCol="0" anchor="ctr"/>
+          <a:lstStyle/>
+          <a:p>
+            <a:pPr algn="ctr"/>
+            <a:endParaRPr lang="en-US"/>
+          </a:p>
+        </p:txBody>
+      </p:sp>
+      <p:sp>
+        <p:nvSpPr>
+          <p:cNvPr id="11" name="TextBox 10">
+            <a:extLst>
+              <a:ext uri="{FF2B5EF4-FFF2-40B4-BE49-F238E27FC236}">
+                <a16:creationId xmlns:a16="http://schemas.microsoft.com/office/drawing/2014/main" id="{49A1C479-B19B-4562-A60E-9B3EB5530ED0}"/>
+              </a:ext>
+            </a:extLst>
+          </p:cNvPr>
+          <p:cNvSpPr txBox="1"/>
+          <p:nvPr/>
+        </p:nvSpPr>
+        <p:spPr>
+          <a:xfrm>
+            <a:off x="4385891" y="3275107"/>
+            <a:ext cx="2683124" cy="307777"/>
+          </a:xfrm>
+          <a:prstGeom prst="rect">
+            <a:avLst/>
+          </a:prstGeom>
+          <a:noFill/>
+        </p:spPr>
+        <p:txBody>
+          <a:bodyPr wrap="square" rtlCol="0">
+            <a:spAutoFit/>
+          </a:bodyPr>
+          <a:lstStyle/>
+          <a:p>
+            <a:r>
+              <a:rPr lang="en-US" sz="1400" dirty="0" err="1">
+                <a:solidFill>
+                  <a:srgbClr val="E67474"/>
+                </a:solidFill>
+                <a:latin typeface="Arial" panose="020B0604020202020204" pitchFamily="34" charset="0"/>
+                <a:cs typeface="Arial" panose="020B0604020202020204" pitchFamily="34" charset="0"/>
+              </a:rPr>
+              <a:t>Mật</a:t>
+            </a:r>
+            <a:r>
+              <a:rPr lang="en-US" sz="1400" dirty="0">
+                <a:solidFill>
+                  <a:srgbClr val="E67474"/>
+                </a:solidFill>
+                <a:latin typeface="Arial" panose="020B0604020202020204" pitchFamily="34" charset="0"/>
+                <a:cs typeface="Arial" panose="020B0604020202020204" pitchFamily="34" charset="0"/>
+              </a:rPr>
+              <a:t> </a:t>
+            </a:r>
+            <a:r>
+              <a:rPr lang="en-US" sz="1400" dirty="0" err="1">
+                <a:solidFill>
+                  <a:srgbClr val="E67474"/>
+                </a:solidFill>
+                <a:latin typeface="Arial" panose="020B0604020202020204" pitchFamily="34" charset="0"/>
+                <a:cs typeface="Arial" panose="020B0604020202020204" pitchFamily="34" charset="0"/>
+              </a:rPr>
+              <a:t>khẩu</a:t>
+            </a:r>
+            <a:r>
+              <a:rPr lang="en-US" sz="1400" dirty="0">
+                <a:solidFill>
+                  <a:srgbClr val="E67474"/>
+                </a:solidFill>
+                <a:latin typeface="Arial" panose="020B0604020202020204" pitchFamily="34" charset="0"/>
+                <a:cs typeface="Arial" panose="020B0604020202020204" pitchFamily="34" charset="0"/>
+              </a:rPr>
+              <a:t> </a:t>
+            </a:r>
+            <a:r>
+              <a:rPr lang="en-US" sz="1400" dirty="0" err="1">
+                <a:solidFill>
+                  <a:srgbClr val="E67474"/>
+                </a:solidFill>
+                <a:latin typeface="Arial" panose="020B0604020202020204" pitchFamily="34" charset="0"/>
+                <a:cs typeface="Arial" panose="020B0604020202020204" pitchFamily="34" charset="0"/>
+              </a:rPr>
+              <a:t>không</a:t>
+            </a:r>
+            <a:r>
+              <a:rPr lang="en-US" sz="1400" dirty="0">
+                <a:solidFill>
+                  <a:srgbClr val="E67474"/>
+                </a:solidFill>
+                <a:latin typeface="Arial" panose="020B0604020202020204" pitchFamily="34" charset="0"/>
+                <a:cs typeface="Arial" panose="020B0604020202020204" pitchFamily="34" charset="0"/>
+              </a:rPr>
+              <a:t> </a:t>
+            </a:r>
+            <a:r>
+              <a:rPr lang="en-US" sz="1400" dirty="0" err="1">
+                <a:solidFill>
+                  <a:srgbClr val="E67474"/>
+                </a:solidFill>
+                <a:latin typeface="Arial" panose="020B0604020202020204" pitchFamily="34" charset="0"/>
+                <a:cs typeface="Arial" panose="020B0604020202020204" pitchFamily="34" charset="0"/>
+              </a:rPr>
+              <a:t>đúng</a:t>
+            </a:r>
+            <a:endParaRPr lang="en-US" sz="1400" dirty="0">
+              <a:solidFill>
+                <a:srgbClr val="E67474"/>
+              </a:solidFill>
+              <a:latin typeface="Arial" panose="020B0604020202020204" pitchFamily="34" charset="0"/>
+              <a:cs typeface="Arial" panose="020B0604020202020204" pitchFamily="34" charset="0"/>
+            </a:endParaRPr>
+          </a:p>
+        </p:txBody>
+      </p:sp>
+      <p:sp>
+        <p:nvSpPr>
+          <p:cNvPr id="12" name="TextBox 11">
+            <a:extLst>
+              <a:ext uri="{FF2B5EF4-FFF2-40B4-BE49-F238E27FC236}">
+                <a16:creationId xmlns:a16="http://schemas.microsoft.com/office/drawing/2014/main" id="{80A12396-906F-4F82-861F-8F2FA3FF7D61}"/>
+              </a:ext>
+            </a:extLst>
+          </p:cNvPr>
+          <p:cNvSpPr txBox="1"/>
+          <p:nvPr/>
+        </p:nvSpPr>
+        <p:spPr>
+          <a:xfrm>
+            <a:off x="4385891" y="2507508"/>
+            <a:ext cx="1863970" cy="307777"/>
+          </a:xfrm>
+          <a:prstGeom prst="rect">
+            <a:avLst/>
+          </a:prstGeom>
+          <a:noFill/>
+        </p:spPr>
+        <p:txBody>
+          <a:bodyPr wrap="square" rtlCol="0">
+            <a:spAutoFit/>
+          </a:bodyPr>
+          <a:lstStyle/>
+          <a:p>
+            <a:r>
+              <a:rPr lang="en-US" sz="1400" dirty="0" err="1">
+                <a:solidFill>
+                  <a:schemeClr val="accent1">
+                    <a:lumMod val="40000"/>
+                    <a:lumOff val="60000"/>
+                  </a:schemeClr>
+                </a:solidFill>
+                <a:latin typeface="Arial" panose="020B0604020202020204" pitchFamily="34" charset="0"/>
+                <a:cs typeface="Arial" panose="020B0604020202020204" pitchFamily="34" charset="0"/>
+              </a:rPr>
+              <a:t>Tên</a:t>
+            </a:r>
+            <a:r>
+              <a:rPr lang="en-US" sz="1400" dirty="0">
+                <a:solidFill>
+                  <a:schemeClr val="accent1">
+                    <a:lumMod val="40000"/>
+                    <a:lumOff val="60000"/>
+                  </a:schemeClr>
+                </a:solidFill>
+                <a:latin typeface="Arial" panose="020B0604020202020204" pitchFamily="34" charset="0"/>
+                <a:cs typeface="Arial" panose="020B0604020202020204" pitchFamily="34" charset="0"/>
+              </a:rPr>
+              <a:t> </a:t>
+            </a:r>
+            <a:r>
+              <a:rPr lang="en-US" sz="1400" dirty="0" err="1">
+                <a:solidFill>
+                  <a:schemeClr val="accent1">
+                    <a:lumMod val="40000"/>
+                    <a:lumOff val="60000"/>
+                  </a:schemeClr>
+                </a:solidFill>
+                <a:latin typeface="Arial" panose="020B0604020202020204" pitchFamily="34" charset="0"/>
+                <a:cs typeface="Arial" panose="020B0604020202020204" pitchFamily="34" charset="0"/>
+              </a:rPr>
+              <a:t>đăng</a:t>
+            </a:r>
+            <a:r>
+              <a:rPr lang="en-US" sz="1400" dirty="0">
+                <a:solidFill>
+                  <a:schemeClr val="accent1">
+                    <a:lumMod val="40000"/>
+                    <a:lumOff val="60000"/>
+                  </a:schemeClr>
+                </a:solidFill>
+                <a:latin typeface="Arial" panose="020B0604020202020204" pitchFamily="34" charset="0"/>
+                <a:cs typeface="Arial" panose="020B0604020202020204" pitchFamily="34" charset="0"/>
+              </a:rPr>
+              <a:t> </a:t>
+            </a:r>
+            <a:r>
+              <a:rPr lang="en-US" sz="1400" dirty="0" err="1">
+                <a:solidFill>
+                  <a:schemeClr val="accent1">
+                    <a:lumMod val="40000"/>
+                    <a:lumOff val="60000"/>
+                  </a:schemeClr>
+                </a:solidFill>
+                <a:latin typeface="Arial" panose="020B0604020202020204" pitchFamily="34" charset="0"/>
+                <a:cs typeface="Arial" panose="020B0604020202020204" pitchFamily="34" charset="0"/>
+              </a:rPr>
+              <a:t>nhập</a:t>
+            </a:r>
+            <a:endParaRPr lang="en-US" sz="1400" dirty="0">
+              <a:solidFill>
+                <a:schemeClr val="accent1">
+                  <a:lumMod val="40000"/>
+                  <a:lumOff val="60000"/>
+                </a:schemeClr>
+              </a:solidFill>
+              <a:latin typeface="Arial" panose="020B0604020202020204" pitchFamily="34" charset="0"/>
+              <a:cs typeface="Arial" panose="020B0604020202020204" pitchFamily="34" charset="0"/>
+            </a:endParaRPr>
+          </a:p>
+        </p:txBody>
+      </p:sp>
+    </p:spTree>
+    <p:extLst>
+      <p:ext uri="{BB962C8B-B14F-4D97-AF65-F5344CB8AC3E}">
+        <p14:creationId xmlns:p14="http://schemas.microsoft.com/office/powerpoint/2010/main" val="1989956914"/>
+      </p:ext>
+    </p:extLst>
+  </p:cSld>
+  <p:clrMapOvr>
+    <a:masterClrMapping/>
+  </p:clrMapOvr>
+</p:sld>
+</file>
+
+<file path=ppt/slides/slide4.xml><?xml version="1.0" encoding="utf-8"?>
 <p:sld xmlns:a="http://schemas.openxmlformats.org/drawingml/2006/main" xmlns:r="http://schemas.openxmlformats.org/officeDocument/2006/relationships" xmlns:p="http://schemas.openxmlformats.org/presentationml/2006/main">
   <p:cSld>
     <p:spTree>

</xml_diff>